<commit_message>
Update tutorial slides and fixes to examples
</commit_message>
<xml_diff>
--- a/tutorial/slides/gaspi_tutorial.pptx
+++ b/tutorial/slides/gaspi_tutorial.pptx
@@ -419,7 +419,7 @@
               <a:pPr>
                 <a:defRPr/>
               </a:pPr>
-              <a:t>14.02.2014</a:t>
+              <a:t>10.03.2014</a:t>
             </a:fld>
             <a:endParaRPr lang="de-DE"/>
           </a:p>
@@ -611,7 +611,7 @@
               <a:pPr>
                 <a:defRPr/>
               </a:pPr>
-              <a:t>14.02.2014</a:t>
+              <a:t>10.03.2014</a:t>
             </a:fld>
             <a:endParaRPr lang="de-DE"/>
           </a:p>
@@ -813,7 +813,7 @@
               <a:pPr>
                 <a:defRPr/>
               </a:pPr>
-              <a:t>14.02.2014</a:t>
+              <a:t>10.03.2014</a:t>
             </a:fld>
             <a:endParaRPr lang="de-DE"/>
           </a:p>
@@ -1055,7 +1055,7 @@
               <a:pPr>
                 <a:defRPr/>
               </a:pPr>
-              <a:t>14.02.2014</a:t>
+              <a:t>10.03.2014</a:t>
             </a:fld>
             <a:endParaRPr lang="de-DE"/>
           </a:p>
@@ -1325,7 +1325,7 @@
               <a:pPr>
                 <a:defRPr/>
               </a:pPr>
-              <a:t>14.02.2014</a:t>
+              <a:t>10.03.2014</a:t>
             </a:fld>
             <a:endParaRPr lang="de-DE"/>
           </a:p>
@@ -1683,7 +1683,7 @@
               <a:pPr>
                 <a:defRPr/>
               </a:pPr>
-              <a:t>14.02.2014</a:t>
+              <a:t>10.03.2014</a:t>
             </a:fld>
             <a:endParaRPr lang="de-DE"/>
           </a:p>
@@ -2179,7 +2179,7 @@
               <a:pPr>
                 <a:defRPr/>
               </a:pPr>
-              <a:t>14.02.2014</a:t>
+              <a:t>10.03.2014</a:t>
             </a:fld>
             <a:endParaRPr lang="de-DE"/>
           </a:p>
@@ -2327,7 +2327,7 @@
               <a:pPr>
                 <a:defRPr/>
               </a:pPr>
-              <a:t>14.02.2014</a:t>
+              <a:t>10.03.2014</a:t>
             </a:fld>
             <a:endParaRPr lang="de-DE"/>
           </a:p>
@@ -2444,7 +2444,7 @@
               <a:pPr>
                 <a:defRPr/>
               </a:pPr>
-              <a:t>14.02.2014</a:t>
+              <a:t>10.03.2014</a:t>
             </a:fld>
             <a:endParaRPr lang="de-DE"/>
           </a:p>
@@ -2743,7 +2743,7 @@
               <a:pPr>
                 <a:defRPr/>
               </a:pPr>
-              <a:t>14.02.2014</a:t>
+              <a:t>10.03.2014</a:t>
             </a:fld>
             <a:endParaRPr lang="de-DE"/>
           </a:p>
@@ -3021,7 +3021,7 @@
               <a:pPr>
                 <a:defRPr/>
               </a:pPr>
-              <a:t>14.02.2014</a:t>
+              <a:t>10.03.2014</a:t>
             </a:fld>
             <a:endParaRPr lang="de-DE"/>
           </a:p>
@@ -3343,7 +3343,7 @@
               <a:pPr>
                 <a:defRPr/>
               </a:pPr>
-              <a:t>14.02.2014</a:t>
+              <a:t>10.03.2014</a:t>
             </a:fld>
             <a:endParaRPr lang="de-DE"/>
           </a:p>
@@ -3910,10 +3910,7 @@
                 <a:spcPct val="90000"/>
               </a:lnSpc>
             </a:pPr>
-            <a:r>
-              <a:rPr lang="de-DE" sz="2800" smtClean="0"/>
-              <a:t>ZIH – Dresden</a:t>
-            </a:r>
+            <a:endParaRPr lang="de-DE" sz="2800" dirty="0" smtClean="0"/>
           </a:p>
           <a:p>
             <a:pPr eaLnBrk="1" hangingPunct="1">
@@ -3921,7 +3918,10 @@
                 <a:spcPct val="90000"/>
               </a:lnSpc>
             </a:pPr>
-            <a:endParaRPr lang="de-DE" sz="2800" smtClean="0"/>
+            <a:r>
+              <a:rPr lang="de-DE" sz="1400" dirty="0" smtClean="0"/>
+              <a:t>Christian Simmendinger</a:t>
+            </a:r>
           </a:p>
           <a:p>
             <a:pPr eaLnBrk="1" hangingPunct="1">
@@ -3930,8 +3930,8 @@
               </a:lnSpc>
             </a:pPr>
             <a:r>
-              <a:rPr lang="de-DE" sz="1400" smtClean="0"/>
-              <a:t>Christian Simmendinger</a:t>
+              <a:rPr lang="de-DE" sz="1400" dirty="0" smtClean="0"/>
+              <a:t>Mirko Rahn</a:t>
             </a:r>
           </a:p>
           <a:p>
@@ -3941,18 +3941,7 @@
               </a:lnSpc>
             </a:pPr>
             <a:r>
-              <a:rPr lang="de-DE" sz="1400" smtClean="0"/>
-              <a:t>Mirko Rahn</a:t>
-            </a:r>
-          </a:p>
-          <a:p>
-            <a:pPr eaLnBrk="1" hangingPunct="1">
-              <a:lnSpc>
-                <a:spcPct val="90000"/>
-              </a:lnSpc>
-            </a:pPr>
-            <a:r>
-              <a:rPr lang="de-DE" sz="1400" smtClean="0"/>
+              <a:rPr lang="de-DE" sz="1400" dirty="0" smtClean="0"/>
               <a:t>Daniel Grünewald</a:t>
             </a:r>
           </a:p>
@@ -6059,7 +6048,10 @@
               <a:t>  const </a:t>
             </a:r>
             <a:r>
-              <a:rPr lang="en-US" sz="1400" dirty="0" err="1">
+              <a:rPr lang="en-US" sz="1400" b="1" dirty="0" err="1">
+                <a:solidFill>
+                  <a:srgbClr val="3B57A0"/>
+                </a:solidFill>
                 <a:latin typeface="Courier New" pitchFamily="49" charset="0"/>
                 <a:cs typeface="Courier New" pitchFamily="49" charset="0"/>
               </a:rPr>
@@ -6098,7 +6090,24 @@
                 <a:latin typeface="Courier New" pitchFamily="49" charset="0"/>
                 <a:cs typeface="Courier New" pitchFamily="49" charset="0"/>
               </a:rPr>
-              <a:t>  if (r != GASPI_SUCCESS)       	\    </a:t>
+              <a:t>  if (r != </a:t>
+            </a:r>
+            <a:r>
+              <a:rPr lang="en-US" sz="1400" b="1" dirty="0">
+                <a:solidFill>
+                  <a:srgbClr val="3B57A0"/>
+                </a:solidFill>
+                <a:latin typeface="Courier New" pitchFamily="49" charset="0"/>
+                <a:cs typeface="Courier New" pitchFamily="49" charset="0"/>
+              </a:rPr>
+              <a:t>GASPI_SUCCESS</a:t>
+            </a:r>
+            <a:r>
+              <a:rPr lang="en-US" sz="1400" dirty="0">
+                <a:latin typeface="Courier New" pitchFamily="49" charset="0"/>
+                <a:cs typeface="Courier New" pitchFamily="49" charset="0"/>
+              </a:rPr>
+              <a:t>)       	\    </a:t>
             </a:r>
           </a:p>
           <a:p>
@@ -6129,7 +6138,10 @@
               <a:t>    </a:t>
             </a:r>
             <a:r>
-              <a:rPr lang="en-US" sz="1400" dirty="0" err="1">
+              <a:rPr lang="en-US" sz="1400" b="1" dirty="0" err="1">
+                <a:solidFill>
+                  <a:srgbClr val="3B57A0"/>
+                </a:solidFill>
                 <a:latin typeface="Courier New" pitchFamily="49" charset="0"/>
                 <a:cs typeface="Courier New" pitchFamily="49" charset="0"/>
               </a:rPr>
@@ -8163,7 +8175,10 @@
               <a:t>  SUCCESS_OR_DIE( </a:t>
             </a:r>
             <a:r>
-              <a:rPr lang="en-US" sz="1400" dirty="0" err="1">
+              <a:rPr lang="en-US" sz="1400" b="1" dirty="0" err="1">
+                <a:solidFill>
+                  <a:srgbClr val="3B57A0"/>
+                </a:solidFill>
                 <a:latin typeface="Courier New" pitchFamily="49" charset="0"/>
                 <a:cs typeface="Courier New" pitchFamily="49" charset="0"/>
               </a:rPr>
@@ -8174,7 +8189,24 @@
                 <a:latin typeface="Courier New" pitchFamily="49" charset="0"/>
                 <a:cs typeface="Courier New" pitchFamily="49" charset="0"/>
               </a:rPr>
-              <a:t>(GASPI_BLOCK) );   </a:t>
+              <a:t>(</a:t>
+            </a:r>
+            <a:r>
+              <a:rPr lang="en-US" sz="1400" b="1" dirty="0">
+                <a:solidFill>
+                  <a:srgbClr val="3B57A0"/>
+                </a:solidFill>
+                <a:latin typeface="Courier New" pitchFamily="49" charset="0"/>
+                <a:cs typeface="Courier New" pitchFamily="49" charset="0"/>
+              </a:rPr>
+              <a:t>GASPI_BLOCK</a:t>
+            </a:r>
+            <a:r>
+              <a:rPr lang="en-US" sz="1400" dirty="0">
+                <a:latin typeface="Courier New" pitchFamily="49" charset="0"/>
+                <a:cs typeface="Courier New" pitchFamily="49" charset="0"/>
+              </a:rPr>
+              <a:t>) );   </a:t>
             </a:r>
           </a:p>
           <a:p>
@@ -8202,18 +8234,31 @@
               <a:t>  </a:t>
             </a:r>
             <a:r>
-              <a:rPr lang="en-US" sz="1400" dirty="0" err="1">
+              <a:rPr lang="en-US" sz="1400" b="1" dirty="0" err="1">
+                <a:solidFill>
+                  <a:srgbClr val="3B57A0"/>
+                </a:solidFill>
                 <a:latin typeface="Courier New" pitchFamily="49" charset="0"/>
                 <a:cs typeface="Courier New" pitchFamily="49" charset="0"/>
               </a:rPr>
               <a:t>gaspi_rank_t</a:t>
             </a:r>
             <a:r>
+              <a:rPr lang="en-US" sz="1400" b="1" dirty="0">
+                <a:solidFill>
+                  <a:srgbClr val="3B57A0"/>
+                </a:solidFill>
+                <a:latin typeface="Courier New" pitchFamily="49" charset="0"/>
+                <a:cs typeface="Courier New" pitchFamily="49" charset="0"/>
+              </a:rPr>
+              <a:t> </a:t>
+            </a:r>
+            <a:r>
               <a:rPr lang="en-US" sz="1400" dirty="0">
                 <a:latin typeface="Courier New" pitchFamily="49" charset="0"/>
                 <a:cs typeface="Courier New" pitchFamily="49" charset="0"/>
               </a:rPr>
-              <a:t> rank;</a:t>
+              <a:t>rank;</a:t>
             </a:r>
           </a:p>
           <a:p>
@@ -8230,7 +8275,10 @@
               <a:t>  </a:t>
             </a:r>
             <a:r>
-              <a:rPr lang="en-US" sz="1400" dirty="0" err="1">
+              <a:rPr lang="en-US" sz="1400" b="1" dirty="0" err="1">
+                <a:solidFill>
+                  <a:srgbClr val="3B57A0"/>
+                </a:solidFill>
                 <a:latin typeface="Courier New" pitchFamily="49" charset="0"/>
                 <a:cs typeface="Courier New" pitchFamily="49" charset="0"/>
               </a:rPr>
@@ -8258,7 +8306,10 @@
               <a:t>  SUCCESS_OR_DIE( </a:t>
             </a:r>
             <a:r>
-              <a:rPr lang="en-US" sz="1400" dirty="0" err="1">
+              <a:rPr lang="en-US" sz="1400" b="1" dirty="0" err="1">
+                <a:solidFill>
+                  <a:srgbClr val="3B57A0"/>
+                </a:solidFill>
                 <a:latin typeface="Courier New" pitchFamily="49" charset="0"/>
                 <a:cs typeface="Courier New" pitchFamily="49" charset="0"/>
               </a:rPr>
@@ -8286,7 +8337,10 @@
               <a:t>  SUCCESS_OR_DIE( </a:t>
             </a:r>
             <a:r>
-              <a:rPr lang="en-US" sz="1400" dirty="0" err="1">
+              <a:rPr lang="en-US" sz="1400" b="1" dirty="0" err="1">
+                <a:solidFill>
+                  <a:srgbClr val="3B57A0"/>
+                </a:solidFill>
                 <a:latin typeface="Courier New" pitchFamily="49" charset="0"/>
                 <a:cs typeface="Courier New" pitchFamily="49" charset="0"/>
               </a:rPr>
@@ -8381,7 +8435,10 @@
               <a:t>  SUCCESS_OR_DIE( </a:t>
             </a:r>
             <a:r>
-              <a:rPr lang="en-US" sz="1400" dirty="0" err="1">
+              <a:rPr lang="en-US" sz="1400" b="1" dirty="0" err="1">
+                <a:solidFill>
+                  <a:srgbClr val="3B57A0"/>
+                </a:solidFill>
                 <a:latin typeface="Courier New" pitchFamily="49" charset="0"/>
                 <a:cs typeface="Courier New" pitchFamily="49" charset="0"/>
               </a:rPr>
@@ -8392,7 +8449,24 @@
                 <a:latin typeface="Courier New" pitchFamily="49" charset="0"/>
                 <a:cs typeface="Courier New" pitchFamily="49" charset="0"/>
               </a:rPr>
-              <a:t>(GASPI_BLOCK) );   </a:t>
+              <a:t>(</a:t>
+            </a:r>
+            <a:r>
+              <a:rPr lang="en-US" sz="1400" b="1" dirty="0">
+                <a:solidFill>
+                  <a:srgbClr val="3B57A0"/>
+                </a:solidFill>
+                <a:latin typeface="Courier New" pitchFamily="49" charset="0"/>
+                <a:cs typeface="Courier New" pitchFamily="49" charset="0"/>
+              </a:rPr>
+              <a:t>GASPI_BLOCK</a:t>
+            </a:r>
+            <a:r>
+              <a:rPr lang="en-US" sz="1400" dirty="0">
+                <a:latin typeface="Courier New" pitchFamily="49" charset="0"/>
+                <a:cs typeface="Courier New" pitchFamily="49" charset="0"/>
+              </a:rPr>
+              <a:t>) );   </a:t>
             </a:r>
           </a:p>
           <a:p>
@@ -9650,14 +9724,34 @@
               <a:t>  SUCCESS_OR_DIE( </a:t>
             </a:r>
             <a:r>
-              <a:rPr lang="de-DE" sz="1400" dirty="0" err="1">
+              <a:rPr lang="de-DE" sz="1400" b="1" dirty="0" err="1">
+                <a:solidFill>
+                  <a:srgbClr val="3B57A0"/>
+                </a:solidFill>
+                <a:latin typeface="Courier New" pitchFamily="49" charset="0"/>
+                <a:cs typeface="Courier New" pitchFamily="49" charset="0"/>
+              </a:rPr>
+              <a:t>gaspi_proc_init</a:t>
+            </a:r>
+            <a:r>
+              <a:rPr lang="de-DE" sz="1400" dirty="0">
                 <a:solidFill>
                   <a:srgbClr val="000000"/>
                 </a:solidFill>
                 <a:latin typeface="Courier New" pitchFamily="49" charset="0"/>
                 <a:cs typeface="Courier New" pitchFamily="49" charset="0"/>
               </a:rPr>
-              <a:t>gaspi_proc_init</a:t>
+              <a:t>(</a:t>
+            </a:r>
+            <a:r>
+              <a:rPr lang="de-DE" sz="1400" b="1" dirty="0">
+                <a:solidFill>
+                  <a:srgbClr val="3B57A0"/>
+                </a:solidFill>
+                <a:latin typeface="Courier New" pitchFamily="49" charset="0"/>
+                <a:cs typeface="Courier New" pitchFamily="49" charset="0"/>
+              </a:rPr>
+              <a:t>GASPI_BLOCK</a:t>
             </a:r>
             <a:r>
               <a:rPr lang="de-DE" sz="1400" dirty="0">
@@ -9667,7 +9761,7 @@
                 <a:latin typeface="Courier New" pitchFamily="49" charset="0"/>
                 <a:cs typeface="Courier New" pitchFamily="49" charset="0"/>
               </a:rPr>
-              <a:t>(GASPI_BLOCK) </a:t>
+              <a:t>) </a:t>
             </a:r>
             <a:r>
               <a:rPr lang="de-DE" sz="1400" dirty="0" smtClean="0">
@@ -9694,7 +9788,10 @@
               <a:t>  </a:t>
             </a:r>
             <a:r>
-              <a:rPr lang="en-US" sz="1400" dirty="0" err="1" smtClean="0">
+              <a:rPr lang="en-US" sz="1400" b="1" dirty="0" err="1" smtClean="0">
+                <a:solidFill>
+                  <a:srgbClr val="3B57A0"/>
+                </a:solidFill>
                 <a:latin typeface="Courier New" pitchFamily="49" charset="0"/>
                 <a:cs typeface="Courier New" pitchFamily="49" charset="0"/>
               </a:rPr>
@@ -9750,7 +9847,10 @@
               <a:t>  SUCCESS_OR_DIE( </a:t>
             </a:r>
             <a:r>
-              <a:rPr lang="en-US" sz="1400" dirty="0" err="1" smtClean="0">
+              <a:rPr lang="en-US" sz="1400" b="1" dirty="0" err="1" smtClean="0">
+                <a:solidFill>
+                  <a:srgbClr val="3B57A0"/>
+                </a:solidFill>
                 <a:latin typeface="Courier New" pitchFamily="49" charset="0"/>
                 <a:cs typeface="Courier New" pitchFamily="49" charset="0"/>
               </a:rPr>
@@ -9792,7 +9892,10 @@
               <a:t>  SUCCESS_OR_DIE( </a:t>
             </a:r>
             <a:r>
-              <a:rPr lang="en-US" sz="1400" dirty="0" err="1" smtClean="0">
+              <a:rPr lang="en-US" sz="1400" b="1" dirty="0" err="1" smtClean="0">
+                <a:solidFill>
+                  <a:srgbClr val="3B57A0"/>
+                </a:solidFill>
                 <a:latin typeface="Courier New" pitchFamily="49" charset="0"/>
                 <a:cs typeface="Courier New" pitchFamily="49" charset="0"/>
               </a:rPr>
@@ -9843,9 +9946,9 @@
               <a:t>  </a:t>
             </a:r>
             <a:r>
-              <a:rPr lang="de-DE" sz="1400" dirty="0" err="1">
-                <a:solidFill>
-                  <a:srgbClr val="000000"/>
+              <a:rPr lang="de-DE" sz="1400" b="1" dirty="0" err="1">
+                <a:solidFill>
+                  <a:srgbClr val="3B57A0"/>
                 </a:solidFill>
                 <a:latin typeface="Courier New" pitchFamily="49" charset="0"/>
                 <a:cs typeface="Courier New" pitchFamily="49" charset="0"/>
@@ -9919,24 +10022,34 @@
               <a:t>  </a:t>
             </a:r>
             <a:r>
-              <a:rPr lang="de-DE" sz="1400" dirty="0" err="1">
+              <a:rPr lang="de-DE" sz="1400" b="1" dirty="0" err="1">
+                <a:solidFill>
+                  <a:srgbClr val="3B57A0"/>
+                </a:solidFill>
+                <a:latin typeface="Courier New" pitchFamily="49" charset="0"/>
+                <a:cs typeface="Courier New" pitchFamily="49" charset="0"/>
+              </a:rPr>
+              <a:t>gaspi_size_t</a:t>
+            </a:r>
+            <a:r>
+              <a:rPr lang="de-DE" sz="1400" b="1" dirty="0">
+                <a:solidFill>
+                  <a:srgbClr val="3B57A0"/>
+                </a:solidFill>
+                <a:latin typeface="Courier New" pitchFamily="49" charset="0"/>
+                <a:cs typeface="Courier New" pitchFamily="49" charset="0"/>
+              </a:rPr>
+              <a:t> </a:t>
+            </a:r>
+            <a:r>
+              <a:rPr lang="de-DE" sz="1400" dirty="0">
                 <a:solidFill>
                   <a:srgbClr val="000000"/>
                 </a:solidFill>
                 <a:latin typeface="Courier New" pitchFamily="49" charset="0"/>
                 <a:cs typeface="Courier New" pitchFamily="49" charset="0"/>
               </a:rPr>
-              <a:t>gaspi_size_t</a:t>
-            </a:r>
-            <a:r>
-              <a:rPr lang="de-DE" sz="1400" dirty="0">
-                <a:solidFill>
-                  <a:srgbClr val="000000"/>
-                </a:solidFill>
-                <a:latin typeface="Courier New" pitchFamily="49" charset="0"/>
-                <a:cs typeface="Courier New" pitchFamily="49" charset="0"/>
-              </a:rPr>
-              <a:t>       </a:t>
+              <a:t>      </a:t>
             </a:r>
             <a:r>
               <a:rPr lang="de-DE" sz="1400" dirty="0" err="1">
@@ -10028,6 +10141,26 @@
               <a:t>  SUCCESS_OR_DIE ( </a:t>
             </a:r>
             <a:r>
+              <a:rPr lang="de-DE" sz="1400" b="1" dirty="0" err="1">
+                <a:solidFill>
+                  <a:srgbClr val="3B57A0"/>
+                </a:solidFill>
+                <a:latin typeface="Courier New" pitchFamily="49" charset="0"/>
+                <a:cs typeface="Courier New" pitchFamily="49" charset="0"/>
+              </a:rPr>
+              <a:t>gaspi_segment_create</a:t>
+            </a:r>
+            <a:r>
+              <a:rPr lang="de-DE" sz="1400" dirty="0">
+                <a:solidFill>
+                  <a:srgbClr val="000000"/>
+                </a:solidFill>
+                <a:latin typeface="Courier New" pitchFamily="49" charset="0"/>
+                <a:cs typeface="Courier New" pitchFamily="49" charset="0"/>
+              </a:rPr>
+              <a:t> ( </a:t>
+            </a:r>
+            <a:r>
               <a:rPr lang="de-DE" sz="1400" dirty="0" err="1">
                 <a:solidFill>
                   <a:srgbClr val="000000"/>
@@ -10035,7 +10168,7 @@
                 <a:latin typeface="Courier New" pitchFamily="49" charset="0"/>
                 <a:cs typeface="Courier New" pitchFamily="49" charset="0"/>
               </a:rPr>
-              <a:t>gaspi_segment_create</a:t>
+              <a:t>segment_id</a:t>
             </a:r>
             <a:r>
               <a:rPr lang="de-DE" sz="1400" dirty="0">
@@ -10045,7 +10178,7 @@
                 <a:latin typeface="Courier New" pitchFamily="49" charset="0"/>
                 <a:cs typeface="Courier New" pitchFamily="49" charset="0"/>
               </a:rPr>
-              <a:t> ( </a:t>
+              <a:t>, </a:t>
             </a:r>
             <a:r>
               <a:rPr lang="de-DE" sz="1400" dirty="0" err="1">
@@ -10055,7 +10188,7 @@
                 <a:latin typeface="Courier New" pitchFamily="49" charset="0"/>
                 <a:cs typeface="Courier New" pitchFamily="49" charset="0"/>
               </a:rPr>
-              <a:t>segment_id</a:t>
+              <a:t>segment_size</a:t>
             </a:r>
             <a:r>
               <a:rPr lang="de-DE" sz="1400" dirty="0">
@@ -10065,27 +10198,37 @@
                 <a:latin typeface="Courier New" pitchFamily="49" charset="0"/>
                 <a:cs typeface="Courier New" pitchFamily="49" charset="0"/>
               </a:rPr>
+              <a:t>                            								      , </a:t>
+            </a:r>
+            <a:r>
+              <a:rPr lang="de-DE" sz="1400" b="1" dirty="0">
+                <a:solidFill>
+                  <a:srgbClr val="3B57A0"/>
+                </a:solidFill>
+                <a:latin typeface="Courier New" pitchFamily="49" charset="0"/>
+                <a:cs typeface="Courier New" pitchFamily="49" charset="0"/>
+              </a:rPr>
+              <a:t>GASPI_GROUP_ALL</a:t>
+            </a:r>
+            <a:r>
+              <a:rPr lang="de-DE" sz="1400" dirty="0">
+                <a:solidFill>
+                  <a:srgbClr val="000000"/>
+                </a:solidFill>
+                <a:latin typeface="Courier New" pitchFamily="49" charset="0"/>
+                <a:cs typeface="Courier New" pitchFamily="49" charset="0"/>
+              </a:rPr>
               <a:t>, </a:t>
             </a:r>
             <a:r>
-              <a:rPr lang="de-DE" sz="1400" dirty="0" err="1">
-                <a:solidFill>
-                  <a:srgbClr val="000000"/>
-                </a:solidFill>
-                <a:latin typeface="Courier New" pitchFamily="49" charset="0"/>
-                <a:cs typeface="Courier New" pitchFamily="49" charset="0"/>
-              </a:rPr>
-              <a:t>segment_size</a:t>
-            </a:r>
-            <a:r>
-              <a:rPr lang="de-DE" sz="1400" dirty="0">
-                <a:solidFill>
-                  <a:srgbClr val="000000"/>
-                </a:solidFill>
-                <a:latin typeface="Courier New" pitchFamily="49" charset="0"/>
-                <a:cs typeface="Courier New" pitchFamily="49" charset="0"/>
-              </a:rPr>
-              <a:t>                            								      , GASPI_GROUP_ALL, GASPI_BLOCK</a:t>
+              <a:rPr lang="de-DE" sz="1400" b="1" dirty="0">
+                <a:solidFill>
+                  <a:srgbClr val="3B57A0"/>
+                </a:solidFill>
+                <a:latin typeface="Courier New" pitchFamily="49" charset="0"/>
+                <a:cs typeface="Courier New" pitchFamily="49" charset="0"/>
+              </a:rPr>
+              <a:t>GASPI_BLOCK</a:t>
             </a:r>
           </a:p>
           <a:p>
@@ -10101,7 +10244,27 @@
                 <a:latin typeface="Courier New" pitchFamily="49" charset="0"/>
                 <a:cs typeface="Courier New" pitchFamily="49" charset="0"/>
               </a:rPr>
-              <a:t>                                        , GASPI_MEM_UNINITIALIZED ) );</a:t>
+              <a:t>                                        , </a:t>
+            </a:r>
+            <a:r>
+              <a:rPr lang="de-DE" sz="1400" b="1" dirty="0">
+                <a:solidFill>
+                  <a:srgbClr val="3B57A0"/>
+                </a:solidFill>
+                <a:latin typeface="Courier New" pitchFamily="49" charset="0"/>
+                <a:cs typeface="Courier New" pitchFamily="49" charset="0"/>
+              </a:rPr>
+              <a:t>GASPI_MEM_UNINITIALIZED</a:t>
+            </a:r>
+            <a:r>
+              <a:rPr lang="de-DE" sz="1400" dirty="0">
+                <a:solidFill>
+                  <a:srgbClr val="000000"/>
+                </a:solidFill>
+                <a:latin typeface="Courier New" pitchFamily="49" charset="0"/>
+                <a:cs typeface="Courier New" pitchFamily="49" charset="0"/>
+              </a:rPr>
+              <a:t> ) );</a:t>
             </a:r>
           </a:p>
           <a:p>
@@ -10120,9 +10283,9 @@
               <a:t>  </a:t>
             </a:r>
             <a:r>
-              <a:rPr lang="de-DE" sz="1400" dirty="0" err="1">
-                <a:solidFill>
-                  <a:schemeClr val="tx1"/>
+              <a:rPr lang="de-DE" sz="1400" b="1" dirty="0" err="1">
+                <a:solidFill>
+                  <a:srgbClr val="3B57A0"/>
                 </a:solidFill>
                 <a:latin typeface="Courier New" pitchFamily="49" charset="0"/>
                 <a:cs typeface="Arial" charset="0"/>
@@ -10176,9 +10339,9 @@
               <a:t>  SUCCESS_OR_DIE ( </a:t>
             </a:r>
             <a:r>
-              <a:rPr lang="de-DE" sz="1400" dirty="0" err="1">
-                <a:solidFill>
-                  <a:schemeClr val="tx1"/>
+              <a:rPr lang="de-DE" sz="1400" b="1" dirty="0" err="1">
+                <a:solidFill>
+                  <a:srgbClr val="3B57A0"/>
                 </a:solidFill>
                 <a:latin typeface="Courier New" pitchFamily="49" charset="0"/>
                 <a:cs typeface="Arial" charset="0"/>
@@ -10711,14 +10874,54 @@
               <a:defRPr/>
             </a:pPr>
             <a:r>
-              <a:rPr lang="en-US" sz="1400">
+              <a:rPr lang="en-US" sz="1400" dirty="0">
                 <a:solidFill>
                   <a:srgbClr val="000000"/>
                 </a:solidFill>
                 <a:latin typeface="Courier New" pitchFamily="49" charset="0"/>
                 <a:cs typeface="Courier New" pitchFamily="49" charset="0"/>
               </a:rPr>
-              <a:t>  gaspi_notification_id_t data_available = 0;  </a:t>
+              <a:t>  </a:t>
+            </a:r>
+            <a:r>
+              <a:rPr lang="en-US" sz="1400" dirty="0" err="1">
+                <a:solidFill>
+                  <a:srgbClr val="000000"/>
+                </a:solidFill>
+                <a:latin typeface="Courier New" pitchFamily="49" charset="0"/>
+                <a:cs typeface="Courier New" pitchFamily="49" charset="0"/>
+              </a:rPr>
+              <a:t>gaspi_notification_id_t</a:t>
+            </a:r>
+            <a:r>
+              <a:rPr lang="en-US" sz="1400" dirty="0">
+                <a:solidFill>
+                  <a:srgbClr val="000000"/>
+                </a:solidFill>
+                <a:latin typeface="Courier New" pitchFamily="49" charset="0"/>
+                <a:cs typeface="Courier New" pitchFamily="49" charset="0"/>
+              </a:rPr>
+              <a:t> </a:t>
+            </a:r>
+            <a:r>
+              <a:rPr lang="en-US" sz="1400" dirty="0" err="1">
+                <a:solidFill>
+                  <a:srgbClr val="000000"/>
+                </a:solidFill>
+                <a:latin typeface="Courier New" pitchFamily="49" charset="0"/>
+                <a:cs typeface="Courier New" pitchFamily="49" charset="0"/>
+              </a:rPr>
+              <a:t>data_available</a:t>
+            </a:r>
+            <a:r>
+              <a:rPr lang="en-US" sz="1400" dirty="0">
+                <a:solidFill>
+                  <a:srgbClr val="000000"/>
+                </a:solidFill>
+                <a:latin typeface="Courier New" pitchFamily="49" charset="0"/>
+                <a:cs typeface="Courier New" pitchFamily="49" charset="0"/>
+              </a:rPr>
+              <a:t> = 0;  </a:t>
             </a:r>
           </a:p>
           <a:p>
@@ -10728,14 +10931,54 @@
               <a:defRPr/>
             </a:pPr>
             <a:r>
-              <a:rPr lang="en-US" sz="1400">
+              <a:rPr lang="en-US" sz="1400" dirty="0">
                 <a:solidFill>
                   <a:srgbClr val="000000"/>
                 </a:solidFill>
                 <a:latin typeface="Courier New" pitchFamily="49" charset="0"/>
                 <a:cs typeface="Courier New" pitchFamily="49" charset="0"/>
               </a:rPr>
-              <a:t>  gaspi_queue_id_t queue_id = 0;   </a:t>
+              <a:t>  </a:t>
+            </a:r>
+            <a:r>
+              <a:rPr lang="en-US" sz="1400" dirty="0" err="1">
+                <a:solidFill>
+                  <a:srgbClr val="000000"/>
+                </a:solidFill>
+                <a:latin typeface="Courier New" pitchFamily="49" charset="0"/>
+                <a:cs typeface="Courier New" pitchFamily="49" charset="0"/>
+              </a:rPr>
+              <a:t>gaspi_queue_id_t</a:t>
+            </a:r>
+            <a:r>
+              <a:rPr lang="en-US" sz="1400" dirty="0">
+                <a:solidFill>
+                  <a:srgbClr val="000000"/>
+                </a:solidFill>
+                <a:latin typeface="Courier New" pitchFamily="49" charset="0"/>
+                <a:cs typeface="Courier New" pitchFamily="49" charset="0"/>
+              </a:rPr>
+              <a:t> </a:t>
+            </a:r>
+            <a:r>
+              <a:rPr lang="en-US" sz="1400" dirty="0" err="1">
+                <a:solidFill>
+                  <a:srgbClr val="000000"/>
+                </a:solidFill>
+                <a:latin typeface="Courier New" pitchFamily="49" charset="0"/>
+                <a:cs typeface="Courier New" pitchFamily="49" charset="0"/>
+              </a:rPr>
+              <a:t>queue_id</a:t>
+            </a:r>
+            <a:r>
+              <a:rPr lang="en-US" sz="1400" dirty="0">
+                <a:solidFill>
+                  <a:srgbClr val="000000"/>
+                </a:solidFill>
+                <a:latin typeface="Courier New" pitchFamily="49" charset="0"/>
+                <a:cs typeface="Courier New" pitchFamily="49" charset="0"/>
+              </a:rPr>
+              <a:t> = 0;   </a:t>
             </a:r>
           </a:p>
           <a:p>
@@ -10745,14 +10988,54 @@
               <a:defRPr/>
             </a:pPr>
             <a:r>
-              <a:rPr lang="en-US" sz="1400">
+              <a:rPr lang="en-US" sz="1400" dirty="0">
                 <a:solidFill>
                   <a:srgbClr val="000000"/>
                 </a:solidFill>
                 <a:latin typeface="Courier New" pitchFamily="49" charset="0"/>
                 <a:cs typeface="Courier New" pitchFamily="49" charset="0"/>
               </a:rPr>
-              <a:t>  gaspi_offset_t loc_off = 0; </a:t>
+              <a:t>  </a:t>
+            </a:r>
+            <a:r>
+              <a:rPr lang="en-US" sz="1400" dirty="0" err="1">
+                <a:solidFill>
+                  <a:srgbClr val="000000"/>
+                </a:solidFill>
+                <a:latin typeface="Courier New" pitchFamily="49" charset="0"/>
+                <a:cs typeface="Courier New" pitchFamily="49" charset="0"/>
+              </a:rPr>
+              <a:t>gaspi_offset_t</a:t>
+            </a:r>
+            <a:r>
+              <a:rPr lang="en-US" sz="1400" dirty="0">
+                <a:solidFill>
+                  <a:srgbClr val="000000"/>
+                </a:solidFill>
+                <a:latin typeface="Courier New" pitchFamily="49" charset="0"/>
+                <a:cs typeface="Courier New" pitchFamily="49" charset="0"/>
+              </a:rPr>
+              <a:t> </a:t>
+            </a:r>
+            <a:r>
+              <a:rPr lang="en-US" sz="1400" dirty="0" err="1">
+                <a:solidFill>
+                  <a:srgbClr val="000000"/>
+                </a:solidFill>
+                <a:latin typeface="Courier New" pitchFamily="49" charset="0"/>
+                <a:cs typeface="Courier New" pitchFamily="49" charset="0"/>
+              </a:rPr>
+              <a:t>loc_off</a:t>
+            </a:r>
+            <a:r>
+              <a:rPr lang="en-US" sz="1400" dirty="0">
+                <a:solidFill>
+                  <a:srgbClr val="000000"/>
+                </a:solidFill>
+                <a:latin typeface="Courier New" pitchFamily="49" charset="0"/>
+                <a:cs typeface="Courier New" pitchFamily="49" charset="0"/>
+              </a:rPr>
+              <a:t> = 0; </a:t>
             </a:r>
           </a:p>
           <a:p>
@@ -10762,14 +11045,74 @@
               <a:defRPr/>
             </a:pPr>
             <a:r>
-              <a:rPr lang="en-US" sz="1400">
+              <a:rPr lang="en-US" sz="1400" dirty="0">
                 <a:solidFill>
                   <a:srgbClr val="000000"/>
                 </a:solidFill>
                 <a:latin typeface="Courier New" pitchFamily="49" charset="0"/>
                 <a:cs typeface="Courier New" pitchFamily="49" charset="0"/>
               </a:rPr>
-              <a:t>  gaspi_offset_t rem_off = VLEN * sizeof (double);  </a:t>
+              <a:t>  </a:t>
+            </a:r>
+            <a:r>
+              <a:rPr lang="en-US" sz="1400" dirty="0" err="1">
+                <a:solidFill>
+                  <a:srgbClr val="000000"/>
+                </a:solidFill>
+                <a:latin typeface="Courier New" pitchFamily="49" charset="0"/>
+                <a:cs typeface="Courier New" pitchFamily="49" charset="0"/>
+              </a:rPr>
+              <a:t>gaspi_offset_t</a:t>
+            </a:r>
+            <a:r>
+              <a:rPr lang="en-US" sz="1400" dirty="0">
+                <a:solidFill>
+                  <a:srgbClr val="000000"/>
+                </a:solidFill>
+                <a:latin typeface="Courier New" pitchFamily="49" charset="0"/>
+                <a:cs typeface="Courier New" pitchFamily="49" charset="0"/>
+              </a:rPr>
+              <a:t> </a:t>
+            </a:r>
+            <a:r>
+              <a:rPr lang="en-US" sz="1400" dirty="0" err="1">
+                <a:solidFill>
+                  <a:srgbClr val="000000"/>
+                </a:solidFill>
+                <a:latin typeface="Courier New" pitchFamily="49" charset="0"/>
+                <a:cs typeface="Courier New" pitchFamily="49" charset="0"/>
+              </a:rPr>
+              <a:t>rem_off</a:t>
+            </a:r>
+            <a:r>
+              <a:rPr lang="en-US" sz="1400" dirty="0">
+                <a:solidFill>
+                  <a:srgbClr val="000000"/>
+                </a:solidFill>
+                <a:latin typeface="Courier New" pitchFamily="49" charset="0"/>
+                <a:cs typeface="Courier New" pitchFamily="49" charset="0"/>
+              </a:rPr>
+              <a:t> = VLEN * </a:t>
+            </a:r>
+            <a:r>
+              <a:rPr lang="en-US" sz="1400" dirty="0" err="1">
+                <a:solidFill>
+                  <a:srgbClr val="000000"/>
+                </a:solidFill>
+                <a:latin typeface="Courier New" pitchFamily="49" charset="0"/>
+                <a:cs typeface="Courier New" pitchFamily="49" charset="0"/>
+              </a:rPr>
+              <a:t>sizeof</a:t>
+            </a:r>
+            <a:r>
+              <a:rPr lang="en-US" sz="1400" dirty="0">
+                <a:solidFill>
+                  <a:srgbClr val="000000"/>
+                </a:solidFill>
+                <a:latin typeface="Courier New" pitchFamily="49" charset="0"/>
+                <a:cs typeface="Courier New" pitchFamily="49" charset="0"/>
+              </a:rPr>
+              <a:t> (double);  </a:t>
             </a:r>
           </a:p>
           <a:p>
@@ -10778,7 +11121,7 @@
               <a:buNone/>
               <a:defRPr/>
             </a:pPr>
-            <a:endParaRPr lang="en-US" sz="1400">
+            <a:endParaRPr lang="en-US" sz="1400" dirty="0">
               <a:solidFill>
                 <a:srgbClr val="000000"/>
               </a:solidFill>
@@ -10793,14 +11136,54 @@
               <a:defRPr/>
             </a:pPr>
             <a:r>
-              <a:rPr lang="en-US" sz="1400">
+              <a:rPr lang="en-US" sz="1400" dirty="0">
                 <a:solidFill>
                   <a:srgbClr val="000000"/>
                 </a:solidFill>
                 <a:latin typeface="Courier New" pitchFamily="49" charset="0"/>
                 <a:cs typeface="Courier New" pitchFamily="49" charset="0"/>
               </a:rPr>
-              <a:t>  wait_for_queue_entries_for_write_notify ( &amp;queue_id );  </a:t>
+              <a:t>  </a:t>
+            </a:r>
+            <a:r>
+              <a:rPr lang="en-US" sz="1400" dirty="0" err="1">
+                <a:solidFill>
+                  <a:srgbClr val="000000"/>
+                </a:solidFill>
+                <a:latin typeface="Courier New" pitchFamily="49" charset="0"/>
+                <a:cs typeface="Courier New" pitchFamily="49" charset="0"/>
+              </a:rPr>
+              <a:t>wait_for_queue_entries_for_write_notify</a:t>
+            </a:r>
+            <a:r>
+              <a:rPr lang="en-US" sz="1400" dirty="0">
+                <a:solidFill>
+                  <a:srgbClr val="000000"/>
+                </a:solidFill>
+                <a:latin typeface="Courier New" pitchFamily="49" charset="0"/>
+                <a:cs typeface="Courier New" pitchFamily="49" charset="0"/>
+              </a:rPr>
+              <a:t> ( &amp;</a:t>
+            </a:r>
+            <a:r>
+              <a:rPr lang="en-US" sz="1400" dirty="0" err="1">
+                <a:solidFill>
+                  <a:srgbClr val="000000"/>
+                </a:solidFill>
+                <a:latin typeface="Courier New" pitchFamily="49" charset="0"/>
+                <a:cs typeface="Courier New" pitchFamily="49" charset="0"/>
+              </a:rPr>
+              <a:t>queue_id</a:t>
+            </a:r>
+            <a:r>
+              <a:rPr lang="en-US" sz="1400" dirty="0">
+                <a:solidFill>
+                  <a:srgbClr val="000000"/>
+                </a:solidFill>
+                <a:latin typeface="Courier New" pitchFamily="49" charset="0"/>
+                <a:cs typeface="Courier New" pitchFamily="49" charset="0"/>
+              </a:rPr>
+              <a:t> );  </a:t>
             </a:r>
           </a:p>
           <a:p>
@@ -10810,125 +11193,66 @@
               <a:defRPr/>
             </a:pPr>
             <a:r>
-              <a:rPr lang="en-US" sz="1400">
+              <a:rPr lang="en-US" sz="1400" dirty="0">
                 <a:solidFill>
                   <a:srgbClr val="000000"/>
                 </a:solidFill>
                 <a:latin typeface="Courier New" pitchFamily="49" charset="0"/>
                 <a:cs typeface="Courier New" pitchFamily="49" charset="0"/>
               </a:rPr>
-              <a:t>  SUCCESS_OR_DIE ( gaspi_write_notify ( segment_id, loc_off</a:t>
-            </a:r>
-          </a:p>
-          <a:p>
-            <a:pPr>
-              <a:buFont typeface="Arial" charset="0"/>
-              <a:buNone/>
-              <a:defRPr/>
-            </a:pPr>
-            <a:r>
-              <a:rPr lang="en-US" sz="1400">
+              <a:t>  SUCCESS_OR_DIE ( </a:t>
+            </a:r>
+            <a:r>
+              <a:rPr lang="en-US" sz="1400" b="1" dirty="0" err="1">
+                <a:solidFill>
+                  <a:srgbClr val="3B57A0"/>
+                </a:solidFill>
+                <a:latin typeface="Courier New" pitchFamily="49" charset="0"/>
+                <a:cs typeface="Courier New" pitchFamily="49" charset="0"/>
+              </a:rPr>
+              <a:t>gaspi_write_notify</a:t>
+            </a:r>
+            <a:r>
+              <a:rPr lang="en-US" sz="1400" dirty="0">
                 <a:solidFill>
                   <a:srgbClr val="000000"/>
                 </a:solidFill>
                 <a:latin typeface="Courier New" pitchFamily="49" charset="0"/>
                 <a:cs typeface="Courier New" pitchFamily="49" charset="0"/>
               </a:rPr>
-              <a:t>                                      , RIGHT (iProc, nProc)             </a:t>
-            </a:r>
-          </a:p>
-          <a:p>
-            <a:pPr>
-              <a:buFont typeface="Arial" charset="0"/>
-              <a:buNone/>
-              <a:defRPr/>
-            </a:pPr>
-            <a:r>
-              <a:rPr lang="en-US" sz="1400">
+              <a:t> ( </a:t>
+            </a:r>
+            <a:r>
+              <a:rPr lang="en-US" sz="1400" dirty="0" err="1">
                 <a:solidFill>
                   <a:srgbClr val="000000"/>
                 </a:solidFill>
                 <a:latin typeface="Courier New" pitchFamily="49" charset="0"/>
                 <a:cs typeface="Courier New" pitchFamily="49" charset="0"/>
               </a:rPr>
-              <a:t>                                      , segment_id, rem_off</a:t>
-            </a:r>
-          </a:p>
-          <a:p>
-            <a:pPr>
-              <a:buFont typeface="Arial" charset="0"/>
-              <a:buNone/>
-              <a:defRPr/>
-            </a:pPr>
-            <a:r>
-              <a:rPr lang="en-US" sz="1400">
+              <a:t>segment_id</a:t>
+            </a:r>
+            <a:r>
+              <a:rPr lang="en-US" sz="1400" dirty="0">
                 <a:solidFill>
                   <a:srgbClr val="000000"/>
                 </a:solidFill>
                 <a:latin typeface="Courier New" pitchFamily="49" charset="0"/>
                 <a:cs typeface="Courier New" pitchFamily="49" charset="0"/>
               </a:rPr>
-              <a:t>                                      , VLEN * sizeof (double)              </a:t>
-            </a:r>
-          </a:p>
-          <a:p>
-            <a:pPr>
-              <a:buFont typeface="Arial" charset="0"/>
-              <a:buNone/>
-              <a:defRPr/>
-            </a:pPr>
-            <a:r>
-              <a:rPr lang="en-US" sz="1400">
+              <a:t>, </a:t>
+            </a:r>
+            <a:r>
+              <a:rPr lang="en-US" sz="1400" dirty="0" err="1">
                 <a:solidFill>
                   <a:srgbClr val="000000"/>
                 </a:solidFill>
                 <a:latin typeface="Courier New" pitchFamily="49" charset="0"/>
                 <a:cs typeface="Courier New" pitchFamily="49" charset="0"/>
               </a:rPr>
-              <a:t>                                      , data_available, 1 + iProc, queue_id</a:t>
-            </a:r>
-          </a:p>
-          <a:p>
-            <a:pPr>
-              <a:buFont typeface="Arial" charset="0"/>
-              <a:buNone/>
-              <a:defRPr/>
-            </a:pPr>
-            <a:r>
-              <a:rPr lang="en-US" sz="1400">
-                <a:solidFill>
-                  <a:srgbClr val="000000"/>
-                </a:solidFill>
-                <a:latin typeface="Courier New" pitchFamily="49" charset="0"/>
-                <a:cs typeface="Courier New" pitchFamily="49" charset="0"/>
-              </a:rPr>
-              <a:t>                                      , GASPI_BLOCK )  );  </a:t>
-            </a:r>
-          </a:p>
-          <a:p>
-            <a:pPr>
-              <a:buFont typeface="Arial" charset="0"/>
-              <a:buNone/>
-              <a:defRPr/>
-            </a:pPr>
-            <a:r>
-              <a:rPr lang="en-US" sz="1400">
-                <a:solidFill>
-                  <a:srgbClr val="000000"/>
-                </a:solidFill>
-                <a:latin typeface="Courier New" pitchFamily="49" charset="0"/>
-                <a:cs typeface="Courier New" pitchFamily="49" charset="0"/>
-              </a:rPr>
-              <a:t>  wait_or_die (segment_id, data_available, 1 + LEFT (iProc, nProc) );   </a:t>
-            </a:r>
-          </a:p>
-          <a:p>
-            <a:pPr>
-              <a:buFont typeface="Arial" charset="0"/>
-              <a:buNone/>
-              <a:defRPr/>
-            </a:pPr>
-            <a:endParaRPr lang="en-US" sz="1400">
+              <a:t>loc_off</a:t>
+            </a:r>
+            <a:endParaRPr lang="en-US" sz="1400" dirty="0">
               <a:solidFill>
                 <a:srgbClr val="000000"/>
               </a:solidFill>
@@ -10943,14 +11267,54 @@
               <a:defRPr/>
             </a:pPr>
             <a:r>
-              <a:rPr lang="en-US" sz="1400">
+              <a:rPr lang="en-US" sz="1400" dirty="0">
                 <a:solidFill>
                   <a:srgbClr val="000000"/>
                 </a:solidFill>
                 <a:latin typeface="Courier New" pitchFamily="49" charset="0"/>
                 <a:cs typeface="Courier New" pitchFamily="49" charset="0"/>
               </a:rPr>
-              <a:t>  for (int j = 0; j &lt; VLEN; ++j)    </a:t>
+              <a:t>                                      , RIGHT (</a:t>
+            </a:r>
+            <a:r>
+              <a:rPr lang="en-US" sz="1400" dirty="0" err="1">
+                <a:solidFill>
+                  <a:srgbClr val="000000"/>
+                </a:solidFill>
+                <a:latin typeface="Courier New" pitchFamily="49" charset="0"/>
+                <a:cs typeface="Courier New" pitchFamily="49" charset="0"/>
+              </a:rPr>
+              <a:t>iProc</a:t>
+            </a:r>
+            <a:r>
+              <a:rPr lang="en-US" sz="1400" dirty="0">
+                <a:solidFill>
+                  <a:srgbClr val="000000"/>
+                </a:solidFill>
+                <a:latin typeface="Courier New" pitchFamily="49" charset="0"/>
+                <a:cs typeface="Courier New" pitchFamily="49" charset="0"/>
+              </a:rPr>
+              <a:t>, </a:t>
+            </a:r>
+            <a:r>
+              <a:rPr lang="en-US" sz="1400" dirty="0" err="1">
+                <a:solidFill>
+                  <a:srgbClr val="000000"/>
+                </a:solidFill>
+                <a:latin typeface="Courier New" pitchFamily="49" charset="0"/>
+                <a:cs typeface="Courier New" pitchFamily="49" charset="0"/>
+              </a:rPr>
+              <a:t>nProc</a:t>
+            </a:r>
+            <a:r>
+              <a:rPr lang="en-US" sz="1400" dirty="0">
+                <a:solidFill>
+                  <a:srgbClr val="000000"/>
+                </a:solidFill>
+                <a:latin typeface="Courier New" pitchFamily="49" charset="0"/>
+                <a:cs typeface="Courier New" pitchFamily="49" charset="0"/>
+              </a:rPr>
+              <a:t>)             </a:t>
             </a:r>
           </a:p>
           <a:p>
@@ -10960,23 +11324,46 @@
               <a:defRPr/>
             </a:pPr>
             <a:r>
-              <a:rPr lang="en-US" sz="1400">
+              <a:rPr lang="en-US" sz="1400" dirty="0">
                 <a:solidFill>
                   <a:srgbClr val="000000"/>
                 </a:solidFill>
                 <a:latin typeface="Courier New" pitchFamily="49" charset="0"/>
                 <a:cs typeface="Courier New" pitchFamily="49" charset="0"/>
               </a:rPr>
-              <a:t>  { gaspi_printf("rank %d rcv elem %d: %f \n", iProc,j,rcv_array[j] );    }    </a:t>
-            </a:r>
-          </a:p>
-          <a:p>
-            <a:pPr>
-              <a:buFont typeface="Arial" charset="0"/>
-              <a:buNone/>
-              <a:defRPr/>
-            </a:pPr>
-            <a:endParaRPr lang="en-US" sz="1400">
+              <a:t>                                      , </a:t>
+            </a:r>
+            <a:r>
+              <a:rPr lang="en-US" sz="1400" dirty="0" err="1">
+                <a:solidFill>
+                  <a:srgbClr val="000000"/>
+                </a:solidFill>
+                <a:latin typeface="Courier New" pitchFamily="49" charset="0"/>
+                <a:cs typeface="Courier New" pitchFamily="49" charset="0"/>
+              </a:rPr>
+              <a:t>segment_id</a:t>
+            </a:r>
+            <a:r>
+              <a:rPr lang="en-US" sz="1400" dirty="0">
+                <a:solidFill>
+                  <a:srgbClr val="000000"/>
+                </a:solidFill>
+                <a:latin typeface="Courier New" pitchFamily="49" charset="0"/>
+                <a:cs typeface="Courier New" pitchFamily="49" charset="0"/>
+              </a:rPr>
+              <a:t>, </a:t>
+            </a:r>
+            <a:r>
+              <a:rPr lang="en-US" sz="1400" dirty="0" err="1">
+                <a:solidFill>
+                  <a:srgbClr val="000000"/>
+                </a:solidFill>
+                <a:latin typeface="Courier New" pitchFamily="49" charset="0"/>
+                <a:cs typeface="Courier New" pitchFamily="49" charset="0"/>
+              </a:rPr>
+              <a:t>rem_off</a:t>
+            </a:r>
+            <a:endParaRPr lang="en-US" sz="1400" dirty="0">
               <a:solidFill>
                 <a:srgbClr val="000000"/>
               </a:solidFill>
@@ -10991,14 +11378,34 @@
               <a:defRPr/>
             </a:pPr>
             <a:r>
-              <a:rPr lang="en-US" sz="1400">
+              <a:rPr lang="en-US" sz="1400" dirty="0">
                 <a:solidFill>
                   <a:srgbClr val="000000"/>
                 </a:solidFill>
                 <a:latin typeface="Courier New" pitchFamily="49" charset="0"/>
                 <a:cs typeface="Courier New" pitchFamily="49" charset="0"/>
               </a:rPr>
-              <a:t>  wait_for_flush_queues();   </a:t>
+              <a:t>                                      , VLEN * </a:t>
+            </a:r>
+            <a:r>
+              <a:rPr lang="en-US" sz="1400" dirty="0" err="1">
+                <a:solidFill>
+                  <a:srgbClr val="000000"/>
+                </a:solidFill>
+                <a:latin typeface="Courier New" pitchFamily="49" charset="0"/>
+                <a:cs typeface="Courier New" pitchFamily="49" charset="0"/>
+              </a:rPr>
+              <a:t>sizeof</a:t>
+            </a:r>
+            <a:r>
+              <a:rPr lang="en-US" sz="1400" dirty="0">
+                <a:solidFill>
+                  <a:srgbClr val="000000"/>
+                </a:solidFill>
+                <a:latin typeface="Courier New" pitchFamily="49" charset="0"/>
+                <a:cs typeface="Courier New" pitchFamily="49" charset="0"/>
+              </a:rPr>
+              <a:t> (double)              </a:t>
             </a:r>
           </a:p>
           <a:p>
@@ -11008,15 +11415,72 @@
               <a:defRPr/>
             </a:pPr>
             <a:r>
-              <a:rPr lang="en-US" sz="1400">
+              <a:rPr lang="en-US" sz="1400" dirty="0">
                 <a:solidFill>
                   <a:srgbClr val="000000"/>
                 </a:solidFill>
                 <a:latin typeface="Courier New" pitchFamily="49" charset="0"/>
                 <a:cs typeface="Courier New" pitchFamily="49" charset="0"/>
               </a:rPr>
-              <a:t>  SUCCESS_OR_DIE( gaspi_proc_term(GASPI_BLOCK) );   </a:t>
-            </a:r>
+              <a:t>                                      , </a:t>
+            </a:r>
+            <a:r>
+              <a:rPr lang="en-US" sz="1400" dirty="0" err="1">
+                <a:solidFill>
+                  <a:srgbClr val="000000"/>
+                </a:solidFill>
+                <a:latin typeface="Courier New" pitchFamily="49" charset="0"/>
+                <a:cs typeface="Courier New" pitchFamily="49" charset="0"/>
+              </a:rPr>
+              <a:t>data_available</a:t>
+            </a:r>
+            <a:r>
+              <a:rPr lang="en-US" sz="1400" dirty="0">
+                <a:solidFill>
+                  <a:srgbClr val="000000"/>
+                </a:solidFill>
+                <a:latin typeface="Courier New" pitchFamily="49" charset="0"/>
+                <a:cs typeface="Courier New" pitchFamily="49" charset="0"/>
+              </a:rPr>
+              <a:t>, 1 + </a:t>
+            </a:r>
+            <a:r>
+              <a:rPr lang="en-US" sz="1400" dirty="0" err="1">
+                <a:solidFill>
+                  <a:srgbClr val="000000"/>
+                </a:solidFill>
+                <a:latin typeface="Courier New" pitchFamily="49" charset="0"/>
+                <a:cs typeface="Courier New" pitchFamily="49" charset="0"/>
+              </a:rPr>
+              <a:t>iProc</a:t>
+            </a:r>
+            <a:r>
+              <a:rPr lang="en-US" sz="1400" dirty="0">
+                <a:solidFill>
+                  <a:srgbClr val="000000"/>
+                </a:solidFill>
+                <a:latin typeface="Courier New" pitchFamily="49" charset="0"/>
+                <a:cs typeface="Courier New" pitchFamily="49" charset="0"/>
+              </a:rPr>
+              <a:t>, </a:t>
+            </a:r>
+            <a:r>
+              <a:rPr lang="en-US" sz="1400" dirty="0" err="1">
+                <a:solidFill>
+                  <a:srgbClr val="000000"/>
+                </a:solidFill>
+                <a:latin typeface="Courier New" pitchFamily="49" charset="0"/>
+                <a:cs typeface="Courier New" pitchFamily="49" charset="0"/>
+              </a:rPr>
+              <a:t>queue_id</a:t>
+            </a:r>
+            <a:endParaRPr lang="en-US" sz="1400" dirty="0">
+              <a:solidFill>
+                <a:srgbClr val="000000"/>
+              </a:solidFill>
+              <a:latin typeface="Courier New" pitchFamily="49" charset="0"/>
+              <a:cs typeface="Courier New" pitchFamily="49" charset="0"/>
+            </a:endParaRPr>
           </a:p>
           <a:p>
             <a:pPr>
@@ -11025,14 +11489,34 @@
               <a:defRPr/>
             </a:pPr>
             <a:r>
-              <a:rPr lang="en-US" sz="1400">
+              <a:rPr lang="en-US" sz="1400" dirty="0">
                 <a:solidFill>
                   <a:srgbClr val="000000"/>
                 </a:solidFill>
                 <a:latin typeface="Courier New" pitchFamily="49" charset="0"/>
                 <a:cs typeface="Courier New" pitchFamily="49" charset="0"/>
               </a:rPr>
-              <a:t>  return EXIT_SUCCESS;</a:t>
+              <a:t>                                      , </a:t>
+            </a:r>
+            <a:r>
+              <a:rPr lang="en-US" sz="1400" b="1" dirty="0">
+                <a:solidFill>
+                  <a:srgbClr val="3B57A0"/>
+                </a:solidFill>
+                <a:latin typeface="Courier New" pitchFamily="49" charset="0"/>
+                <a:cs typeface="Courier New" pitchFamily="49" charset="0"/>
+              </a:rPr>
+              <a:t>GASPI_BLOCK</a:t>
+            </a:r>
+            <a:r>
+              <a:rPr lang="en-US" sz="1400" dirty="0">
+                <a:solidFill>
+                  <a:srgbClr val="000000"/>
+                </a:solidFill>
+                <a:latin typeface="Courier New" pitchFamily="49" charset="0"/>
+                <a:cs typeface="Courier New" pitchFamily="49" charset="0"/>
+              </a:rPr>
+              <a:t> )  );  </a:t>
             </a:r>
           </a:p>
           <a:p>
@@ -11042,14 +11526,114 @@
               <a:defRPr/>
             </a:pPr>
             <a:r>
-              <a:rPr lang="en-US" sz="1400">
+              <a:rPr lang="en-US" sz="1400" dirty="0">
                 <a:solidFill>
                   <a:srgbClr val="000000"/>
                 </a:solidFill>
                 <a:latin typeface="Courier New" pitchFamily="49" charset="0"/>
                 <a:cs typeface="Courier New" pitchFamily="49" charset="0"/>
               </a:rPr>
-              <a:t>}</a:t>
+              <a:t>  </a:t>
+            </a:r>
+            <a:r>
+              <a:rPr lang="en-US" sz="1400" dirty="0" err="1">
+                <a:solidFill>
+                  <a:srgbClr val="000000"/>
+                </a:solidFill>
+                <a:latin typeface="Courier New" pitchFamily="49" charset="0"/>
+                <a:cs typeface="Courier New" pitchFamily="49" charset="0"/>
+              </a:rPr>
+              <a:t>wait_or_die</a:t>
+            </a:r>
+            <a:r>
+              <a:rPr lang="en-US" sz="1400" dirty="0">
+                <a:solidFill>
+                  <a:srgbClr val="000000"/>
+                </a:solidFill>
+                <a:latin typeface="Courier New" pitchFamily="49" charset="0"/>
+                <a:cs typeface="Courier New" pitchFamily="49" charset="0"/>
+              </a:rPr>
+              <a:t> (</a:t>
+            </a:r>
+            <a:r>
+              <a:rPr lang="en-US" sz="1400" dirty="0" err="1">
+                <a:solidFill>
+                  <a:srgbClr val="000000"/>
+                </a:solidFill>
+                <a:latin typeface="Courier New" pitchFamily="49" charset="0"/>
+                <a:cs typeface="Courier New" pitchFamily="49" charset="0"/>
+              </a:rPr>
+              <a:t>segment_id</a:t>
+            </a:r>
+            <a:r>
+              <a:rPr lang="en-US" sz="1400" dirty="0">
+                <a:solidFill>
+                  <a:srgbClr val="000000"/>
+                </a:solidFill>
+                <a:latin typeface="Courier New" pitchFamily="49" charset="0"/>
+                <a:cs typeface="Courier New" pitchFamily="49" charset="0"/>
+              </a:rPr>
+              <a:t>, </a:t>
+            </a:r>
+            <a:r>
+              <a:rPr lang="en-US" sz="1400" dirty="0" err="1">
+                <a:solidFill>
+                  <a:srgbClr val="000000"/>
+                </a:solidFill>
+                <a:latin typeface="Courier New" pitchFamily="49" charset="0"/>
+                <a:cs typeface="Courier New" pitchFamily="49" charset="0"/>
+              </a:rPr>
+              <a:t>data_available</a:t>
+            </a:r>
+            <a:r>
+              <a:rPr lang="en-US" sz="1400" dirty="0">
+                <a:solidFill>
+                  <a:srgbClr val="000000"/>
+                </a:solidFill>
+                <a:latin typeface="Courier New" pitchFamily="49" charset="0"/>
+                <a:cs typeface="Courier New" pitchFamily="49" charset="0"/>
+              </a:rPr>
+              <a:t>, 1 + LEFT (</a:t>
+            </a:r>
+            <a:r>
+              <a:rPr lang="en-US" sz="1400" dirty="0" err="1">
+                <a:solidFill>
+                  <a:srgbClr val="000000"/>
+                </a:solidFill>
+                <a:latin typeface="Courier New" pitchFamily="49" charset="0"/>
+                <a:cs typeface="Courier New" pitchFamily="49" charset="0"/>
+              </a:rPr>
+              <a:t>iProc</a:t>
+            </a:r>
+            <a:r>
+              <a:rPr lang="en-US" sz="1400" dirty="0">
+                <a:solidFill>
+                  <a:srgbClr val="000000"/>
+                </a:solidFill>
+                <a:latin typeface="Courier New" pitchFamily="49" charset="0"/>
+                <a:cs typeface="Courier New" pitchFamily="49" charset="0"/>
+              </a:rPr>
+              <a:t>, </a:t>
+            </a:r>
+            <a:r>
+              <a:rPr lang="en-US" sz="1400" dirty="0" err="1">
+                <a:solidFill>
+                  <a:srgbClr val="000000"/>
+                </a:solidFill>
+                <a:latin typeface="Courier New" pitchFamily="49" charset="0"/>
+                <a:cs typeface="Courier New" pitchFamily="49" charset="0"/>
+              </a:rPr>
+              <a:t>nProc</a:t>
+            </a:r>
+            <a:r>
+              <a:rPr lang="en-US" sz="1400" dirty="0">
+                <a:solidFill>
+                  <a:srgbClr val="000000"/>
+                </a:solidFill>
+                <a:latin typeface="Courier New" pitchFamily="49" charset="0"/>
+                <a:cs typeface="Courier New" pitchFamily="49" charset="0"/>
+              </a:rPr>
+              <a:t>) );   </a:t>
             </a:r>
           </a:p>
           <a:p>
@@ -11058,7 +11642,297 @@
               <a:buNone/>
               <a:defRPr/>
             </a:pPr>
-            <a:endParaRPr lang="en-US" sz="1400">
+            <a:endParaRPr lang="en-US" sz="1400" dirty="0">
+              <a:solidFill>
+                <a:srgbClr val="000000"/>
+              </a:solidFill>
+              <a:latin typeface="Courier New" pitchFamily="49" charset="0"/>
+              <a:cs typeface="Courier New" pitchFamily="49" charset="0"/>
+            </a:endParaRPr>
+          </a:p>
+          <a:p>
+            <a:pPr>
+              <a:buFont typeface="Arial" charset="0"/>
+              <a:buNone/>
+              <a:defRPr/>
+            </a:pPr>
+            <a:r>
+              <a:rPr lang="en-US" sz="1400" dirty="0">
+                <a:solidFill>
+                  <a:srgbClr val="000000"/>
+                </a:solidFill>
+                <a:latin typeface="Courier New" pitchFamily="49" charset="0"/>
+                <a:cs typeface="Courier New" pitchFamily="49" charset="0"/>
+              </a:rPr>
+              <a:t>  for (</a:t>
+            </a:r>
+            <a:r>
+              <a:rPr lang="en-US" sz="1400" dirty="0" err="1">
+                <a:solidFill>
+                  <a:srgbClr val="000000"/>
+                </a:solidFill>
+                <a:latin typeface="Courier New" pitchFamily="49" charset="0"/>
+                <a:cs typeface="Courier New" pitchFamily="49" charset="0"/>
+              </a:rPr>
+              <a:t>int</a:t>
+            </a:r>
+            <a:r>
+              <a:rPr lang="en-US" sz="1400" dirty="0">
+                <a:solidFill>
+                  <a:srgbClr val="000000"/>
+                </a:solidFill>
+                <a:latin typeface="Courier New" pitchFamily="49" charset="0"/>
+                <a:cs typeface="Courier New" pitchFamily="49" charset="0"/>
+              </a:rPr>
+              <a:t> j = 0; j &lt; VLEN; ++j)    </a:t>
+            </a:r>
+          </a:p>
+          <a:p>
+            <a:pPr>
+              <a:buFont typeface="Arial" charset="0"/>
+              <a:buNone/>
+              <a:defRPr/>
+            </a:pPr>
+            <a:r>
+              <a:rPr lang="en-US" sz="1400" dirty="0">
+                <a:solidFill>
+                  <a:srgbClr val="000000"/>
+                </a:solidFill>
+                <a:latin typeface="Courier New" pitchFamily="49" charset="0"/>
+                <a:cs typeface="Courier New" pitchFamily="49" charset="0"/>
+              </a:rPr>
+              <a:t>  { </a:t>
+            </a:r>
+            <a:r>
+              <a:rPr lang="en-US" sz="1400" b="1" dirty="0" err="1">
+                <a:solidFill>
+                  <a:srgbClr val="3B57A0"/>
+                </a:solidFill>
+                <a:latin typeface="Courier New" pitchFamily="49" charset="0"/>
+                <a:cs typeface="Courier New" pitchFamily="49" charset="0"/>
+              </a:rPr>
+              <a:t>gaspi_printf</a:t>
+            </a:r>
+            <a:r>
+              <a:rPr lang="en-US" sz="1400" dirty="0">
+                <a:solidFill>
+                  <a:srgbClr val="000000"/>
+                </a:solidFill>
+                <a:latin typeface="Courier New" pitchFamily="49" charset="0"/>
+                <a:cs typeface="Courier New" pitchFamily="49" charset="0"/>
+              </a:rPr>
+              <a:t>("rank %d </a:t>
+            </a:r>
+            <a:r>
+              <a:rPr lang="en-US" sz="1400" dirty="0" err="1">
+                <a:solidFill>
+                  <a:srgbClr val="000000"/>
+                </a:solidFill>
+                <a:latin typeface="Courier New" pitchFamily="49" charset="0"/>
+                <a:cs typeface="Courier New" pitchFamily="49" charset="0"/>
+              </a:rPr>
+              <a:t>rcv</a:t>
+            </a:r>
+            <a:r>
+              <a:rPr lang="en-US" sz="1400" dirty="0">
+                <a:solidFill>
+                  <a:srgbClr val="000000"/>
+                </a:solidFill>
+                <a:latin typeface="Courier New" pitchFamily="49" charset="0"/>
+                <a:cs typeface="Courier New" pitchFamily="49" charset="0"/>
+              </a:rPr>
+              <a:t> </a:t>
+            </a:r>
+            <a:r>
+              <a:rPr lang="en-US" sz="1400" dirty="0" err="1">
+                <a:solidFill>
+                  <a:srgbClr val="000000"/>
+                </a:solidFill>
+                <a:latin typeface="Courier New" pitchFamily="49" charset="0"/>
+                <a:cs typeface="Courier New" pitchFamily="49" charset="0"/>
+              </a:rPr>
+              <a:t>elem</a:t>
+            </a:r>
+            <a:r>
+              <a:rPr lang="en-US" sz="1400" dirty="0">
+                <a:solidFill>
+                  <a:srgbClr val="000000"/>
+                </a:solidFill>
+                <a:latin typeface="Courier New" pitchFamily="49" charset="0"/>
+                <a:cs typeface="Courier New" pitchFamily="49" charset="0"/>
+              </a:rPr>
+              <a:t> %d: %f \n", </a:t>
+            </a:r>
+            <a:r>
+              <a:rPr lang="en-US" sz="1400" dirty="0" err="1">
+                <a:solidFill>
+                  <a:srgbClr val="000000"/>
+                </a:solidFill>
+                <a:latin typeface="Courier New" pitchFamily="49" charset="0"/>
+                <a:cs typeface="Courier New" pitchFamily="49" charset="0"/>
+              </a:rPr>
+              <a:t>iProc,j,rcv_array</a:t>
+            </a:r>
+            <a:r>
+              <a:rPr lang="en-US" sz="1400" dirty="0">
+                <a:solidFill>
+                  <a:srgbClr val="000000"/>
+                </a:solidFill>
+                <a:latin typeface="Courier New" pitchFamily="49" charset="0"/>
+                <a:cs typeface="Courier New" pitchFamily="49" charset="0"/>
+              </a:rPr>
+              <a:t>[j] );    }    </a:t>
+            </a:r>
+          </a:p>
+          <a:p>
+            <a:pPr>
+              <a:buFont typeface="Arial" charset="0"/>
+              <a:buNone/>
+              <a:defRPr/>
+            </a:pPr>
+            <a:endParaRPr lang="en-US" sz="1400" dirty="0">
+              <a:solidFill>
+                <a:srgbClr val="000000"/>
+              </a:solidFill>
+              <a:latin typeface="Courier New" pitchFamily="49" charset="0"/>
+              <a:cs typeface="Courier New" pitchFamily="49" charset="0"/>
+            </a:endParaRPr>
+          </a:p>
+          <a:p>
+            <a:pPr>
+              <a:buFont typeface="Arial" charset="0"/>
+              <a:buNone/>
+              <a:defRPr/>
+            </a:pPr>
+            <a:r>
+              <a:rPr lang="en-US" sz="1400" dirty="0">
+                <a:solidFill>
+                  <a:srgbClr val="000000"/>
+                </a:solidFill>
+                <a:latin typeface="Courier New" pitchFamily="49" charset="0"/>
+                <a:cs typeface="Courier New" pitchFamily="49" charset="0"/>
+              </a:rPr>
+              <a:t>  </a:t>
+            </a:r>
+            <a:r>
+              <a:rPr lang="en-US" sz="1400" dirty="0" err="1">
+                <a:solidFill>
+                  <a:srgbClr val="000000"/>
+                </a:solidFill>
+                <a:latin typeface="Courier New" pitchFamily="49" charset="0"/>
+                <a:cs typeface="Courier New" pitchFamily="49" charset="0"/>
+              </a:rPr>
+              <a:t>wait_for_flush_queues</a:t>
+            </a:r>
+            <a:r>
+              <a:rPr lang="en-US" sz="1400" dirty="0">
+                <a:solidFill>
+                  <a:srgbClr val="000000"/>
+                </a:solidFill>
+                <a:latin typeface="Courier New" pitchFamily="49" charset="0"/>
+                <a:cs typeface="Courier New" pitchFamily="49" charset="0"/>
+              </a:rPr>
+              <a:t>();   </a:t>
+            </a:r>
+          </a:p>
+          <a:p>
+            <a:pPr>
+              <a:buFont typeface="Arial" charset="0"/>
+              <a:buNone/>
+              <a:defRPr/>
+            </a:pPr>
+            <a:r>
+              <a:rPr lang="en-US" sz="1400" dirty="0">
+                <a:solidFill>
+                  <a:srgbClr val="000000"/>
+                </a:solidFill>
+                <a:latin typeface="Courier New" pitchFamily="49" charset="0"/>
+                <a:cs typeface="Courier New" pitchFamily="49" charset="0"/>
+              </a:rPr>
+              <a:t>  SUCCESS_OR_DIE( </a:t>
+            </a:r>
+            <a:r>
+              <a:rPr lang="en-US" sz="1400" b="1" dirty="0" err="1">
+                <a:solidFill>
+                  <a:srgbClr val="3B57A0"/>
+                </a:solidFill>
+                <a:latin typeface="Courier New" pitchFamily="49" charset="0"/>
+                <a:cs typeface="Courier New" pitchFamily="49" charset="0"/>
+              </a:rPr>
+              <a:t>gaspi_proc_term</a:t>
+            </a:r>
+            <a:r>
+              <a:rPr lang="en-US" sz="1400" dirty="0">
+                <a:solidFill>
+                  <a:srgbClr val="000000"/>
+                </a:solidFill>
+                <a:latin typeface="Courier New" pitchFamily="49" charset="0"/>
+                <a:cs typeface="Courier New" pitchFamily="49" charset="0"/>
+              </a:rPr>
+              <a:t>(</a:t>
+            </a:r>
+            <a:r>
+              <a:rPr lang="en-US" sz="1400" b="1" dirty="0">
+                <a:solidFill>
+                  <a:srgbClr val="3B57A0"/>
+                </a:solidFill>
+                <a:latin typeface="Courier New" pitchFamily="49" charset="0"/>
+                <a:cs typeface="Courier New" pitchFamily="49" charset="0"/>
+              </a:rPr>
+              <a:t>GASPI_BLOCK</a:t>
+            </a:r>
+            <a:r>
+              <a:rPr lang="en-US" sz="1400" dirty="0">
+                <a:solidFill>
+                  <a:srgbClr val="000000"/>
+                </a:solidFill>
+                <a:latin typeface="Courier New" pitchFamily="49" charset="0"/>
+                <a:cs typeface="Courier New" pitchFamily="49" charset="0"/>
+              </a:rPr>
+              <a:t>) );   </a:t>
+            </a:r>
+          </a:p>
+          <a:p>
+            <a:pPr>
+              <a:buFont typeface="Arial" charset="0"/>
+              <a:buNone/>
+              <a:defRPr/>
+            </a:pPr>
+            <a:r>
+              <a:rPr lang="en-US" sz="1400" dirty="0">
+                <a:solidFill>
+                  <a:srgbClr val="000000"/>
+                </a:solidFill>
+                <a:latin typeface="Courier New" pitchFamily="49" charset="0"/>
+                <a:cs typeface="Courier New" pitchFamily="49" charset="0"/>
+              </a:rPr>
+              <a:t>  return EXIT_SUCCESS;</a:t>
+            </a:r>
+          </a:p>
+          <a:p>
+            <a:pPr>
+              <a:buFont typeface="Arial" charset="0"/>
+              <a:buNone/>
+              <a:defRPr/>
+            </a:pPr>
+            <a:r>
+              <a:rPr lang="en-US" sz="1400" dirty="0">
+                <a:solidFill>
+                  <a:srgbClr val="000000"/>
+                </a:solidFill>
+                <a:latin typeface="Courier New" pitchFamily="49" charset="0"/>
+                <a:cs typeface="Courier New" pitchFamily="49" charset="0"/>
+              </a:rPr>
+              <a:t>}</a:t>
+            </a:r>
+          </a:p>
+          <a:p>
+            <a:pPr>
+              <a:buFont typeface="Arial" charset="0"/>
+              <a:buNone/>
+              <a:defRPr/>
+            </a:pPr>
+            <a:endParaRPr lang="en-US" sz="1400" dirty="0">
               <a:solidFill>
                 <a:srgbClr val="000000"/>
               </a:solidFill>
@@ -12825,7 +13699,10 @@
               <a:t>	SUCCESS_OR_DIE( </a:t>
             </a:r>
             <a:r>
-              <a:rPr lang="en-US" sz="1400" dirty="0" err="1">
+              <a:rPr lang="en-US" sz="1400" b="1" dirty="0" err="1">
+                <a:solidFill>
+                  <a:srgbClr val="3B57A0"/>
+                </a:solidFill>
                 <a:latin typeface="Courier New" pitchFamily="49" charset="0"/>
                 <a:cs typeface="Courier New" pitchFamily="49" charset="0"/>
               </a:rPr>
@@ -12836,7 +13713,24 @@
                 <a:latin typeface="Courier New" pitchFamily="49" charset="0"/>
                 <a:cs typeface="Courier New" pitchFamily="49" charset="0"/>
               </a:rPr>
-              <a:t>(GASPI_BLOCK) );   </a:t>
+              <a:t>(</a:t>
+            </a:r>
+            <a:r>
+              <a:rPr lang="en-US" sz="1400" b="1" dirty="0">
+                <a:solidFill>
+                  <a:srgbClr val="3B57A0"/>
+                </a:solidFill>
+                <a:latin typeface="Courier New" pitchFamily="49" charset="0"/>
+                <a:cs typeface="Courier New" pitchFamily="49" charset="0"/>
+              </a:rPr>
+              <a:t>GASPI_BLOCK</a:t>
+            </a:r>
+            <a:r>
+              <a:rPr lang="en-US" sz="1400" dirty="0">
+                <a:latin typeface="Courier New" pitchFamily="49" charset="0"/>
+                <a:cs typeface="Courier New" pitchFamily="49" charset="0"/>
+              </a:rPr>
+              <a:t>) );   </a:t>
             </a:r>
           </a:p>
           <a:p>
@@ -12853,7 +13747,10 @@
               <a:t>    </a:t>
             </a:r>
             <a:r>
-              <a:rPr lang="en-US" sz="1400" dirty="0" err="1" smtClean="0">
+              <a:rPr lang="en-US" sz="1400" b="1" dirty="0" err="1" smtClean="0">
+                <a:solidFill>
+                  <a:srgbClr val="3B57A0"/>
+                </a:solidFill>
                 <a:latin typeface="Courier New" pitchFamily="49" charset="0"/>
                 <a:cs typeface="Courier New" pitchFamily="49" charset="0"/>
               </a:rPr>
@@ -12909,7 +13806,10 @@
               <a:t>    SUCCESS_OR_DIE( </a:t>
             </a:r>
             <a:r>
-              <a:rPr lang="en-US" sz="1400" dirty="0" err="1" smtClean="0">
+              <a:rPr lang="en-US" sz="1400" b="1" dirty="0" err="1" smtClean="0">
+                <a:solidFill>
+                  <a:srgbClr val="3B57A0"/>
+                </a:solidFill>
                 <a:latin typeface="Courier New" pitchFamily="49" charset="0"/>
                 <a:cs typeface="Courier New" pitchFamily="49" charset="0"/>
               </a:rPr>
@@ -12951,7 +13851,10 @@
               <a:t>    SUCCESS_OR_DIE( </a:t>
             </a:r>
             <a:r>
-              <a:rPr lang="en-US" sz="1400" dirty="0" err="1" smtClean="0">
+              <a:rPr lang="en-US" sz="1400" b="1" dirty="0" err="1" smtClean="0">
+                <a:solidFill>
+                  <a:srgbClr val="3B57A0"/>
+                </a:solidFill>
                 <a:latin typeface="Courier New" pitchFamily="49" charset="0"/>
                 <a:cs typeface="Courier New" pitchFamily="49" charset="0"/>
               </a:rPr>
@@ -13008,7 +13911,10 @@
               <a:t>	</a:t>
             </a:r>
             <a:r>
-              <a:rPr lang="en-US" sz="1400" dirty="0" err="1">
+              <a:rPr lang="en-US" sz="1400" b="1" dirty="0" err="1">
+                <a:solidFill>
+                  <a:srgbClr val="3B57A0"/>
+                </a:solidFill>
                 <a:latin typeface="Courier New" pitchFamily="49" charset="0"/>
                 <a:cs typeface="Courier New" pitchFamily="49" charset="0"/>
               </a:rPr>
@@ -13050,18 +13956,31 @@
               <a:t>	</a:t>
             </a:r>
             <a:r>
-              <a:rPr lang="en-US" sz="1400" dirty="0" err="1">
+              <a:rPr lang="en-US" sz="1400" b="1" dirty="0" err="1">
+                <a:solidFill>
+                  <a:srgbClr val="3B57A0"/>
+                </a:solidFill>
                 <a:latin typeface="Courier New" pitchFamily="49" charset="0"/>
                 <a:cs typeface="Courier New" pitchFamily="49" charset="0"/>
               </a:rPr>
               <a:t>gaspi_size_t</a:t>
             </a:r>
             <a:r>
+              <a:rPr lang="en-US" sz="1400" b="1" dirty="0">
+                <a:solidFill>
+                  <a:srgbClr val="3B57A0"/>
+                </a:solidFill>
+                <a:latin typeface="Courier New" pitchFamily="49" charset="0"/>
+                <a:cs typeface="Courier New" pitchFamily="49" charset="0"/>
+              </a:rPr>
+              <a:t> </a:t>
+            </a:r>
+            <a:r>
               <a:rPr lang="en-US" sz="1400" dirty="0">
                 <a:latin typeface="Courier New" pitchFamily="49" charset="0"/>
                 <a:cs typeface="Courier New" pitchFamily="49" charset="0"/>
               </a:rPr>
-              <a:t>       const </a:t>
+              <a:t>      const </a:t>
             </a:r>
             <a:r>
               <a:rPr lang="en-US" sz="1400" dirty="0" err="1">
@@ -13117,46 +14036,86 @@
               <a:t>	SUCCESS_OR_DIE ( </a:t>
             </a:r>
             <a:r>
+              <a:rPr lang="en-US" sz="1400" b="1" dirty="0" err="1">
+                <a:solidFill>
+                  <a:srgbClr val="3B57A0"/>
+                </a:solidFill>
+                <a:latin typeface="Courier New" pitchFamily="49" charset="0"/>
+                <a:cs typeface="Courier New" pitchFamily="49" charset="0"/>
+              </a:rPr>
+              <a:t>gaspi_segment_create</a:t>
+            </a:r>
+            <a:r>
+              <a:rPr lang="en-US" sz="1400" b="1" dirty="0">
+                <a:solidFill>
+                  <a:srgbClr val="3B57A0"/>
+                </a:solidFill>
+                <a:latin typeface="Courier New" pitchFamily="49" charset="0"/>
+                <a:cs typeface="Courier New" pitchFamily="49" charset="0"/>
+              </a:rPr>
+              <a:t> </a:t>
+            </a:r>
+            <a:r>
+              <a:rPr lang="en-US" sz="1400" dirty="0">
+                <a:latin typeface="Courier New" pitchFamily="49" charset="0"/>
+                <a:cs typeface="Courier New" pitchFamily="49" charset="0"/>
+              </a:rPr>
+              <a:t>( </a:t>
+            </a:r>
+            <a:r>
               <a:rPr lang="en-US" sz="1400" dirty="0" err="1">
                 <a:latin typeface="Courier New" pitchFamily="49" charset="0"/>
                 <a:cs typeface="Courier New" pitchFamily="49" charset="0"/>
               </a:rPr>
-              <a:t>gaspi_segment_create</a:t>
+              <a:t>segment_id</a:t>
             </a:r>
             <a:r>
               <a:rPr lang="en-US" sz="1400" dirty="0">
                 <a:latin typeface="Courier New" pitchFamily="49" charset="0"/>
                 <a:cs typeface="Courier New" pitchFamily="49" charset="0"/>
               </a:rPr>
-              <a:t> ( </a:t>
+              <a:t>, </a:t>
             </a:r>
             <a:r>
               <a:rPr lang="en-US" sz="1400" dirty="0" err="1">
                 <a:latin typeface="Courier New" pitchFamily="49" charset="0"/>
                 <a:cs typeface="Courier New" pitchFamily="49" charset="0"/>
               </a:rPr>
-              <a:t>segment_id</a:t>
+              <a:t>segment_size</a:t>
             </a:r>
             <a:r>
               <a:rPr lang="en-US" sz="1400" dirty="0">
                 <a:latin typeface="Courier New" pitchFamily="49" charset="0"/>
                 <a:cs typeface="Courier New" pitchFamily="49" charset="0"/>
               </a:rPr>
+              <a:t>                       									   , </a:t>
+            </a:r>
+            <a:r>
+              <a:rPr lang="en-US" sz="1400" b="1" dirty="0">
+                <a:solidFill>
+                  <a:srgbClr val="3B57A0"/>
+                </a:solidFill>
+                <a:latin typeface="Courier New" pitchFamily="49" charset="0"/>
+                <a:cs typeface="Courier New" pitchFamily="49" charset="0"/>
+              </a:rPr>
+              <a:t>GASPI_GROUP_ALL</a:t>
+            </a:r>
+            <a:r>
+              <a:rPr lang="en-US" sz="1400" dirty="0">
+                <a:latin typeface="Courier New" pitchFamily="49" charset="0"/>
+                <a:cs typeface="Courier New" pitchFamily="49" charset="0"/>
+              </a:rPr>
               <a:t>, </a:t>
             </a:r>
             <a:r>
-              <a:rPr lang="en-US" sz="1400" dirty="0" err="1">
-                <a:latin typeface="Courier New" pitchFamily="49" charset="0"/>
-                <a:cs typeface="Courier New" pitchFamily="49" charset="0"/>
-              </a:rPr>
-              <a:t>segment_size</a:t>
-            </a:r>
-            <a:r>
-              <a:rPr lang="en-US" sz="1400" dirty="0">
-                <a:latin typeface="Courier New" pitchFamily="49" charset="0"/>
-                <a:cs typeface="Courier New" pitchFamily="49" charset="0"/>
-              </a:rPr>
-              <a:t>                       									   , GASPI_GROUP_ALL, GASPI_BLOCK</a:t>
+              <a:rPr lang="en-US" sz="1400" b="1" dirty="0">
+                <a:solidFill>
+                  <a:srgbClr val="3B57A0"/>
+                </a:solidFill>
+                <a:latin typeface="Courier New" pitchFamily="49" charset="0"/>
+                <a:cs typeface="Courier New" pitchFamily="49" charset="0"/>
+              </a:rPr>
+              <a:t>GASPI_BLOCK</a:t>
             </a:r>
           </a:p>
           <a:p>
@@ -13170,7 +14129,24 @@
                 <a:latin typeface="Courier New" pitchFamily="49" charset="0"/>
                 <a:cs typeface="Courier New" pitchFamily="49" charset="0"/>
               </a:rPr>
-              <a:t>                                          , GASPI_MEM_UNINITIALIZED ) );      </a:t>
+              <a:t>                                          , </a:t>
+            </a:r>
+            <a:r>
+              <a:rPr lang="en-US" sz="1400" b="1" dirty="0">
+                <a:solidFill>
+                  <a:srgbClr val="3B57A0"/>
+                </a:solidFill>
+                <a:latin typeface="Courier New" pitchFamily="49" charset="0"/>
+                <a:cs typeface="Courier New" pitchFamily="49" charset="0"/>
+              </a:rPr>
+              <a:t>GASPI_MEM_UNINITIALIZED</a:t>
+            </a:r>
+            <a:r>
+              <a:rPr lang="en-US" sz="1400" dirty="0">
+                <a:latin typeface="Courier New" pitchFamily="49" charset="0"/>
+                <a:cs typeface="Courier New" pitchFamily="49" charset="0"/>
+              </a:rPr>
+              <a:t> ) );      </a:t>
             </a:r>
           </a:p>
           <a:p>
@@ -13278,27 +14254,44 @@
           <a:p>
             <a:pPr eaLnBrk="1" hangingPunct="1"/>
             <a:r>
-              <a:rPr lang="de-DE" smtClean="0"/>
-              <a:t>GASPI programming model</a:t>
+              <a:rPr lang="de-DE" dirty="0" smtClean="0"/>
+              <a:t>GASPI </a:t>
+            </a:r>
+            <a:r>
+              <a:rPr lang="de-DE" dirty="0" err="1" smtClean="0"/>
+              <a:t>programming</a:t>
+            </a:r>
+            <a:r>
+              <a:rPr lang="de-DE" dirty="0" smtClean="0"/>
+              <a:t> model</a:t>
             </a:r>
           </a:p>
           <a:p>
             <a:pPr lvl="1" eaLnBrk="1" hangingPunct="1"/>
             <a:r>
-              <a:rPr lang="de-DE" smtClean="0"/>
-              <a:t>Dataflow model</a:t>
+              <a:rPr lang="de-DE" dirty="0" err="1" smtClean="0"/>
+              <a:t>Dataflow</a:t>
+            </a:r>
+            <a:r>
+              <a:rPr lang="de-DE" dirty="0" smtClean="0"/>
+              <a:t> model</a:t>
             </a:r>
           </a:p>
           <a:p>
             <a:pPr lvl="1" eaLnBrk="1" hangingPunct="1"/>
             <a:r>
-              <a:rPr lang="de-DE" smtClean="0"/>
-              <a:t>Fault tolerance</a:t>
-            </a:r>
+              <a:rPr lang="de-DE" dirty="0" smtClean="0"/>
+              <a:t>Fault </a:t>
+            </a:r>
+            <a:r>
+              <a:rPr lang="de-DE" dirty="0" err="1" smtClean="0"/>
+              <a:t>tolerance</a:t>
+            </a:r>
+            <a:endParaRPr lang="de-DE" dirty="0" smtClean="0"/>
           </a:p>
           <a:p>
             <a:pPr eaLnBrk="1" hangingPunct="1"/>
-            <a:endParaRPr lang="de-DE" smtClean="0"/>
+            <a:endParaRPr lang="de-DE" dirty="0" smtClean="0"/>
           </a:p>
         </p:txBody>
       </p:sp>
@@ -13338,7 +14331,7 @@
               <a:buNone/>
             </a:pPr>
             <a:r>
-              <a:rPr lang="de-DE" sz="3200">
+              <a:rPr lang="de-DE" sz="3200" b="1" dirty="0">
                 <a:solidFill>
                   <a:srgbClr val="3B57A0"/>
                 </a:solidFill>
@@ -13385,7 +14378,7 @@
               <a:buNone/>
             </a:pPr>
             <a:r>
-              <a:rPr lang="de-DE" sz="3200">
+              <a:rPr lang="de-DE" sz="3200" b="1" dirty="0">
                 <a:solidFill>
                   <a:srgbClr val="3B57A0"/>
                 </a:solidFill>
@@ -13542,14 +14535,34 @@
               <a:buNone/>
             </a:pPr>
             <a:r>
-              <a:rPr lang="en-US" sz="1400">
+              <a:rPr lang="en-US" sz="1400" dirty="0">
                 <a:solidFill>
                   <a:srgbClr val="000000"/>
                 </a:solidFill>
                 <a:latin typeface="Courier New" pitchFamily="49" charset="0"/>
                 <a:cs typeface="Courier New" pitchFamily="49" charset="0"/>
               </a:rPr>
-              <a:t>    gaspi_pointer_t array;  </a:t>
+              <a:t>    </a:t>
+            </a:r>
+            <a:r>
+              <a:rPr lang="en-US" sz="1400" b="1" dirty="0" err="1">
+                <a:solidFill>
+                  <a:srgbClr val="3B57A0"/>
+                </a:solidFill>
+                <a:latin typeface="Courier New" pitchFamily="49" charset="0"/>
+                <a:cs typeface="Courier New" pitchFamily="49" charset="0"/>
+              </a:rPr>
+              <a:t>gaspi_pointer_t</a:t>
+            </a:r>
+            <a:r>
+              <a:rPr lang="en-US" sz="1400" dirty="0">
+                <a:solidFill>
+                  <a:srgbClr val="000000"/>
+                </a:solidFill>
+                <a:latin typeface="Courier New" pitchFamily="49" charset="0"/>
+                <a:cs typeface="Courier New" pitchFamily="49" charset="0"/>
+              </a:rPr>
+              <a:t> array;  </a:t>
             </a:r>
           </a:p>
           <a:p>
@@ -13558,14 +14571,64 @@
               <a:buNone/>
             </a:pPr>
             <a:r>
-              <a:rPr lang="en-US" sz="1400">
+              <a:rPr lang="en-US" sz="1400" dirty="0">
                 <a:solidFill>
                   <a:srgbClr val="000000"/>
                 </a:solidFill>
                 <a:latin typeface="Courier New" pitchFamily="49" charset="0"/>
                 <a:cs typeface="Courier New" pitchFamily="49" charset="0"/>
               </a:rPr>
-              <a:t>	SUCCESS_OR_DIE( gaspi_segment_ptr (segment_id, &amp;array) );    </a:t>
+              <a:t>	SUCCESS_OR_DIE( </a:t>
+            </a:r>
+            <a:r>
+              <a:rPr lang="en-US" sz="1400" b="1" dirty="0" err="1">
+                <a:solidFill>
+                  <a:srgbClr val="3B57A0"/>
+                </a:solidFill>
+                <a:latin typeface="Courier New" pitchFamily="49" charset="0"/>
+                <a:cs typeface="Courier New" pitchFamily="49" charset="0"/>
+              </a:rPr>
+              <a:t>gaspi_segment_ptr</a:t>
+            </a:r>
+            <a:r>
+              <a:rPr lang="en-US" sz="1400" b="1" dirty="0">
+                <a:solidFill>
+                  <a:srgbClr val="3B57A0"/>
+                </a:solidFill>
+                <a:latin typeface="Courier New" pitchFamily="49" charset="0"/>
+                <a:cs typeface="Courier New" pitchFamily="49" charset="0"/>
+              </a:rPr>
+              <a:t> </a:t>
+            </a:r>
+            <a:r>
+              <a:rPr lang="en-US" sz="1400" dirty="0">
+                <a:solidFill>
+                  <a:srgbClr val="000000"/>
+                </a:solidFill>
+                <a:latin typeface="Courier New" pitchFamily="49" charset="0"/>
+                <a:cs typeface="Courier New" pitchFamily="49" charset="0"/>
+              </a:rPr>
+              <a:t>(</a:t>
+            </a:r>
+            <a:r>
+              <a:rPr lang="en-US" sz="1400" dirty="0" err="1">
+                <a:solidFill>
+                  <a:srgbClr val="000000"/>
+                </a:solidFill>
+                <a:latin typeface="Courier New" pitchFamily="49" charset="0"/>
+                <a:cs typeface="Courier New" pitchFamily="49" charset="0"/>
+              </a:rPr>
+              <a:t>segment_id</a:t>
+            </a:r>
+            <a:r>
+              <a:rPr lang="en-US" sz="1400" dirty="0">
+                <a:solidFill>
+                  <a:srgbClr val="000000"/>
+                </a:solidFill>
+                <a:latin typeface="Courier New" pitchFamily="49" charset="0"/>
+                <a:cs typeface="Courier New" pitchFamily="49" charset="0"/>
+              </a:rPr>
+              <a:t>, &amp;array) );    </a:t>
             </a:r>
           </a:p>
           <a:p>
@@ -13573,7 +14636,7 @@
               <a:buFont typeface="Arial" charset="0"/>
               <a:buNone/>
             </a:pPr>
-            <a:endParaRPr lang="en-US" sz="1400">
+            <a:endParaRPr lang="en-US" sz="1400" dirty="0">
               <a:solidFill>
                 <a:srgbClr val="000000"/>
               </a:solidFill>
@@ -13587,14 +14650,34 @@
               <a:buNone/>
             </a:pPr>
             <a:r>
-              <a:rPr lang="en-US" sz="1400">
+              <a:rPr lang="en-US" sz="1400" dirty="0">
                 <a:solidFill>
                   <a:srgbClr val="000000"/>
                 </a:solidFill>
                 <a:latin typeface="Courier New" pitchFamily="49" charset="0"/>
                 <a:cs typeface="Courier New" pitchFamily="49" charset="0"/>
               </a:rPr>
-              <a:t>	for (int j = 0; j &lt; VLEN; ++j)  </a:t>
+              <a:t>	for (</a:t>
+            </a:r>
+            <a:r>
+              <a:rPr lang="en-US" sz="1400" dirty="0" err="1">
+                <a:solidFill>
+                  <a:srgbClr val="000000"/>
+                </a:solidFill>
+                <a:latin typeface="Courier New" pitchFamily="49" charset="0"/>
+                <a:cs typeface="Courier New" pitchFamily="49" charset="0"/>
+              </a:rPr>
+              <a:t>int</a:t>
+            </a:r>
+            <a:r>
+              <a:rPr lang="en-US" sz="1400" dirty="0">
+                <a:solidFill>
+                  <a:srgbClr val="000000"/>
+                </a:solidFill>
+                <a:latin typeface="Courier New" pitchFamily="49" charset="0"/>
+                <a:cs typeface="Courier New" pitchFamily="49" charset="0"/>
+              </a:rPr>
+              <a:t> j = 0; j &lt; VLEN; ++j)  </a:t>
             </a:r>
           </a:p>
           <a:p>
@@ -13603,7 +14686,7 @@
               <a:buNone/>
             </a:pPr>
             <a:r>
-              <a:rPr lang="en-US" sz="1400">
+              <a:rPr lang="en-US" sz="1400" dirty="0">
                 <a:solidFill>
                   <a:srgbClr val="000000"/>
                 </a:solidFill>
@@ -13619,14 +14702,34 @@
               <a:buNone/>
             </a:pPr>
             <a:r>
-              <a:rPr lang="en-US" sz="1400">
+              <a:rPr lang="en-US" sz="1400" dirty="0">
                 <a:solidFill>
                   <a:srgbClr val="000000"/>
                 </a:solidFill>
                 <a:latin typeface="Courier New" pitchFamily="49" charset="0"/>
                 <a:cs typeface="Courier New" pitchFamily="49" charset="0"/>
               </a:rPr>
-              <a:t>		( (double *)array )[j]= (double)( iProc * VLEN + j ); </a:t>
+              <a:t>		( (double *)array )[j]= (double)( </a:t>
+            </a:r>
+            <a:r>
+              <a:rPr lang="en-US" sz="1400" dirty="0" err="1">
+                <a:solidFill>
+                  <a:srgbClr val="000000"/>
+                </a:solidFill>
+                <a:latin typeface="Courier New" pitchFamily="49" charset="0"/>
+                <a:cs typeface="Courier New" pitchFamily="49" charset="0"/>
+              </a:rPr>
+              <a:t>iProc</a:t>
+            </a:r>
+            <a:r>
+              <a:rPr lang="en-US" sz="1400" dirty="0">
+                <a:solidFill>
+                  <a:srgbClr val="000000"/>
+                </a:solidFill>
+                <a:latin typeface="Courier New" pitchFamily="49" charset="0"/>
+                <a:cs typeface="Courier New" pitchFamily="49" charset="0"/>
+              </a:rPr>
+              <a:t> * VLEN + j ); </a:t>
             </a:r>
           </a:p>
           <a:p>
@@ -13635,7 +14738,7 @@
               <a:buNone/>
             </a:pPr>
             <a:r>
-              <a:rPr lang="en-US" sz="1400">
+              <a:rPr lang="en-US" sz="1400" dirty="0">
                 <a:solidFill>
                   <a:srgbClr val="000000"/>
                 </a:solidFill>
@@ -13651,14 +14754,54 @@
               <a:buNone/>
             </a:pPr>
             <a:r>
-              <a:rPr lang="en-US" sz="1400">
+              <a:rPr lang="en-US" sz="1400" dirty="0">
                 <a:solidFill>
                   <a:srgbClr val="000000"/>
                 </a:solidFill>
                 <a:latin typeface="Courier New" pitchFamily="49" charset="0"/>
                 <a:cs typeface="Courier New" pitchFamily="49" charset="0"/>
               </a:rPr>
-              <a:t> 		 gaspi_printf( "rank %d elem %d: %f \n„</a:t>
+              <a:t> 		 </a:t>
+            </a:r>
+            <a:r>
+              <a:rPr lang="en-US" sz="1400" b="1" dirty="0" err="1">
+                <a:solidFill>
+                  <a:srgbClr val="3B57A0"/>
+                </a:solidFill>
+                <a:latin typeface="Courier New" pitchFamily="49" charset="0"/>
+                <a:cs typeface="Courier New" pitchFamily="49" charset="0"/>
+              </a:rPr>
+              <a:t>gaspi_printf</a:t>
+            </a:r>
+            <a:r>
+              <a:rPr lang="en-US" sz="1400" dirty="0">
+                <a:solidFill>
+                  <a:srgbClr val="000000"/>
+                </a:solidFill>
+                <a:latin typeface="Courier New" pitchFamily="49" charset="0"/>
+                <a:cs typeface="Courier New" pitchFamily="49" charset="0"/>
+              </a:rPr>
+              <a:t>( "rank %d </a:t>
+            </a:r>
+            <a:r>
+              <a:rPr lang="en-US" sz="1400" dirty="0" err="1">
+                <a:solidFill>
+                  <a:srgbClr val="000000"/>
+                </a:solidFill>
+                <a:latin typeface="Courier New" pitchFamily="49" charset="0"/>
+                <a:cs typeface="Courier New" pitchFamily="49" charset="0"/>
+              </a:rPr>
+              <a:t>elem</a:t>
+            </a:r>
+            <a:r>
+              <a:rPr lang="en-US" sz="1400" dirty="0">
+                <a:solidFill>
+                  <a:srgbClr val="000000"/>
+                </a:solidFill>
+                <a:latin typeface="Courier New" pitchFamily="49" charset="0"/>
+                <a:cs typeface="Courier New" pitchFamily="49" charset="0"/>
+              </a:rPr>
+              <a:t> %d: %f \n„</a:t>
             </a:r>
           </a:p>
           <a:p>
@@ -13667,14 +14810,34 @@
               <a:buNone/>
             </a:pPr>
             <a:r>
-              <a:rPr lang="en-US" sz="1400">
+              <a:rPr lang="en-US" sz="1400" dirty="0">
                 <a:solidFill>
                   <a:srgbClr val="000000"/>
                 </a:solidFill>
                 <a:latin typeface="Courier New" pitchFamily="49" charset="0"/>
                 <a:cs typeface="Courier New" pitchFamily="49" charset="0"/>
               </a:rPr>
-              <a:t>                      , iProc,j,( (double *)array )[j] );    </a:t>
+              <a:t>                      , </a:t>
+            </a:r>
+            <a:r>
+              <a:rPr lang="en-US" sz="1400" dirty="0" err="1">
+                <a:solidFill>
+                  <a:srgbClr val="000000"/>
+                </a:solidFill>
+                <a:latin typeface="Courier New" pitchFamily="49" charset="0"/>
+                <a:cs typeface="Courier New" pitchFamily="49" charset="0"/>
+              </a:rPr>
+              <a:t>iProc,j</a:t>
+            </a:r>
+            <a:r>
+              <a:rPr lang="en-US" sz="1400" dirty="0">
+                <a:solidFill>
+                  <a:srgbClr val="000000"/>
+                </a:solidFill>
+                <a:latin typeface="Courier New" pitchFamily="49" charset="0"/>
+                <a:cs typeface="Courier New" pitchFamily="49" charset="0"/>
+              </a:rPr>
+              <a:t>,( (double *)array )[j] );    </a:t>
             </a:r>
           </a:p>
           <a:p>
@@ -13683,7 +14846,7 @@
               <a:buNone/>
             </a:pPr>
             <a:r>
-              <a:rPr lang="en-US" sz="1400">
+              <a:rPr lang="en-US" sz="1400" dirty="0">
                 <a:solidFill>
                   <a:srgbClr val="000000"/>
                 </a:solidFill>
@@ -13699,7 +14862,7 @@
               <a:buNone/>
             </a:pPr>
             <a:r>
-              <a:rPr lang="en-US" sz="1400">
+              <a:rPr lang="en-US" sz="1400" dirty="0">
                 <a:solidFill>
                   <a:srgbClr val="000000"/>
                 </a:solidFill>
@@ -13715,14 +14878,34 @@
               <a:buNone/>
             </a:pPr>
             <a:r>
-              <a:rPr lang="en-US" sz="1400">
+              <a:rPr lang="en-US" sz="1400" dirty="0">
                 <a:solidFill>
                   <a:srgbClr val="000000"/>
                 </a:solidFill>
                 <a:latin typeface="Courier New" pitchFamily="49" charset="0"/>
                 <a:cs typeface="Courier New" pitchFamily="49" charset="0"/>
               </a:rPr>
-              <a:t>	SUCCESS_OR_DIE( gaspi_proc_term(GASPI_BLOCK) );   </a:t>
+              <a:t>	SUCCESS_OR_DIE( </a:t>
+            </a:r>
+            <a:r>
+              <a:rPr lang="en-US" sz="1400" b="1" dirty="0" err="1">
+                <a:solidFill>
+                  <a:srgbClr val="3B57A0"/>
+                </a:solidFill>
+                <a:latin typeface="Courier New" pitchFamily="49" charset="0"/>
+                <a:cs typeface="Courier New" pitchFamily="49" charset="0"/>
+              </a:rPr>
+              <a:t>gaspi_proc_term</a:t>
+            </a:r>
+            <a:r>
+              <a:rPr lang="en-US" sz="1400" dirty="0">
+                <a:solidFill>
+                  <a:srgbClr val="000000"/>
+                </a:solidFill>
+                <a:latin typeface="Courier New" pitchFamily="49" charset="0"/>
+                <a:cs typeface="Courier New" pitchFamily="49" charset="0"/>
+              </a:rPr>
+              <a:t>(GASPI_BLOCK) );   </a:t>
             </a:r>
           </a:p>
           <a:p>
@@ -13730,7 +14913,7 @@
               <a:buFont typeface="Arial" charset="0"/>
               <a:buNone/>
             </a:pPr>
-            <a:endParaRPr lang="en-US" sz="1400">
+            <a:endParaRPr lang="en-US" sz="1400" dirty="0">
               <a:solidFill>
                 <a:srgbClr val="000000"/>
               </a:solidFill>
@@ -13744,7 +14927,7 @@
               <a:buNone/>
             </a:pPr>
             <a:r>
-              <a:rPr lang="en-US" sz="1400">
+              <a:rPr lang="en-US" sz="1400" dirty="0">
                 <a:solidFill>
                   <a:srgbClr val="000000"/>
                 </a:solidFill>
@@ -13760,7 +14943,7 @@
               <a:buNone/>
             </a:pPr>
             <a:r>
-              <a:rPr lang="en-US" sz="1400">
+              <a:rPr lang="en-US" sz="1400" dirty="0">
                 <a:solidFill>
                   <a:srgbClr val="000000"/>
                 </a:solidFill>
@@ -15420,26 +16603,6 @@
           </a:p>
         </p:txBody>
       </p:sp>
-      <p:sp>
-        <p:nvSpPr>
-          <p:cNvPr id="16386" name="Rectangle 5"/>
-          <p:cNvSpPr>
-            <a:spLocks noGrp="1"/>
-          </p:cNvSpPr>
-          <p:nvPr>
-            <p:ph type="subTitle" idx="1"/>
-          </p:nvPr>
-        </p:nvSpPr>
-        <p:spPr/>
-        <p:txBody>
-          <a:bodyPr/>
-          <a:lstStyle/>
-          <a:p>
-            <a:pPr eaLnBrk="1" hangingPunct="1"/>
-            <a:endParaRPr lang="de-DE" smtClean="0"/>
-          </a:p>
-        </p:txBody>
-      </p:sp>
     </p:spTree>
   </p:cSld>
   <p:clrMapOvr>
@@ -15988,7 +17151,10 @@
               <a:t> ( </a:t>
             </a:r>
             <a:r>
-              <a:rPr lang="en-US" sz="1400" dirty="0" err="1">
+              <a:rPr lang="en-US" sz="1400" b="1" dirty="0" err="1">
+                <a:solidFill>
+                  <a:srgbClr val="3B57A0"/>
+                </a:solidFill>
                 <a:latin typeface="Courier New" pitchFamily="49" charset="0"/>
                 <a:cs typeface="Courier New" pitchFamily="49" charset="0"/>
               </a:rPr>
@@ -16030,7 +17196,10 @@
               <a:t>                 , </a:t>
             </a:r>
             <a:r>
-              <a:rPr lang="en-US" sz="1400" dirty="0" err="1">
+              <a:rPr lang="en-US" sz="1400" b="1" dirty="0" err="1">
+                <a:solidFill>
+                  <a:srgbClr val="3B57A0"/>
+                </a:solidFill>
                 <a:latin typeface="Courier New" pitchFamily="49" charset="0"/>
                 <a:cs typeface="Courier New" pitchFamily="49" charset="0"/>
               </a:rPr>
@@ -16072,18 +17241,31 @@
               <a:t>                 , </a:t>
             </a:r>
             <a:r>
-              <a:rPr lang="en-US" sz="1400" dirty="0" err="1">
+              <a:rPr lang="en-US" sz="1400" b="1" dirty="0" err="1">
+                <a:solidFill>
+                  <a:srgbClr val="3B57A0"/>
+                </a:solidFill>
                 <a:latin typeface="Courier New" pitchFamily="49" charset="0"/>
                 <a:cs typeface="Courier New" pitchFamily="49" charset="0"/>
               </a:rPr>
               <a:t>gaspi_notification_t</a:t>
             </a:r>
             <a:r>
+              <a:rPr lang="en-US" sz="1400" b="1" dirty="0">
+                <a:solidFill>
+                  <a:srgbClr val="3B57A0"/>
+                </a:solidFill>
+                <a:latin typeface="Courier New" pitchFamily="49" charset="0"/>
+                <a:cs typeface="Courier New" pitchFamily="49" charset="0"/>
+              </a:rPr>
+              <a:t> </a:t>
+            </a:r>
+            <a:r>
               <a:rPr lang="en-US" sz="1400" dirty="0">
                 <a:latin typeface="Courier New" pitchFamily="49" charset="0"/>
                 <a:cs typeface="Courier New" pitchFamily="49" charset="0"/>
               </a:rPr>
-              <a:t> expected  )</a:t>
+              <a:t>expected  )</a:t>
             </a:r>
           </a:p>
           <a:p>
@@ -16114,7 +17296,10 @@
               <a:t>	</a:t>
             </a:r>
             <a:r>
-              <a:rPr lang="en-US" sz="1400" dirty="0" err="1">
+              <a:rPr lang="en-US" sz="1400" b="1" dirty="0" err="1">
+                <a:solidFill>
+                  <a:srgbClr val="3B57A0"/>
+                </a:solidFill>
                 <a:latin typeface="Courier New" pitchFamily="49" charset="0"/>
                 <a:cs typeface="Courier New" pitchFamily="49" charset="0"/>
               </a:rPr>
@@ -16146,7 +17331,17 @@
                 <a:latin typeface="Courier New" pitchFamily="49" charset="0"/>
                 <a:cs typeface="Courier New" pitchFamily="49" charset="0"/>
               </a:rPr>
-              <a:t>gaspi_notify_waitsome</a:t>
+              <a:t>g</a:t>
+            </a:r>
+            <a:r>
+              <a:rPr lang="en-US" sz="1400" b="1" dirty="0" err="1">
+                <a:solidFill>
+                  <a:srgbClr val="3B57A0"/>
+                </a:solidFill>
+                <a:latin typeface="Courier New" pitchFamily="49" charset="0"/>
+                <a:cs typeface="Courier New" pitchFamily="49" charset="0"/>
+              </a:rPr>
+              <a:t>aspi_notify_waitsome</a:t>
             </a:r>
             <a:r>
               <a:rPr lang="en-US" sz="1400" dirty="0">
@@ -16192,7 +17387,24 @@
                 <a:latin typeface="Courier New" pitchFamily="49" charset="0"/>
                 <a:cs typeface="Courier New" pitchFamily="49" charset="0"/>
               </a:rPr>
-              <a:t>									          , 1, &amp;id, GASPI_BLOCK) );  </a:t>
+              <a:t>									          , 1, &amp;id, </a:t>
+            </a:r>
+            <a:r>
+              <a:rPr lang="en-US" sz="1400" b="1" dirty="0">
+                <a:solidFill>
+                  <a:srgbClr val="3B57A0"/>
+                </a:solidFill>
+                <a:latin typeface="Courier New" pitchFamily="49" charset="0"/>
+                <a:cs typeface="Courier New" pitchFamily="49" charset="0"/>
+              </a:rPr>
+              <a:t>GASPI_BLOCK</a:t>
+            </a:r>
+            <a:r>
+              <a:rPr lang="en-US" sz="1400" dirty="0">
+                <a:latin typeface="Courier New" pitchFamily="49" charset="0"/>
+                <a:cs typeface="Courier New" pitchFamily="49" charset="0"/>
+              </a:rPr>
+              <a:t>) );  </a:t>
             </a:r>
           </a:p>
           <a:p>
@@ -16259,7 +17471,10 @@
               <a:t>	</a:t>
             </a:r>
             <a:r>
-              <a:rPr lang="en-US" sz="1400" dirty="0" err="1">
+              <a:rPr lang="en-US" sz="1400" b="1" dirty="0" err="1">
+                <a:solidFill>
+                  <a:srgbClr val="3B57A0"/>
+                </a:solidFill>
                 <a:latin typeface="Courier New" pitchFamily="49" charset="0"/>
                 <a:cs typeface="Courier New" pitchFamily="49" charset="0"/>
               </a:rPr>
@@ -16287,7 +17502,10 @@
               <a:t>	SUCCESS_OR_DIE (</a:t>
             </a:r>
             <a:r>
-              <a:rPr lang="en-US" sz="1400" dirty="0" err="1">
+              <a:rPr lang="en-US" sz="1400" b="1" dirty="0" err="1">
+                <a:solidFill>
+                  <a:srgbClr val="3B57A0"/>
+                </a:solidFill>
                 <a:latin typeface="Courier New" pitchFamily="49" charset="0"/>
                 <a:cs typeface="Courier New" pitchFamily="49" charset="0"/>
               </a:rPr>
@@ -17724,7 +18942,7 @@
                 <a:latin typeface="Courier New" pitchFamily="49" charset="0"/>
                 <a:cs typeface="Courier New" pitchFamily="49" charset="0"/>
               </a:rPr>
-              <a:t>MPI_Issend</a:t>
+              <a:t>MPI_Isend</a:t>
             </a:r>
             <a:r>
               <a:rPr lang="de-DE" sz="1400" b="1" dirty="0" smtClean="0">
@@ -17781,6 +18999,13 @@
                 <a:cs typeface="Courier New" pitchFamily="49" charset="0"/>
               </a:rPr>
               <a:t>, 0), VLEN, 				</a:t>
+            </a:r>
+            <a:r>
+              <a:rPr lang="de-DE" sz="1400" dirty="0" smtClean="0">
+                <a:latin typeface="Courier New" pitchFamily="49" charset="0"/>
+                <a:cs typeface="Courier New" pitchFamily="49" charset="0"/>
+              </a:rPr>
+              <a:t>    </a:t>
             </a:r>
             <a:r>
               <a:rPr lang="de-DE" sz="1400" b="1" dirty="0" smtClean="0">
@@ -22116,10 +23341,6 @@
               </a:rPr>
               <a:t>[2];</a:t>
             </a:r>
-            <a:endParaRPr lang="de-DE" sz="1400" dirty="0" smtClean="0">
-              <a:latin typeface="Courier New" pitchFamily="49" charset="0"/>
-              <a:cs typeface="Courier New" pitchFamily="49" charset="0"/>
-            </a:endParaRPr>
           </a:p>
           <a:p>
             <a:pPr>
@@ -22174,14 +23395,7 @@
                 <a:latin typeface="Courier New" pitchFamily="49" charset="0"/>
                 <a:cs typeface="Courier New" pitchFamily="49" charset="0"/>
               </a:rPr>
-              <a:t>   = </a:t>
-            </a:r>
-            <a:r>
-              <a:rPr lang="de-DE" sz="1400" dirty="0" smtClean="0">
-                <a:latin typeface="Courier New" pitchFamily="49" charset="0"/>
-                <a:cs typeface="Courier New" pitchFamily="49" charset="0"/>
-              </a:rPr>
-              <a:t>0; </a:t>
+              <a:t>   = 0; </a:t>
             </a:r>
             <a:r>
               <a:rPr lang="de-DE" sz="1400" dirty="0" err="1" smtClean="0">
@@ -22195,21 +23409,7 @@
                 <a:latin typeface="Courier New" pitchFamily="49" charset="0"/>
                 <a:cs typeface="Courier New" pitchFamily="49" charset="0"/>
               </a:rPr>
-              <a:t>    </a:t>
-            </a:r>
-            <a:r>
-              <a:rPr lang="de-DE" sz="1400" dirty="0" smtClean="0">
-                <a:latin typeface="Courier New" pitchFamily="49" charset="0"/>
-                <a:cs typeface="Courier New" pitchFamily="49" charset="0"/>
-              </a:rPr>
-              <a:t>= </a:t>
-            </a:r>
-            <a:r>
-              <a:rPr lang="de-DE" sz="1400" dirty="0" smtClean="0">
-                <a:latin typeface="Courier New" pitchFamily="49" charset="0"/>
-                <a:cs typeface="Courier New" pitchFamily="49" charset="0"/>
-              </a:rPr>
-              <a:t>1; </a:t>
+              <a:t>    = 1; </a:t>
             </a:r>
             <a:r>
               <a:rPr lang="de-DE" sz="1400" dirty="0" err="1" smtClean="0">
@@ -22223,14 +23423,7 @@
                 <a:latin typeface="Courier New" pitchFamily="49" charset="0"/>
                 <a:cs typeface="Courier New" pitchFamily="49" charset="0"/>
               </a:rPr>
-              <a:t>  </a:t>
-            </a:r>
-            <a:r>
-              <a:rPr lang="de-DE" sz="1400" dirty="0" smtClean="0">
-                <a:latin typeface="Courier New" pitchFamily="49" charset="0"/>
-                <a:cs typeface="Courier New" pitchFamily="49" charset="0"/>
-              </a:rPr>
-              <a:t>= 2;        </a:t>
+              <a:t>  = 2;        </a:t>
             </a:r>
           </a:p>
           <a:p>
@@ -22356,14 +23549,7 @@
                 <a:latin typeface="Courier New" pitchFamily="49" charset="0"/>
                 <a:cs typeface="Courier New" pitchFamily="49" charset="0"/>
               </a:rPr>
-              <a:t>, </a:t>
-            </a:r>
-            <a:r>
-              <a:rPr lang="de-DE" sz="1400" dirty="0" smtClean="0">
-                <a:latin typeface="Courier New" pitchFamily="49" charset="0"/>
-                <a:cs typeface="Courier New" pitchFamily="49" charset="0"/>
-              </a:rPr>
-              <a:t>&amp;</a:t>
+              <a:t>, &amp;</a:t>
             </a:r>
             <a:r>
               <a:rPr lang="de-DE" sz="1400" dirty="0" err="1" smtClean="0">
@@ -22377,14 +23563,7 @@
                 <a:latin typeface="Courier New" pitchFamily="49" charset="0"/>
                 <a:cs typeface="Courier New" pitchFamily="49" charset="0"/>
               </a:rPr>
-              <a:t>[0</a:t>
-            </a:r>
-            <a:r>
-              <a:rPr lang="de-DE" sz="1400" dirty="0" smtClean="0">
-                <a:latin typeface="Courier New" pitchFamily="49" charset="0"/>
-                <a:cs typeface="Courier New" pitchFamily="49" charset="0"/>
-              </a:rPr>
-              <a:t>]);</a:t>
+              <a:t>[0]);</a:t>
             </a:r>
           </a:p>
           <a:p>
@@ -22510,14 +23689,7 @@
                 <a:latin typeface="Courier New" pitchFamily="49" charset="0"/>
                 <a:cs typeface="Courier New" pitchFamily="49" charset="0"/>
               </a:rPr>
-              <a:t>, </a:t>
-            </a:r>
-            <a:r>
-              <a:rPr lang="de-DE" sz="1400" dirty="0" smtClean="0">
-                <a:latin typeface="Courier New" pitchFamily="49" charset="0"/>
-                <a:cs typeface="Courier New" pitchFamily="49" charset="0"/>
-              </a:rPr>
-              <a:t>&amp;</a:t>
+              <a:t>, &amp;</a:t>
             </a:r>
             <a:r>
               <a:rPr lang="de-DE" sz="1400" dirty="0" err="1" smtClean="0">
@@ -22531,14 +23703,7 @@
                 <a:latin typeface="Courier New" pitchFamily="49" charset="0"/>
                 <a:cs typeface="Courier New" pitchFamily="49" charset="0"/>
               </a:rPr>
-              <a:t>[1</a:t>
-            </a:r>
-            <a:r>
-              <a:rPr lang="de-DE" sz="1400" dirty="0" smtClean="0">
-                <a:latin typeface="Courier New" pitchFamily="49" charset="0"/>
-                <a:cs typeface="Courier New" pitchFamily="49" charset="0"/>
-              </a:rPr>
-              <a:t>]);</a:t>
+              <a:t>[1]);</a:t>
             </a:r>
           </a:p>
           <a:p>
@@ -22566,7 +23731,7 @@
                 <a:latin typeface="Courier New" pitchFamily="49" charset="0"/>
                 <a:cs typeface="Courier New" pitchFamily="49" charset="0"/>
               </a:rPr>
-              <a:t>MPI_Issend</a:t>
+              <a:t>MPI_Isend</a:t>
             </a:r>
             <a:r>
               <a:rPr lang="de-DE" sz="1400" b="1" dirty="0" smtClean="0">
@@ -22664,14 +23829,7 @@
                 <a:latin typeface="Courier New" pitchFamily="49" charset="0"/>
                 <a:cs typeface="Courier New" pitchFamily="49" charset="0"/>
               </a:rPr>
-              <a:t>, </a:t>
-            </a:r>
-            <a:r>
-              <a:rPr lang="de-DE" sz="1400" dirty="0" smtClean="0">
-                <a:latin typeface="Courier New" pitchFamily="49" charset="0"/>
-                <a:cs typeface="Courier New" pitchFamily="49" charset="0"/>
-              </a:rPr>
-              <a:t>&amp;</a:t>
+              <a:t>, &amp;</a:t>
             </a:r>
             <a:r>
               <a:rPr lang="de-DE" sz="1400" dirty="0" err="1" smtClean="0">
@@ -22687,10 +23845,6 @@
               </a:rPr>
               <a:t>[0]);</a:t>
             </a:r>
-            <a:endParaRPr lang="de-DE" sz="1400" dirty="0" smtClean="0">
-              <a:latin typeface="Courier New" pitchFamily="49" charset="0"/>
-              <a:cs typeface="Courier New" pitchFamily="49" charset="0"/>
-            </a:endParaRPr>
           </a:p>
           <a:p>
             <a:pPr>
@@ -22710,7 +23864,7 @@
                 <a:latin typeface="Courier New" pitchFamily="49" charset="0"/>
                 <a:cs typeface="Courier New" pitchFamily="49" charset="0"/>
               </a:rPr>
-              <a:t>MPI_Issend</a:t>
+              <a:t>MPI_Isend</a:t>
             </a:r>
             <a:r>
               <a:rPr lang="de-DE" sz="1400" b="1" dirty="0" smtClean="0">
@@ -22773,7 +23927,14 @@
                 <a:latin typeface="Courier New" pitchFamily="49" charset="0"/>
                 <a:cs typeface="Courier New" pitchFamily="49" charset="0"/>
               </a:rPr>
-              <a:t>	MPI_DOUBLE</a:t>
+              <a:t>	</a:t>
+            </a:r>
+            <a:r>
+              <a:rPr lang="de-DE" sz="1400" b="1" dirty="0" smtClean="0">
+                <a:latin typeface="Courier New" pitchFamily="49" charset="0"/>
+                <a:cs typeface="Courier New" pitchFamily="49" charset="0"/>
+              </a:rPr>
+              <a:t>    MPI_DOUBLE</a:t>
             </a:r>
             <a:r>
               <a:rPr lang="de-DE" sz="1400" dirty="0" smtClean="0">
@@ -22808,14 +23969,7 @@
                 <a:latin typeface="Courier New" pitchFamily="49" charset="0"/>
                 <a:cs typeface="Courier New" pitchFamily="49" charset="0"/>
               </a:rPr>
-              <a:t>, </a:t>
-            </a:r>
-            <a:r>
-              <a:rPr lang="de-DE" sz="1400" dirty="0" smtClean="0">
-                <a:latin typeface="Courier New" pitchFamily="49" charset="0"/>
-                <a:cs typeface="Courier New" pitchFamily="49" charset="0"/>
-              </a:rPr>
-              <a:t>&amp;</a:t>
+              <a:t>, &amp;</a:t>
             </a:r>
             <a:r>
               <a:rPr lang="de-DE" sz="1400" dirty="0" err="1" smtClean="0">
@@ -22831,10 +23985,6 @@
               </a:rPr>
               <a:t>[1]);</a:t>
             </a:r>
-            <a:endParaRPr lang="de-DE" sz="1400" dirty="0" smtClean="0">
-              <a:latin typeface="Courier New" pitchFamily="49" charset="0"/>
-              <a:cs typeface="Courier New" pitchFamily="49" charset="0"/>
-            </a:endParaRPr>
           </a:p>
           <a:p>
             <a:pPr>
@@ -23414,10 +24564,6 @@
               </a:rPr>
               <a:t>[2];</a:t>
             </a:r>
-            <a:endParaRPr lang="de-DE" sz="1400" dirty="0" smtClean="0">
-              <a:latin typeface="Courier New" pitchFamily="49" charset="0"/>
-              <a:cs typeface="Courier New" pitchFamily="49" charset="0"/>
-            </a:endParaRPr>
           </a:p>
           <a:p>
             <a:pPr>
@@ -23472,14 +24618,7 @@
                 <a:latin typeface="Courier New" pitchFamily="49" charset="0"/>
                 <a:cs typeface="Courier New" pitchFamily="49" charset="0"/>
               </a:rPr>
-              <a:t>   = </a:t>
-            </a:r>
-            <a:r>
-              <a:rPr lang="de-DE" sz="1400" dirty="0" smtClean="0">
-                <a:latin typeface="Courier New" pitchFamily="49" charset="0"/>
-                <a:cs typeface="Courier New" pitchFamily="49" charset="0"/>
-              </a:rPr>
-              <a:t>0; </a:t>
+              <a:t>   = 0; </a:t>
             </a:r>
             <a:r>
               <a:rPr lang="de-DE" sz="1400" dirty="0" err="1" smtClean="0">
@@ -23493,21 +24632,7 @@
                 <a:latin typeface="Courier New" pitchFamily="49" charset="0"/>
                 <a:cs typeface="Courier New" pitchFamily="49" charset="0"/>
               </a:rPr>
-              <a:t>    </a:t>
-            </a:r>
-            <a:r>
-              <a:rPr lang="de-DE" sz="1400" dirty="0" smtClean="0">
-                <a:latin typeface="Courier New" pitchFamily="49" charset="0"/>
-                <a:cs typeface="Courier New" pitchFamily="49" charset="0"/>
-              </a:rPr>
-              <a:t>= </a:t>
-            </a:r>
-            <a:r>
-              <a:rPr lang="de-DE" sz="1400" dirty="0" smtClean="0">
-                <a:latin typeface="Courier New" pitchFamily="49" charset="0"/>
-                <a:cs typeface="Courier New" pitchFamily="49" charset="0"/>
-              </a:rPr>
-              <a:t>1; </a:t>
+              <a:t>    = 1; </a:t>
             </a:r>
             <a:r>
               <a:rPr lang="de-DE" sz="1400" dirty="0" err="1" smtClean="0">
@@ -23521,14 +24646,7 @@
                 <a:latin typeface="Courier New" pitchFamily="49" charset="0"/>
                 <a:cs typeface="Courier New" pitchFamily="49" charset="0"/>
               </a:rPr>
-              <a:t>  </a:t>
-            </a:r>
-            <a:r>
-              <a:rPr lang="de-DE" sz="1400" dirty="0" smtClean="0">
-                <a:latin typeface="Courier New" pitchFamily="49" charset="0"/>
-                <a:cs typeface="Courier New" pitchFamily="49" charset="0"/>
-              </a:rPr>
-              <a:t>= 2;        </a:t>
+              <a:t>  = 2;        </a:t>
             </a:r>
           </a:p>
           <a:p>
@@ -23654,14 +24772,7 @@
                 <a:latin typeface="Courier New" pitchFamily="49" charset="0"/>
                 <a:cs typeface="Courier New" pitchFamily="49" charset="0"/>
               </a:rPr>
-              <a:t>, </a:t>
-            </a:r>
-            <a:r>
-              <a:rPr lang="de-DE" sz="1400" dirty="0" smtClean="0">
-                <a:latin typeface="Courier New" pitchFamily="49" charset="0"/>
-                <a:cs typeface="Courier New" pitchFamily="49" charset="0"/>
-              </a:rPr>
-              <a:t>&amp;</a:t>
+              <a:t>, &amp;</a:t>
             </a:r>
             <a:r>
               <a:rPr lang="de-DE" sz="1400" dirty="0" err="1" smtClean="0">
@@ -23675,14 +24786,7 @@
                 <a:latin typeface="Courier New" pitchFamily="49" charset="0"/>
                 <a:cs typeface="Courier New" pitchFamily="49" charset="0"/>
               </a:rPr>
-              <a:t>[0</a:t>
-            </a:r>
-            <a:r>
-              <a:rPr lang="de-DE" sz="1400" dirty="0" smtClean="0">
-                <a:latin typeface="Courier New" pitchFamily="49" charset="0"/>
-                <a:cs typeface="Courier New" pitchFamily="49" charset="0"/>
-              </a:rPr>
-              <a:t>]);</a:t>
+              <a:t>[0]);</a:t>
             </a:r>
           </a:p>
           <a:p>
@@ -23808,14 +24912,7 @@
                 <a:latin typeface="Courier New" pitchFamily="49" charset="0"/>
                 <a:cs typeface="Courier New" pitchFamily="49" charset="0"/>
               </a:rPr>
-              <a:t>, </a:t>
-            </a:r>
-            <a:r>
-              <a:rPr lang="de-DE" sz="1400" dirty="0" smtClean="0">
-                <a:latin typeface="Courier New" pitchFamily="49" charset="0"/>
-                <a:cs typeface="Courier New" pitchFamily="49" charset="0"/>
-              </a:rPr>
-              <a:t>&amp;</a:t>
+              <a:t>, &amp;</a:t>
             </a:r>
             <a:r>
               <a:rPr lang="de-DE" sz="1400" dirty="0" err="1" smtClean="0">
@@ -23829,14 +24926,7 @@
                 <a:latin typeface="Courier New" pitchFamily="49" charset="0"/>
                 <a:cs typeface="Courier New" pitchFamily="49" charset="0"/>
               </a:rPr>
-              <a:t>[1</a:t>
-            </a:r>
-            <a:r>
-              <a:rPr lang="de-DE" sz="1400" dirty="0" smtClean="0">
-                <a:latin typeface="Courier New" pitchFamily="49" charset="0"/>
-                <a:cs typeface="Courier New" pitchFamily="49" charset="0"/>
-              </a:rPr>
-              <a:t>]);</a:t>
+              <a:t>[1]);</a:t>
             </a:r>
           </a:p>
           <a:p>
@@ -23864,7 +24954,7 @@
                 <a:latin typeface="Courier New" pitchFamily="49" charset="0"/>
                 <a:cs typeface="Courier New" pitchFamily="49" charset="0"/>
               </a:rPr>
-              <a:t>MPI_Issend</a:t>
+              <a:t>MPI_Isend</a:t>
             </a:r>
             <a:r>
               <a:rPr lang="de-DE" sz="1400" b="1" dirty="0" smtClean="0">
@@ -23962,14 +25052,7 @@
                 <a:latin typeface="Courier New" pitchFamily="49" charset="0"/>
                 <a:cs typeface="Courier New" pitchFamily="49" charset="0"/>
               </a:rPr>
-              <a:t>, </a:t>
-            </a:r>
-            <a:r>
-              <a:rPr lang="de-DE" sz="1400" dirty="0" smtClean="0">
-                <a:latin typeface="Courier New" pitchFamily="49" charset="0"/>
-                <a:cs typeface="Courier New" pitchFamily="49" charset="0"/>
-              </a:rPr>
-              <a:t>&amp;</a:t>
+              <a:t>, &amp;</a:t>
             </a:r>
             <a:r>
               <a:rPr lang="de-DE" sz="1400" dirty="0" err="1" smtClean="0">
@@ -23985,10 +25068,6 @@
               </a:rPr>
               <a:t>[0]);</a:t>
             </a:r>
-            <a:endParaRPr lang="de-DE" sz="1400" dirty="0" smtClean="0">
-              <a:latin typeface="Courier New" pitchFamily="49" charset="0"/>
-              <a:cs typeface="Courier New" pitchFamily="49" charset="0"/>
-            </a:endParaRPr>
           </a:p>
           <a:p>
             <a:pPr>
@@ -24008,7 +25087,7 @@
                 <a:latin typeface="Courier New" pitchFamily="49" charset="0"/>
                 <a:cs typeface="Courier New" pitchFamily="49" charset="0"/>
               </a:rPr>
-              <a:t>MPI_Issend</a:t>
+              <a:t>MPI_Isend</a:t>
             </a:r>
             <a:r>
               <a:rPr lang="de-DE" sz="1400" b="1" dirty="0" smtClean="0">
@@ -24071,7 +25150,14 @@
                 <a:latin typeface="Courier New" pitchFamily="49" charset="0"/>
                 <a:cs typeface="Courier New" pitchFamily="49" charset="0"/>
               </a:rPr>
-              <a:t>	MPI_DOUBLE</a:t>
+              <a:t>	</a:t>
+            </a:r>
+            <a:r>
+              <a:rPr lang="de-DE" sz="1400" b="1" dirty="0" smtClean="0">
+                <a:latin typeface="Courier New" pitchFamily="49" charset="0"/>
+                <a:cs typeface="Courier New" pitchFamily="49" charset="0"/>
+              </a:rPr>
+              <a:t>    MPI_DOUBLE</a:t>
             </a:r>
             <a:r>
               <a:rPr lang="de-DE" sz="1400" dirty="0" smtClean="0">
@@ -24106,14 +25192,7 @@
                 <a:latin typeface="Courier New" pitchFamily="49" charset="0"/>
                 <a:cs typeface="Courier New" pitchFamily="49" charset="0"/>
               </a:rPr>
-              <a:t>, </a:t>
-            </a:r>
-            <a:r>
-              <a:rPr lang="de-DE" sz="1400" dirty="0" smtClean="0">
-                <a:latin typeface="Courier New" pitchFamily="49" charset="0"/>
-                <a:cs typeface="Courier New" pitchFamily="49" charset="0"/>
-              </a:rPr>
-              <a:t>&amp;</a:t>
+              <a:t>, &amp;</a:t>
             </a:r>
             <a:r>
               <a:rPr lang="de-DE" sz="1400" dirty="0" err="1" smtClean="0">
@@ -24140,14 +25219,7 @@
                 <a:latin typeface="Courier New" pitchFamily="49" charset="0"/>
                 <a:cs typeface="Courier New" pitchFamily="49" charset="0"/>
               </a:rPr>
-              <a:t> </a:t>
-            </a:r>
-            <a:r>
-              <a:rPr lang="de-DE" sz="1400" b="1" dirty="0" smtClean="0">
-                <a:latin typeface="Courier New" pitchFamily="49" charset="0"/>
-                <a:cs typeface="Courier New" pitchFamily="49" charset="0"/>
-              </a:rPr>
-              <a:t>     </a:t>
+              <a:t>      </a:t>
             </a:r>
             <a:r>
               <a:rPr lang="de-DE" sz="1400" b="1" dirty="0" err="1" smtClean="0">
@@ -24175,19 +25247,8 @@
                 <a:latin typeface="Courier New" pitchFamily="49" charset="0"/>
                 <a:cs typeface="Courier New" pitchFamily="49" charset="0"/>
               </a:rPr>
-              <a:t>[0</a:t>
-            </a:r>
-            <a:r>
-              <a:rPr lang="de-DE" sz="1400" dirty="0" smtClean="0">
-                <a:latin typeface="Courier New" pitchFamily="49" charset="0"/>
-                <a:cs typeface="Courier New" pitchFamily="49" charset="0"/>
-              </a:rPr>
-              <a:t>]);</a:t>
-            </a:r>
-            <a:endParaRPr lang="de-DE" sz="1400" dirty="0" smtClean="0">
-              <a:latin typeface="Courier New" pitchFamily="49" charset="0"/>
-              <a:cs typeface="Courier New" pitchFamily="49" charset="0"/>
-            </a:endParaRPr>
+              <a:t>[0]);</a:t>
+            </a:r>
           </a:p>
           <a:p>
             <a:pPr>
@@ -24230,10 +25291,6 @@
               </a:rPr>
               <a:t>[1]);</a:t>
             </a:r>
-            <a:endParaRPr lang="de-DE" sz="1400" dirty="0" smtClean="0">
-              <a:latin typeface="Courier New" pitchFamily="49" charset="0"/>
-              <a:cs typeface="Courier New" pitchFamily="49" charset="0"/>
-            </a:endParaRPr>
           </a:p>
           <a:p>
             <a:pPr>
@@ -24572,7 +25629,7 @@
       </p:sp>
       <p:pic>
         <p:nvPicPr>
-          <p:cNvPr id="17411" name="Grafik 5" descr="XeonPhi.png"/>
+          <p:cNvPr id="6" name="Grafik 5" descr="async-bulk.png"/>
           <p:cNvPicPr>
             <a:picLocks noChangeAspect="1"/>
           </p:cNvPicPr>
@@ -24580,58 +25637,18 @@
         </p:nvPicPr>
         <p:blipFill>
           <a:blip r:embed="rId2"/>
-          <a:srcRect/>
           <a:stretch>
             <a:fillRect/>
           </a:stretch>
         </p:blipFill>
-        <p:spPr bwMode="auto">
+        <p:spPr>
           <a:xfrm>
-            <a:off x="4930775" y="3705225"/>
-            <a:ext cx="3756025" cy="2420938"/>
+            <a:off x="717913" y="3694335"/>
+            <a:ext cx="6330982" cy="2420938"/>
           </a:xfrm>
           <a:prstGeom prst="rect">
             <a:avLst/>
           </a:prstGeom>
-          <a:noFill/>
-          <a:ln w="9525">
-            <a:noFill/>
-            <a:miter lim="800000"/>
-            <a:headEnd/>
-            <a:tailEnd/>
-          </a:ln>
-        </p:spPr>
-      </p:pic>
-      <p:pic>
-        <p:nvPicPr>
-          <p:cNvPr id="17412" name="Picture 5"/>
-          <p:cNvPicPr>
-            <a:picLocks noChangeAspect="1" noChangeArrowheads="1"/>
-          </p:cNvPicPr>
-          <p:nvPr/>
-        </p:nvPicPr>
-        <p:blipFill>
-          <a:blip r:embed="rId3"/>
-          <a:srcRect/>
-          <a:stretch>
-            <a:fillRect/>
-          </a:stretch>
-        </p:blipFill>
-        <p:spPr bwMode="auto">
-          <a:xfrm>
-            <a:off x="749300" y="3490913"/>
-            <a:ext cx="3646488" cy="2735262"/>
-          </a:xfrm>
-          <a:prstGeom prst="rect">
-            <a:avLst/>
-          </a:prstGeom>
-          <a:noFill/>
-          <a:ln w="9525">
-            <a:noFill/>
-            <a:miter lim="800000"/>
-            <a:headEnd/>
-            <a:tailEnd/>
-          </a:ln>
         </p:spPr>
       </p:pic>
     </p:spTree>
@@ -28432,7 +29449,12 @@
             <p:ph idx="4294967295"/>
           </p:nvPr>
         </p:nvSpPr>
-        <p:spPr/>
+        <p:spPr>
+          <a:xfrm>
+            <a:off x="457200" y="1788203"/>
+            <a:ext cx="8229600" cy="4229100"/>
+          </a:xfrm>
+        </p:spPr>
         <p:txBody>
           <a:bodyPr/>
           <a:lstStyle/>
@@ -28459,8 +29481,8 @@
         </p:nvSpPr>
         <p:spPr bwMode="auto">
           <a:xfrm>
-            <a:off x="457200" y="2441118"/>
-            <a:ext cx="8505825" cy="4384224"/>
+            <a:off x="457200" y="2343144"/>
+            <a:ext cx="8505825" cy="4438657"/>
           </a:xfrm>
           <a:prstGeom prst="rect">
             <a:avLst/>
@@ -28973,17 +29995,7 @@
                 <a:latin typeface="Courier New" pitchFamily="49" charset="0"/>
                 <a:cs typeface="Courier New" pitchFamily="49" charset="0"/>
               </a:rPr>
-              <a:t>, </a:t>
-            </a:r>
-            <a:r>
-              <a:rPr lang="de-DE" sz="1400" dirty="0" smtClean="0">
-                <a:solidFill>
-                  <a:schemeClr val="tx1"/>
-                </a:solidFill>
-                <a:latin typeface="Courier New" pitchFamily="49" charset="0"/>
-                <a:cs typeface="Courier New" pitchFamily="49" charset="0"/>
-              </a:rPr>
-              <a:t>&amp;</a:t>
+              <a:t>, &amp;</a:t>
             </a:r>
             <a:r>
               <a:rPr lang="de-DE" sz="1400" dirty="0" err="1" smtClean="0">
@@ -29003,17 +30015,7 @@
                 <a:latin typeface="Courier New" pitchFamily="49" charset="0"/>
                 <a:cs typeface="Courier New" pitchFamily="49" charset="0"/>
               </a:rPr>
-              <a:t>[0</a:t>
-            </a:r>
-            <a:r>
-              <a:rPr lang="de-DE" sz="1400" dirty="0" smtClean="0">
-                <a:solidFill>
-                  <a:schemeClr val="tx1"/>
-                </a:solidFill>
-                <a:latin typeface="Courier New" pitchFamily="49" charset="0"/>
-                <a:cs typeface="Courier New" pitchFamily="49" charset="0"/>
-              </a:rPr>
-              <a:t>]);</a:t>
+              <a:t>[0]);</a:t>
             </a:r>
           </a:p>
           <a:p>
@@ -29168,17 +30170,7 @@
                 <a:latin typeface="Courier New" pitchFamily="49" charset="0"/>
                 <a:cs typeface="Courier New" pitchFamily="49" charset="0"/>
               </a:rPr>
-              <a:t>, </a:t>
-            </a:r>
-            <a:r>
-              <a:rPr lang="de-DE" sz="1400" dirty="0" smtClean="0">
-                <a:solidFill>
-                  <a:schemeClr val="tx1"/>
-                </a:solidFill>
-                <a:latin typeface="Courier New" pitchFamily="49" charset="0"/>
-                <a:cs typeface="Courier New" pitchFamily="49" charset="0"/>
-              </a:rPr>
-              <a:t>&amp;</a:t>
+              <a:t>, &amp;</a:t>
             </a:r>
             <a:r>
               <a:rPr lang="de-DE" sz="1400" dirty="0" err="1" smtClean="0">
@@ -29198,17 +30190,7 @@
                 <a:latin typeface="Courier New" pitchFamily="49" charset="0"/>
                 <a:cs typeface="Courier New" pitchFamily="49" charset="0"/>
               </a:rPr>
-              <a:t>[1</a:t>
-            </a:r>
-            <a:r>
-              <a:rPr lang="de-DE" sz="1400" dirty="0" smtClean="0">
-                <a:solidFill>
-                  <a:schemeClr val="tx1"/>
-                </a:solidFill>
-                <a:latin typeface="Courier New" pitchFamily="49" charset="0"/>
-                <a:cs typeface="Courier New" pitchFamily="49" charset="0"/>
-              </a:rPr>
-              <a:t>]);</a:t>
+              <a:t>[1]);</a:t>
             </a:r>
           </a:p>
           <a:p>
@@ -29233,17 +30215,27 @@
                 <a:latin typeface="Courier New" pitchFamily="49" charset="0"/>
                 <a:cs typeface="Courier New" pitchFamily="49" charset="0"/>
               </a:rPr>
-              <a:t>MPI_Issend</a:t>
-            </a:r>
-            <a:r>
-              <a:rPr lang="de-DE" sz="1400" dirty="0" smtClean="0">
-                <a:solidFill>
-                  <a:schemeClr val="tx1"/>
-                </a:solidFill>
-                <a:latin typeface="Courier New" pitchFamily="49" charset="0"/>
-                <a:cs typeface="Courier New" pitchFamily="49" charset="0"/>
-              </a:rPr>
-              <a:t> ( &amp;</a:t>
+              <a:t>MPI_Isend</a:t>
+            </a:r>
+            <a:r>
+              <a:rPr lang="de-DE" sz="1400" dirty="0" smtClean="0">
+                <a:solidFill>
+                  <a:schemeClr val="tx1"/>
+                </a:solidFill>
+                <a:latin typeface="Courier New" pitchFamily="49" charset="0"/>
+                <a:cs typeface="Courier New" pitchFamily="49" charset="0"/>
+              </a:rPr>
+              <a:t> </a:t>
+            </a:r>
+            <a:r>
+              <a:rPr lang="de-DE" sz="1400" dirty="0" smtClean="0">
+                <a:solidFill>
+                  <a:schemeClr val="tx1"/>
+                </a:solidFill>
+                <a:latin typeface="Courier New" pitchFamily="49" charset="0"/>
+                <a:cs typeface="Courier New" pitchFamily="49" charset="0"/>
+              </a:rPr>
+              <a:t>( &amp;</a:t>
             </a:r>
             <a:r>
               <a:rPr lang="de-DE" sz="1400" dirty="0" err="1" smtClean="0">
@@ -29363,19 +30355,114 @@
                 <a:latin typeface="Courier New" pitchFamily="49" charset="0"/>
                 <a:cs typeface="Courier New" pitchFamily="49" charset="0"/>
               </a:rPr>
+              <a:t>, &amp;</a:t>
+            </a:r>
+            <a:r>
+              <a:rPr lang="de-DE" sz="1400" dirty="0" err="1" smtClean="0">
+                <a:solidFill>
+                  <a:schemeClr val="tx1"/>
+                </a:solidFill>
+                <a:latin typeface="Courier New" pitchFamily="49" charset="0"/>
+                <a:cs typeface="Courier New" pitchFamily="49" charset="0"/>
+              </a:rPr>
+              <a:t>send_req</a:t>
+            </a:r>
+            <a:r>
+              <a:rPr lang="de-DE" sz="1400" dirty="0" smtClean="0">
+                <a:solidFill>
+                  <a:schemeClr val="tx1"/>
+                </a:solidFill>
+                <a:latin typeface="Courier New" pitchFamily="49" charset="0"/>
+                <a:cs typeface="Courier New" pitchFamily="49" charset="0"/>
+              </a:rPr>
+              <a:t>[0]);</a:t>
+            </a:r>
+          </a:p>
+          <a:p>
+            <a:pPr>
+              <a:defRPr/>
+            </a:pPr>
+            <a:r>
+              <a:rPr lang="de-DE" sz="1400" dirty="0" smtClean="0">
+                <a:solidFill>
+                  <a:schemeClr val="tx1"/>
+                </a:solidFill>
+                <a:latin typeface="Courier New" pitchFamily="49" charset="0"/>
+                <a:cs typeface="Courier New" pitchFamily="49" charset="0"/>
+              </a:rPr>
+              <a:t>		</a:t>
+            </a:r>
+            <a:r>
+              <a:rPr lang="de-DE" sz="1400" b="1" dirty="0" err="1" smtClean="0">
+                <a:solidFill>
+                  <a:schemeClr val="tx1"/>
+                </a:solidFill>
+                <a:latin typeface="Courier New" pitchFamily="49" charset="0"/>
+                <a:cs typeface="Courier New" pitchFamily="49" charset="0"/>
+              </a:rPr>
+              <a:t>MPI_Isend</a:t>
+            </a:r>
+            <a:r>
+              <a:rPr lang="de-DE" sz="1400" dirty="0" smtClean="0">
+                <a:solidFill>
+                  <a:schemeClr val="tx1"/>
+                </a:solidFill>
+                <a:latin typeface="Courier New" pitchFamily="49" charset="0"/>
+                <a:cs typeface="Courier New" pitchFamily="49" charset="0"/>
+              </a:rPr>
+              <a:t> </a:t>
+            </a:r>
+            <a:r>
+              <a:rPr lang="de-DE" sz="1400" dirty="0" smtClean="0">
+                <a:solidFill>
+                  <a:schemeClr val="tx1"/>
+                </a:solidFill>
+                <a:latin typeface="Courier New" pitchFamily="49" charset="0"/>
+                <a:cs typeface="Courier New" pitchFamily="49" charset="0"/>
+              </a:rPr>
+              <a:t>( &amp;</a:t>
+            </a:r>
+            <a:r>
+              <a:rPr lang="de-DE" sz="1400" dirty="0" err="1" smtClean="0">
+                <a:solidFill>
+                  <a:schemeClr val="tx1"/>
+                </a:solidFill>
+                <a:latin typeface="Courier New" pitchFamily="49" charset="0"/>
+                <a:cs typeface="Courier New" pitchFamily="49" charset="0"/>
+              </a:rPr>
+              <a:t>array_ELEM_left</a:t>
+            </a:r>
+            <a:r>
+              <a:rPr lang="de-DE" sz="1400" dirty="0" smtClean="0">
+                <a:solidFill>
+                  <a:schemeClr val="tx1"/>
+                </a:solidFill>
+                <a:latin typeface="Courier New" pitchFamily="49" charset="0"/>
+                <a:cs typeface="Courier New" pitchFamily="49" charset="0"/>
+              </a:rPr>
+              <a:t> (</a:t>
+            </a:r>
+            <a:r>
+              <a:rPr lang="de-DE" sz="1400" dirty="0" err="1" smtClean="0">
+                <a:solidFill>
+                  <a:schemeClr val="tx1"/>
+                </a:solidFill>
+                <a:latin typeface="Courier New" pitchFamily="49" charset="0"/>
+                <a:cs typeface="Courier New" pitchFamily="49" charset="0"/>
+              </a:rPr>
+              <a:t>buffer_id</a:t>
+            </a:r>
+            <a:r>
+              <a:rPr lang="de-DE" sz="1400" dirty="0" smtClean="0">
+                <a:solidFill>
+                  <a:schemeClr val="tx1"/>
+                </a:solidFill>
+                <a:latin typeface="Courier New" pitchFamily="49" charset="0"/>
+                <a:cs typeface="Courier New" pitchFamily="49" charset="0"/>
+              </a:rPr>
               <a:t>, </a:t>
             </a:r>
             <a:r>
-              <a:rPr lang="de-DE" sz="1400" dirty="0" smtClean="0">
-                <a:solidFill>
-                  <a:schemeClr val="tx1"/>
-                </a:solidFill>
-                <a:latin typeface="Courier New" pitchFamily="49" charset="0"/>
-                <a:cs typeface="Courier New" pitchFamily="49" charset="0"/>
-              </a:rPr>
-              <a:t>&amp;</a:t>
-            </a:r>
-            <a:r>
               <a:rPr lang="de-DE" sz="1400" dirty="0" err="1" smtClean="0">
                 <a:solidFill>
                   <a:schemeClr val="tx1"/>
@@ -29383,6 +30470,46 @@
                 <a:latin typeface="Courier New" pitchFamily="49" charset="0"/>
                 <a:cs typeface="Courier New" pitchFamily="49" charset="0"/>
               </a:rPr>
+              <a:t>slice_id</a:t>
+            </a:r>
+            <a:r>
+              <a:rPr lang="de-DE" sz="1400" dirty="0" smtClean="0">
+                <a:solidFill>
+                  <a:schemeClr val="tx1"/>
+                </a:solidFill>
+                <a:latin typeface="Courier New" pitchFamily="49" charset="0"/>
+                <a:cs typeface="Courier New" pitchFamily="49" charset="0"/>
+              </a:rPr>
+              <a:t>, 0), VLEN, 					MPI_DOUBLE, </a:t>
+            </a:r>
+            <a:r>
+              <a:rPr lang="de-DE" sz="1400" dirty="0" err="1" smtClean="0">
+                <a:solidFill>
+                  <a:schemeClr val="tx1"/>
+                </a:solidFill>
+                <a:latin typeface="Courier New" pitchFamily="49" charset="0"/>
+                <a:cs typeface="Courier New" pitchFamily="49" charset="0"/>
+              </a:rPr>
+              <a:t>left</a:t>
+            </a:r>
+            <a:r>
+              <a:rPr lang="de-DE" sz="1400" dirty="0" smtClean="0">
+                <a:solidFill>
+                  <a:schemeClr val="tx1"/>
+                </a:solidFill>
+                <a:latin typeface="Courier New" pitchFamily="49" charset="0"/>
+                <a:cs typeface="Courier New" pitchFamily="49" charset="0"/>
+              </a:rPr>
+              <a:t>, i, MPI_COMM_WORLD, &amp;</a:t>
+            </a:r>
+            <a:r>
+              <a:rPr lang="de-DE" sz="1400" dirty="0" err="1" smtClean="0">
+                <a:solidFill>
+                  <a:schemeClr val="tx1"/>
+                </a:solidFill>
+                <a:latin typeface="Courier New" pitchFamily="49" charset="0"/>
+                <a:cs typeface="Courier New" pitchFamily="49" charset="0"/>
+              </a:rPr>
               <a:t>send_req</a:t>
             </a:r>
             <a:r>
@@ -29393,7 +30520,436 @@
                 <a:latin typeface="Courier New" pitchFamily="49" charset="0"/>
                 <a:cs typeface="Courier New" pitchFamily="49" charset="0"/>
               </a:rPr>
+              <a:t>[1]);</a:t>
+            </a:r>
+          </a:p>
+          <a:p>
+            <a:pPr>
+              <a:defRPr/>
+            </a:pPr>
+            <a:r>
+              <a:rPr lang="de-DE" sz="1400" b="1" dirty="0" smtClean="0">
+                <a:solidFill>
+                  <a:schemeClr val="tx1"/>
+                </a:solidFill>
+                <a:latin typeface="Courier New" pitchFamily="49" charset="0"/>
+                <a:cs typeface="Courier New" pitchFamily="49" charset="0"/>
+              </a:rPr>
+              <a:t>		</a:t>
+            </a:r>
+            <a:r>
+              <a:rPr lang="de-DE" sz="1400" b="1" dirty="0" err="1" smtClean="0">
+                <a:latin typeface="Courier New" pitchFamily="49" charset="0"/>
+                <a:cs typeface="Courier New" pitchFamily="49" charset="0"/>
+              </a:rPr>
+              <a:t>MPI_Request_free</a:t>
+            </a:r>
+            <a:r>
+              <a:rPr lang="de-DE" sz="1400" dirty="0" smtClean="0">
+                <a:latin typeface="Courier New" pitchFamily="49" charset="0"/>
+                <a:cs typeface="Courier New" pitchFamily="49" charset="0"/>
+              </a:rPr>
+              <a:t>(&amp;</a:t>
+            </a:r>
+            <a:r>
+              <a:rPr lang="de-DE" sz="1400" dirty="0" err="1" smtClean="0">
+                <a:latin typeface="Courier New" pitchFamily="49" charset="0"/>
+                <a:cs typeface="Courier New" pitchFamily="49" charset="0"/>
+              </a:rPr>
+              <a:t>send_req</a:t>
+            </a:r>
+            <a:r>
+              <a:rPr lang="de-DE" sz="1400" dirty="0" smtClean="0">
+                <a:latin typeface="Courier New" pitchFamily="49" charset="0"/>
+                <a:cs typeface="Courier New" pitchFamily="49" charset="0"/>
+              </a:rPr>
               <a:t>[0]);</a:t>
+            </a:r>
+          </a:p>
+          <a:p>
+            <a:pPr>
+              <a:buFont typeface="Arial" pitchFamily="34" charset="0"/>
+              <a:buNone/>
+              <a:defRPr/>
+            </a:pPr>
+            <a:r>
+              <a:rPr lang="de-DE" sz="1400" b="1" dirty="0" smtClean="0">
+                <a:latin typeface="Courier New" pitchFamily="49" charset="0"/>
+                <a:cs typeface="Courier New" pitchFamily="49" charset="0"/>
+              </a:rPr>
+              <a:t>		</a:t>
+            </a:r>
+            <a:r>
+              <a:rPr lang="de-DE" sz="1400" b="1" dirty="0" err="1" smtClean="0">
+                <a:latin typeface="Courier New" pitchFamily="49" charset="0"/>
+                <a:cs typeface="Courier New" pitchFamily="49" charset="0"/>
+              </a:rPr>
+              <a:t>MPI_Request_free</a:t>
+            </a:r>
+            <a:r>
+              <a:rPr lang="de-DE" sz="1400" dirty="0" smtClean="0">
+                <a:latin typeface="Courier New" pitchFamily="49" charset="0"/>
+                <a:cs typeface="Courier New" pitchFamily="49" charset="0"/>
+              </a:rPr>
+              <a:t>(&amp;</a:t>
+            </a:r>
+            <a:r>
+              <a:rPr lang="de-DE" sz="1400" dirty="0" err="1" smtClean="0">
+                <a:latin typeface="Courier New" pitchFamily="49" charset="0"/>
+                <a:cs typeface="Courier New" pitchFamily="49" charset="0"/>
+              </a:rPr>
+              <a:t>send_req</a:t>
+            </a:r>
+            <a:r>
+              <a:rPr lang="de-DE" sz="1400" dirty="0" smtClean="0">
+                <a:latin typeface="Courier New" pitchFamily="49" charset="0"/>
+                <a:cs typeface="Courier New" pitchFamily="49" charset="0"/>
+              </a:rPr>
+              <a:t>[1]);</a:t>
+            </a:r>
+          </a:p>
+          <a:p>
+            <a:pPr>
+              <a:buFont typeface="Arial" pitchFamily="34" charset="0"/>
+              <a:buNone/>
+              <a:defRPr/>
+            </a:pPr>
+            <a:r>
+              <a:rPr lang="de-DE" sz="1400" dirty="0" smtClean="0">
+                <a:solidFill>
+                  <a:schemeClr val="tx1"/>
+                </a:solidFill>
+                <a:latin typeface="Courier New" pitchFamily="49" charset="0"/>
+                <a:cs typeface="Courier New" pitchFamily="49" charset="0"/>
+              </a:rPr>
+              <a:t>		</a:t>
+            </a:r>
+            <a:r>
+              <a:rPr lang="de-DE" sz="1400" b="1" dirty="0" err="1" smtClean="0">
+                <a:solidFill>
+                  <a:schemeClr val="tx1"/>
+                </a:solidFill>
+                <a:latin typeface="Courier New" pitchFamily="49" charset="0"/>
+                <a:cs typeface="Courier New" pitchFamily="49" charset="0"/>
+              </a:rPr>
+              <a:t>MPI_Waitall</a:t>
+            </a:r>
+            <a:r>
+              <a:rPr lang="de-DE" sz="1400" dirty="0" smtClean="0">
+                <a:solidFill>
+                  <a:schemeClr val="tx1"/>
+                </a:solidFill>
+                <a:latin typeface="Courier New" pitchFamily="49" charset="0"/>
+                <a:cs typeface="Courier New" pitchFamily="49" charset="0"/>
+              </a:rPr>
+              <a:t> (2, </a:t>
+            </a:r>
+            <a:r>
+              <a:rPr lang="de-DE" sz="1400" dirty="0" err="1" smtClean="0">
+                <a:solidFill>
+                  <a:schemeClr val="tx1"/>
+                </a:solidFill>
+                <a:latin typeface="Courier New" pitchFamily="49" charset="0"/>
+                <a:cs typeface="Courier New" pitchFamily="49" charset="0"/>
+              </a:rPr>
+              <a:t>recv_req</a:t>
+            </a:r>
+            <a:r>
+              <a:rPr lang="de-DE" sz="1400" dirty="0" smtClean="0">
+                <a:solidFill>
+                  <a:schemeClr val="tx1"/>
+                </a:solidFill>
+                <a:latin typeface="Courier New" pitchFamily="49" charset="0"/>
+                <a:cs typeface="Courier New" pitchFamily="49" charset="0"/>
+              </a:rPr>
+              <a:t>, </a:t>
+            </a:r>
+            <a:r>
+              <a:rPr lang="de-DE" sz="1400" b="1" dirty="0" smtClean="0">
+                <a:solidFill>
+                  <a:schemeClr val="tx1"/>
+                </a:solidFill>
+                <a:latin typeface="Courier New" pitchFamily="49" charset="0"/>
+                <a:cs typeface="Courier New" pitchFamily="49" charset="0"/>
+              </a:rPr>
+              <a:t>MPI_STATUSES_IGNORE</a:t>
+            </a:r>
+            <a:r>
+              <a:rPr lang="de-DE" sz="1400" dirty="0" smtClean="0">
+                <a:solidFill>
+                  <a:schemeClr val="tx1"/>
+                </a:solidFill>
+                <a:latin typeface="Courier New" pitchFamily="49" charset="0"/>
+                <a:cs typeface="Courier New" pitchFamily="49" charset="0"/>
+              </a:rPr>
+              <a:t>);</a:t>
+            </a:r>
+          </a:p>
+          <a:p>
+            <a:pPr>
+              <a:defRPr/>
+            </a:pPr>
+            <a:r>
+              <a:rPr lang="de-DE" sz="1400" dirty="0" smtClean="0">
+                <a:solidFill>
+                  <a:schemeClr val="tx1"/>
+                </a:solidFill>
+                <a:latin typeface="Courier New" pitchFamily="49" charset="0"/>
+                <a:cs typeface="Courier New" pitchFamily="49" charset="0"/>
+              </a:rPr>
+              <a:t>      }</a:t>
+            </a:r>
+          </a:p>
+          <a:p>
+            <a:pPr>
+              <a:defRPr/>
+            </a:pPr>
+            <a:r>
+              <a:rPr lang="de-DE" sz="1400" b="1" dirty="0" smtClean="0">
+                <a:solidFill>
+                  <a:srgbClr val="FF0000"/>
+                </a:solidFill>
+                <a:latin typeface="Courier New" pitchFamily="49" charset="0"/>
+                <a:cs typeface="Courier New" pitchFamily="49" charset="0"/>
+              </a:rPr>
+              <a:t>#</a:t>
+            </a:r>
+            <a:r>
+              <a:rPr lang="de-DE" sz="1400" b="1" dirty="0" err="1" smtClean="0">
+                <a:solidFill>
+                  <a:srgbClr val="FF0000"/>
+                </a:solidFill>
+                <a:latin typeface="Courier New" pitchFamily="49" charset="0"/>
+                <a:cs typeface="Courier New" pitchFamily="49" charset="0"/>
+              </a:rPr>
+              <a:t>pragma</a:t>
+            </a:r>
+            <a:r>
+              <a:rPr lang="de-DE" sz="1400" b="1" dirty="0" smtClean="0">
+                <a:solidFill>
+                  <a:srgbClr val="FF0000"/>
+                </a:solidFill>
+                <a:latin typeface="Courier New" pitchFamily="49" charset="0"/>
+                <a:cs typeface="Courier New" pitchFamily="49" charset="0"/>
+              </a:rPr>
+              <a:t> </a:t>
+            </a:r>
+            <a:r>
+              <a:rPr lang="de-DE" sz="1400" b="1" dirty="0" err="1" smtClean="0">
+                <a:solidFill>
+                  <a:srgbClr val="FF0000"/>
+                </a:solidFill>
+                <a:latin typeface="Courier New" pitchFamily="49" charset="0"/>
+                <a:cs typeface="Courier New" pitchFamily="49" charset="0"/>
+              </a:rPr>
+              <a:t>omp</a:t>
+            </a:r>
+            <a:r>
+              <a:rPr lang="de-DE" sz="1400" b="1" dirty="0" smtClean="0">
+                <a:solidFill>
+                  <a:srgbClr val="FF0000"/>
+                </a:solidFill>
+                <a:latin typeface="Courier New" pitchFamily="49" charset="0"/>
+                <a:cs typeface="Courier New" pitchFamily="49" charset="0"/>
+              </a:rPr>
+              <a:t> </a:t>
+            </a:r>
+            <a:r>
+              <a:rPr lang="de-DE" sz="1400" b="1" dirty="0" err="1" smtClean="0">
+                <a:solidFill>
+                  <a:srgbClr val="FF0000"/>
+                </a:solidFill>
+                <a:latin typeface="Courier New" pitchFamily="49" charset="0"/>
+                <a:cs typeface="Courier New" pitchFamily="49" charset="0"/>
+              </a:rPr>
+              <a:t>barrier</a:t>
+            </a:r>
+            <a:endParaRPr lang="de-DE" sz="1400" b="1" dirty="0" smtClean="0">
+              <a:solidFill>
+                <a:srgbClr val="FF0000"/>
+              </a:solidFill>
+              <a:latin typeface="Courier New" pitchFamily="49" charset="0"/>
+              <a:cs typeface="Courier New" pitchFamily="49" charset="0"/>
+            </a:endParaRPr>
+          </a:p>
+          <a:p>
+            <a:pPr>
+              <a:defRPr/>
+            </a:pPr>
+            <a:r>
+              <a:rPr lang="de-DE" sz="1400" dirty="0" smtClean="0">
+                <a:solidFill>
+                  <a:schemeClr val="tx1"/>
+                </a:solidFill>
+                <a:latin typeface="Courier New" pitchFamily="49" charset="0"/>
+                <a:cs typeface="Courier New" pitchFamily="49" charset="0"/>
+              </a:rPr>
+              <a:t>  	  </a:t>
+            </a:r>
+            <a:r>
+              <a:rPr lang="de-DE" sz="1400" dirty="0" err="1" smtClean="0">
+                <a:solidFill>
+                  <a:schemeClr val="tx1"/>
+                </a:solidFill>
+                <a:latin typeface="Courier New" pitchFamily="49" charset="0"/>
+                <a:cs typeface="Courier New" pitchFamily="49" charset="0"/>
+              </a:rPr>
+              <a:t>data_compute</a:t>
+            </a:r>
+            <a:r>
+              <a:rPr lang="de-DE" sz="1400" dirty="0" smtClean="0">
+                <a:solidFill>
+                  <a:schemeClr val="tx1"/>
+                </a:solidFill>
+                <a:latin typeface="Courier New" pitchFamily="49" charset="0"/>
+                <a:cs typeface="Courier New" pitchFamily="49" charset="0"/>
+              </a:rPr>
+              <a:t> (NTHREADS, </a:t>
+            </a:r>
+            <a:r>
+              <a:rPr lang="de-DE" sz="1400" dirty="0" err="1" smtClean="0">
+                <a:solidFill>
+                  <a:schemeClr val="tx1"/>
+                </a:solidFill>
+                <a:latin typeface="Courier New" pitchFamily="49" charset="0"/>
+                <a:cs typeface="Courier New" pitchFamily="49" charset="0"/>
+              </a:rPr>
+              <a:t>array</a:t>
+            </a:r>
+            <a:r>
+              <a:rPr lang="de-DE" sz="1400" dirty="0" smtClean="0">
+                <a:solidFill>
+                  <a:schemeClr val="tx1"/>
+                </a:solidFill>
+                <a:latin typeface="Courier New" pitchFamily="49" charset="0"/>
+                <a:cs typeface="Courier New" pitchFamily="49" charset="0"/>
+              </a:rPr>
+              <a:t>, 1 - </a:t>
+            </a:r>
+            <a:r>
+              <a:rPr lang="de-DE" sz="1400" dirty="0" err="1" smtClean="0">
+                <a:solidFill>
+                  <a:schemeClr val="tx1"/>
+                </a:solidFill>
+                <a:latin typeface="Courier New" pitchFamily="49" charset="0"/>
+                <a:cs typeface="Courier New" pitchFamily="49" charset="0"/>
+              </a:rPr>
+              <a:t>buffer_id</a:t>
+            </a:r>
+            <a:r>
+              <a:rPr lang="de-DE" sz="1400" dirty="0" smtClean="0">
+                <a:solidFill>
+                  <a:schemeClr val="tx1"/>
+                </a:solidFill>
+                <a:latin typeface="Courier New" pitchFamily="49" charset="0"/>
+                <a:cs typeface="Courier New" pitchFamily="49" charset="0"/>
+              </a:rPr>
+              <a:t>, </a:t>
+            </a:r>
+            <a:r>
+              <a:rPr lang="de-DE" sz="1400" dirty="0" err="1" smtClean="0">
+                <a:solidFill>
+                  <a:schemeClr val="tx1"/>
+                </a:solidFill>
+                <a:latin typeface="Courier New" pitchFamily="49" charset="0"/>
+                <a:cs typeface="Courier New" pitchFamily="49" charset="0"/>
+              </a:rPr>
+              <a:t>buffer_id</a:t>
+            </a:r>
+            <a:r>
+              <a:rPr lang="de-DE" sz="1400" dirty="0" smtClean="0">
+                <a:solidFill>
+                  <a:schemeClr val="tx1"/>
+                </a:solidFill>
+                <a:latin typeface="Courier New" pitchFamily="49" charset="0"/>
+                <a:cs typeface="Courier New" pitchFamily="49" charset="0"/>
+              </a:rPr>
+              <a:t>, </a:t>
+            </a:r>
+            <a:r>
+              <a:rPr lang="de-DE" sz="1400" dirty="0" err="1" smtClean="0">
+                <a:solidFill>
+                  <a:schemeClr val="tx1"/>
+                </a:solidFill>
+                <a:latin typeface="Courier New" pitchFamily="49" charset="0"/>
+                <a:cs typeface="Courier New" pitchFamily="49" charset="0"/>
+              </a:rPr>
+              <a:t>slice_id</a:t>
+            </a:r>
+            <a:r>
+              <a:rPr lang="de-DE" sz="1400" dirty="0" smtClean="0">
+                <a:solidFill>
+                  <a:schemeClr val="tx1"/>
+                </a:solidFill>
+                <a:latin typeface="Courier New" pitchFamily="49" charset="0"/>
+                <a:cs typeface="Courier New" pitchFamily="49" charset="0"/>
+              </a:rPr>
+              <a:t>);</a:t>
+            </a:r>
+          </a:p>
+          <a:p>
+            <a:pPr>
+              <a:defRPr/>
+            </a:pPr>
+            <a:r>
+              <a:rPr lang="de-DE" sz="1400" b="1" dirty="0" smtClean="0">
+                <a:solidFill>
+                  <a:srgbClr val="FF0000"/>
+                </a:solidFill>
+                <a:latin typeface="Courier New" pitchFamily="49" charset="0"/>
+                <a:cs typeface="Courier New" pitchFamily="49" charset="0"/>
+              </a:rPr>
+              <a:t>#</a:t>
+            </a:r>
+            <a:r>
+              <a:rPr lang="de-DE" sz="1400" b="1" dirty="0" err="1" smtClean="0">
+                <a:solidFill>
+                  <a:srgbClr val="FF0000"/>
+                </a:solidFill>
+                <a:latin typeface="Courier New" pitchFamily="49" charset="0"/>
+                <a:cs typeface="Courier New" pitchFamily="49" charset="0"/>
+              </a:rPr>
+              <a:t>pragma</a:t>
+            </a:r>
+            <a:r>
+              <a:rPr lang="de-DE" sz="1400" b="1" dirty="0" smtClean="0">
+                <a:solidFill>
+                  <a:srgbClr val="FF0000"/>
+                </a:solidFill>
+                <a:latin typeface="Courier New" pitchFamily="49" charset="0"/>
+                <a:cs typeface="Courier New" pitchFamily="49" charset="0"/>
+              </a:rPr>
+              <a:t> </a:t>
+            </a:r>
+            <a:r>
+              <a:rPr lang="de-DE" sz="1400" b="1" dirty="0" err="1" smtClean="0">
+                <a:solidFill>
+                  <a:srgbClr val="FF0000"/>
+                </a:solidFill>
+                <a:latin typeface="Courier New" pitchFamily="49" charset="0"/>
+                <a:cs typeface="Courier New" pitchFamily="49" charset="0"/>
+              </a:rPr>
+              <a:t>omp</a:t>
+            </a:r>
+            <a:r>
+              <a:rPr lang="de-DE" sz="1400" b="1" dirty="0" smtClean="0">
+                <a:solidFill>
+                  <a:srgbClr val="FF0000"/>
+                </a:solidFill>
+                <a:latin typeface="Courier New" pitchFamily="49" charset="0"/>
+                <a:cs typeface="Courier New" pitchFamily="49" charset="0"/>
+              </a:rPr>
+              <a:t> </a:t>
+            </a:r>
+            <a:r>
+              <a:rPr lang="de-DE" sz="1400" b="1" dirty="0" err="1" smtClean="0">
+                <a:solidFill>
+                  <a:srgbClr val="FF0000"/>
+                </a:solidFill>
+                <a:latin typeface="Courier New" pitchFamily="49" charset="0"/>
+                <a:cs typeface="Courier New" pitchFamily="49" charset="0"/>
+              </a:rPr>
+              <a:t>barrier</a:t>
             </a:r>
             <a:endParaRPr lang="de-DE" sz="1400" dirty="0" smtClean="0">
               <a:solidFill>
@@ -29415,27 +30971,7 @@
                 <a:latin typeface="Courier New" pitchFamily="49" charset="0"/>
                 <a:cs typeface="Courier New" pitchFamily="49" charset="0"/>
               </a:rPr>
-              <a:t>		</a:t>
-            </a:r>
-            <a:r>
-              <a:rPr lang="de-DE" sz="1400" b="1" dirty="0" err="1" smtClean="0">
-                <a:solidFill>
-                  <a:schemeClr val="tx1"/>
-                </a:solidFill>
-                <a:latin typeface="Courier New" pitchFamily="49" charset="0"/>
-                <a:cs typeface="Courier New" pitchFamily="49" charset="0"/>
-              </a:rPr>
-              <a:t>MPI_Issend</a:t>
-            </a:r>
-            <a:r>
-              <a:rPr lang="de-DE" sz="1400" dirty="0" smtClean="0">
-                <a:solidFill>
-                  <a:schemeClr val="tx1"/>
-                </a:solidFill>
-                <a:latin typeface="Courier New" pitchFamily="49" charset="0"/>
-                <a:cs typeface="Courier New" pitchFamily="49" charset="0"/>
-              </a:rPr>
-              <a:t> ( &amp;</a:t>
+              <a:t>	  </a:t>
             </a:r>
             <a:r>
               <a:rPr lang="de-DE" sz="1400" dirty="0" err="1" smtClean="0">
@@ -29445,17 +30981,17 @@
                 <a:latin typeface="Courier New" pitchFamily="49" charset="0"/>
                 <a:cs typeface="Courier New" pitchFamily="49" charset="0"/>
               </a:rPr>
-              <a:t>array_ELEM_left</a:t>
-            </a:r>
-            <a:r>
-              <a:rPr lang="de-DE" sz="1400" dirty="0" smtClean="0">
-                <a:solidFill>
-                  <a:schemeClr val="tx1"/>
-                </a:solidFill>
-                <a:latin typeface="Courier New" pitchFamily="49" charset="0"/>
-                <a:cs typeface="Courier New" pitchFamily="49" charset="0"/>
-              </a:rPr>
-              <a:t> (</a:t>
+              <a:t>buffer_id</a:t>
+            </a:r>
+            <a:r>
+              <a:rPr lang="de-DE" sz="1400" dirty="0" smtClean="0">
+                <a:solidFill>
+                  <a:schemeClr val="tx1"/>
+                </a:solidFill>
+                <a:latin typeface="Courier New" pitchFamily="49" charset="0"/>
+                <a:cs typeface="Courier New" pitchFamily="49" charset="0"/>
+              </a:rPr>
+              <a:t> = 1 - </a:t>
             </a:r>
             <a:r>
               <a:rPr lang="de-DE" sz="1400" dirty="0" err="1" smtClean="0">
@@ -29475,559 +31011,7 @@
                 <a:latin typeface="Courier New" pitchFamily="49" charset="0"/>
                 <a:cs typeface="Courier New" pitchFamily="49" charset="0"/>
               </a:rPr>
-              <a:t>, </a:t>
-            </a:r>
-            <a:r>
-              <a:rPr lang="de-DE" sz="1400" dirty="0" err="1" smtClean="0">
-                <a:solidFill>
-                  <a:schemeClr val="tx1"/>
-                </a:solidFill>
-                <a:latin typeface="Courier New" pitchFamily="49" charset="0"/>
-                <a:cs typeface="Courier New" pitchFamily="49" charset="0"/>
-              </a:rPr>
-              <a:t>slice_id</a:t>
-            </a:r>
-            <a:r>
-              <a:rPr lang="de-DE" sz="1400" dirty="0" smtClean="0">
-                <a:solidFill>
-                  <a:schemeClr val="tx1"/>
-                </a:solidFill>
-                <a:latin typeface="Courier New" pitchFamily="49" charset="0"/>
-                <a:cs typeface="Courier New" pitchFamily="49" charset="0"/>
-              </a:rPr>
-              <a:t>, 0), VLEN, 					MPI_DOUBLE, </a:t>
-            </a:r>
-            <a:r>
-              <a:rPr lang="de-DE" sz="1400" dirty="0" err="1" smtClean="0">
-                <a:solidFill>
-                  <a:schemeClr val="tx1"/>
-                </a:solidFill>
-                <a:latin typeface="Courier New" pitchFamily="49" charset="0"/>
-                <a:cs typeface="Courier New" pitchFamily="49" charset="0"/>
-              </a:rPr>
-              <a:t>left</a:t>
-            </a:r>
-            <a:r>
-              <a:rPr lang="de-DE" sz="1400" dirty="0" smtClean="0">
-                <a:solidFill>
-                  <a:schemeClr val="tx1"/>
-                </a:solidFill>
-                <a:latin typeface="Courier New" pitchFamily="49" charset="0"/>
-                <a:cs typeface="Courier New" pitchFamily="49" charset="0"/>
-              </a:rPr>
-              <a:t>, i, MPI_COMM_WORLD, </a:t>
-            </a:r>
-            <a:r>
-              <a:rPr lang="de-DE" sz="1400" dirty="0" smtClean="0">
-                <a:solidFill>
-                  <a:schemeClr val="tx1"/>
-                </a:solidFill>
-                <a:latin typeface="Courier New" pitchFamily="49" charset="0"/>
-                <a:cs typeface="Courier New" pitchFamily="49" charset="0"/>
-              </a:rPr>
-              <a:t>&amp;</a:t>
-            </a:r>
-            <a:r>
-              <a:rPr lang="de-DE" sz="1400" dirty="0" err="1" smtClean="0">
-                <a:solidFill>
-                  <a:schemeClr val="tx1"/>
-                </a:solidFill>
-                <a:latin typeface="Courier New" pitchFamily="49" charset="0"/>
-                <a:cs typeface="Courier New" pitchFamily="49" charset="0"/>
-              </a:rPr>
-              <a:t>send_req</a:t>
-            </a:r>
-            <a:r>
-              <a:rPr lang="de-DE" sz="1400" dirty="0" smtClean="0">
-                <a:solidFill>
-                  <a:schemeClr val="tx1"/>
-                </a:solidFill>
-                <a:latin typeface="Courier New" pitchFamily="49" charset="0"/>
-                <a:cs typeface="Courier New" pitchFamily="49" charset="0"/>
-              </a:rPr>
-              <a:t>[1]);</a:t>
-            </a:r>
-            <a:endParaRPr lang="de-DE" sz="1400" dirty="0" smtClean="0">
-              <a:solidFill>
-                <a:schemeClr val="tx1"/>
-              </a:solidFill>
-              <a:latin typeface="Courier New" pitchFamily="49" charset="0"/>
-              <a:cs typeface="Courier New" pitchFamily="49" charset="0"/>
-            </a:endParaRPr>
-          </a:p>
-          <a:p>
-            <a:pPr>
-              <a:defRPr/>
-            </a:pPr>
-            <a:r>
-              <a:rPr lang="de-DE" sz="1400" b="1" dirty="0" smtClean="0">
-                <a:solidFill>
-                  <a:schemeClr val="tx1"/>
-                </a:solidFill>
-                <a:latin typeface="Courier New" pitchFamily="49" charset="0"/>
-                <a:cs typeface="Courier New" pitchFamily="49" charset="0"/>
-              </a:rPr>
-              <a:t>	</a:t>
-            </a:r>
-            <a:r>
-              <a:rPr lang="de-DE" sz="1400" b="1" dirty="0" smtClean="0">
-                <a:solidFill>
-                  <a:schemeClr val="tx1"/>
-                </a:solidFill>
-                <a:latin typeface="Courier New" pitchFamily="49" charset="0"/>
-                <a:cs typeface="Courier New" pitchFamily="49" charset="0"/>
-              </a:rPr>
-              <a:t>	</a:t>
-            </a:r>
-            <a:r>
-              <a:rPr lang="de-DE" sz="1400" b="1" dirty="0" err="1" smtClean="0">
-                <a:latin typeface="Courier New" pitchFamily="49" charset="0"/>
-                <a:cs typeface="Courier New" pitchFamily="49" charset="0"/>
-              </a:rPr>
-              <a:t>MPI_Request_free</a:t>
-            </a:r>
-            <a:r>
-              <a:rPr lang="de-DE" sz="1400" dirty="0" smtClean="0">
-                <a:latin typeface="Courier New" pitchFamily="49" charset="0"/>
-                <a:cs typeface="Courier New" pitchFamily="49" charset="0"/>
-              </a:rPr>
-              <a:t>(&amp;</a:t>
-            </a:r>
-            <a:r>
-              <a:rPr lang="de-DE" sz="1400" dirty="0" err="1" smtClean="0">
-                <a:latin typeface="Courier New" pitchFamily="49" charset="0"/>
-                <a:cs typeface="Courier New" pitchFamily="49" charset="0"/>
-              </a:rPr>
-              <a:t>send_req</a:t>
-            </a:r>
-            <a:r>
-              <a:rPr lang="de-DE" sz="1400" dirty="0" smtClean="0">
-                <a:latin typeface="Courier New" pitchFamily="49" charset="0"/>
-                <a:cs typeface="Courier New" pitchFamily="49" charset="0"/>
-              </a:rPr>
-              <a:t>[0</a:t>
-            </a:r>
-            <a:r>
-              <a:rPr lang="de-DE" sz="1400" dirty="0" smtClean="0">
-                <a:latin typeface="Courier New" pitchFamily="49" charset="0"/>
-                <a:cs typeface="Courier New" pitchFamily="49" charset="0"/>
-              </a:rPr>
-              <a:t>]);</a:t>
-            </a:r>
-          </a:p>
-          <a:p>
-            <a:pPr>
-              <a:buFont typeface="Arial" pitchFamily="34" charset="0"/>
-              <a:buNone/>
-              <a:defRPr/>
-            </a:pPr>
-            <a:r>
-              <a:rPr lang="de-DE" sz="1400" b="1" dirty="0" smtClean="0">
-                <a:latin typeface="Courier New" pitchFamily="49" charset="0"/>
-                <a:cs typeface="Courier New" pitchFamily="49" charset="0"/>
-              </a:rPr>
-              <a:t>	</a:t>
-            </a:r>
-            <a:r>
-              <a:rPr lang="de-DE" sz="1400" b="1" dirty="0" smtClean="0">
-                <a:latin typeface="Courier New" pitchFamily="49" charset="0"/>
-                <a:cs typeface="Courier New" pitchFamily="49" charset="0"/>
-              </a:rPr>
-              <a:t>	</a:t>
-            </a:r>
-            <a:r>
-              <a:rPr lang="de-DE" sz="1400" b="1" dirty="0" err="1" smtClean="0">
-                <a:latin typeface="Courier New" pitchFamily="49" charset="0"/>
-                <a:cs typeface="Courier New" pitchFamily="49" charset="0"/>
-              </a:rPr>
-              <a:t>MPI_Request_free</a:t>
-            </a:r>
-            <a:r>
-              <a:rPr lang="de-DE" sz="1400" dirty="0" smtClean="0">
-                <a:latin typeface="Courier New" pitchFamily="49" charset="0"/>
-                <a:cs typeface="Courier New" pitchFamily="49" charset="0"/>
-              </a:rPr>
-              <a:t>(&amp;</a:t>
-            </a:r>
-            <a:r>
-              <a:rPr lang="de-DE" sz="1400" dirty="0" err="1" smtClean="0">
-                <a:latin typeface="Courier New" pitchFamily="49" charset="0"/>
-                <a:cs typeface="Courier New" pitchFamily="49" charset="0"/>
-              </a:rPr>
-              <a:t>send_req</a:t>
-            </a:r>
-            <a:r>
-              <a:rPr lang="de-DE" sz="1400" dirty="0" smtClean="0">
-                <a:latin typeface="Courier New" pitchFamily="49" charset="0"/>
-                <a:cs typeface="Courier New" pitchFamily="49" charset="0"/>
-              </a:rPr>
-              <a:t>[1</a:t>
-            </a:r>
-            <a:r>
-              <a:rPr lang="de-DE" sz="1400" dirty="0" smtClean="0">
-                <a:latin typeface="Courier New" pitchFamily="49" charset="0"/>
-                <a:cs typeface="Courier New" pitchFamily="49" charset="0"/>
-              </a:rPr>
-              <a:t>]);</a:t>
-            </a:r>
-          </a:p>
-          <a:p>
-            <a:pPr>
-              <a:buFont typeface="Arial" pitchFamily="34" charset="0"/>
-              <a:buNone/>
-              <a:defRPr/>
-            </a:pPr>
-            <a:r>
-              <a:rPr lang="de-DE" sz="1400" dirty="0" smtClean="0">
-                <a:solidFill>
-                  <a:schemeClr val="tx1"/>
-                </a:solidFill>
-                <a:latin typeface="Courier New" pitchFamily="49" charset="0"/>
-                <a:cs typeface="Courier New" pitchFamily="49" charset="0"/>
-              </a:rPr>
-              <a:t>		</a:t>
-            </a:r>
-            <a:r>
-              <a:rPr lang="de-DE" sz="1400" b="1" dirty="0" err="1" smtClean="0">
-                <a:solidFill>
-                  <a:schemeClr val="tx1"/>
-                </a:solidFill>
-                <a:latin typeface="Courier New" pitchFamily="49" charset="0"/>
-                <a:cs typeface="Courier New" pitchFamily="49" charset="0"/>
-              </a:rPr>
-              <a:t>MPI_Waitall</a:t>
-            </a:r>
-            <a:r>
-              <a:rPr lang="de-DE" sz="1400" dirty="0" smtClean="0">
-                <a:solidFill>
-                  <a:schemeClr val="tx1"/>
-                </a:solidFill>
-                <a:latin typeface="Courier New" pitchFamily="49" charset="0"/>
-                <a:cs typeface="Courier New" pitchFamily="49" charset="0"/>
-              </a:rPr>
-              <a:t> </a:t>
-            </a:r>
-            <a:r>
-              <a:rPr lang="de-DE" sz="1400" dirty="0" smtClean="0">
-                <a:solidFill>
-                  <a:schemeClr val="tx1"/>
-                </a:solidFill>
-                <a:latin typeface="Courier New" pitchFamily="49" charset="0"/>
-                <a:cs typeface="Courier New" pitchFamily="49" charset="0"/>
-              </a:rPr>
-              <a:t>(2, </a:t>
-            </a:r>
-            <a:r>
-              <a:rPr lang="de-DE" sz="1400" dirty="0" err="1" smtClean="0">
-                <a:solidFill>
-                  <a:schemeClr val="tx1"/>
-                </a:solidFill>
-                <a:latin typeface="Courier New" pitchFamily="49" charset="0"/>
-                <a:cs typeface="Courier New" pitchFamily="49" charset="0"/>
-              </a:rPr>
-              <a:t>recv_req</a:t>
-            </a:r>
-            <a:r>
-              <a:rPr lang="de-DE" sz="1400" dirty="0" smtClean="0">
-                <a:solidFill>
-                  <a:schemeClr val="tx1"/>
-                </a:solidFill>
-                <a:latin typeface="Courier New" pitchFamily="49" charset="0"/>
-                <a:cs typeface="Courier New" pitchFamily="49" charset="0"/>
-              </a:rPr>
-              <a:t>, </a:t>
-            </a:r>
-            <a:r>
-              <a:rPr lang="de-DE" sz="1400" b="1" dirty="0" smtClean="0">
-                <a:solidFill>
-                  <a:schemeClr val="tx1"/>
-                </a:solidFill>
-                <a:latin typeface="Courier New" pitchFamily="49" charset="0"/>
-                <a:cs typeface="Courier New" pitchFamily="49" charset="0"/>
-              </a:rPr>
-              <a:t>MPI_STATUSES_IGNORE</a:t>
-            </a:r>
-            <a:r>
-              <a:rPr lang="de-DE" sz="1400" dirty="0" smtClean="0">
-                <a:solidFill>
-                  <a:schemeClr val="tx1"/>
-                </a:solidFill>
-                <a:latin typeface="Courier New" pitchFamily="49" charset="0"/>
-                <a:cs typeface="Courier New" pitchFamily="49" charset="0"/>
-              </a:rPr>
-              <a:t>);</a:t>
-            </a:r>
-          </a:p>
-          <a:p>
-            <a:pPr>
-              <a:defRPr/>
-            </a:pPr>
-            <a:r>
-              <a:rPr lang="de-DE" sz="1400" dirty="0" smtClean="0">
-                <a:solidFill>
-                  <a:schemeClr val="tx1"/>
-                </a:solidFill>
-                <a:latin typeface="Courier New" pitchFamily="49" charset="0"/>
-                <a:cs typeface="Courier New" pitchFamily="49" charset="0"/>
-              </a:rPr>
-              <a:t>      }</a:t>
-            </a:r>
-          </a:p>
-          <a:p>
-            <a:pPr>
-              <a:defRPr/>
-            </a:pPr>
-            <a:r>
-              <a:rPr lang="de-DE" sz="1400" b="1" dirty="0" smtClean="0">
-                <a:solidFill>
-                  <a:srgbClr val="FF0000"/>
-                </a:solidFill>
-                <a:latin typeface="Courier New" pitchFamily="49" charset="0"/>
-                <a:cs typeface="Courier New" pitchFamily="49" charset="0"/>
-              </a:rPr>
-              <a:t>#</a:t>
-            </a:r>
-            <a:r>
-              <a:rPr lang="de-DE" sz="1400" b="1" dirty="0" err="1" smtClean="0">
-                <a:solidFill>
-                  <a:srgbClr val="FF0000"/>
-                </a:solidFill>
-                <a:latin typeface="Courier New" pitchFamily="49" charset="0"/>
-                <a:cs typeface="Courier New" pitchFamily="49" charset="0"/>
-              </a:rPr>
-              <a:t>pragma</a:t>
-            </a:r>
-            <a:r>
-              <a:rPr lang="de-DE" sz="1400" b="1" dirty="0" smtClean="0">
-                <a:solidFill>
-                  <a:srgbClr val="FF0000"/>
-                </a:solidFill>
-                <a:latin typeface="Courier New" pitchFamily="49" charset="0"/>
-                <a:cs typeface="Courier New" pitchFamily="49" charset="0"/>
-              </a:rPr>
-              <a:t> </a:t>
-            </a:r>
-            <a:r>
-              <a:rPr lang="de-DE" sz="1400" b="1" dirty="0" err="1" smtClean="0">
-                <a:solidFill>
-                  <a:srgbClr val="FF0000"/>
-                </a:solidFill>
-                <a:latin typeface="Courier New" pitchFamily="49" charset="0"/>
-                <a:cs typeface="Courier New" pitchFamily="49" charset="0"/>
-              </a:rPr>
-              <a:t>omp</a:t>
-            </a:r>
-            <a:r>
-              <a:rPr lang="de-DE" sz="1400" b="1" dirty="0" smtClean="0">
-                <a:solidFill>
-                  <a:srgbClr val="FF0000"/>
-                </a:solidFill>
-                <a:latin typeface="Courier New" pitchFamily="49" charset="0"/>
-                <a:cs typeface="Courier New" pitchFamily="49" charset="0"/>
-              </a:rPr>
-              <a:t> </a:t>
-            </a:r>
-            <a:r>
-              <a:rPr lang="de-DE" sz="1400" b="1" dirty="0" err="1" smtClean="0">
-                <a:solidFill>
-                  <a:srgbClr val="FF0000"/>
-                </a:solidFill>
-                <a:latin typeface="Courier New" pitchFamily="49" charset="0"/>
-                <a:cs typeface="Courier New" pitchFamily="49" charset="0"/>
-              </a:rPr>
-              <a:t>barrier</a:t>
-            </a:r>
-            <a:endParaRPr lang="de-DE" sz="1400" b="1" dirty="0" smtClean="0">
-              <a:solidFill>
-                <a:srgbClr val="FF0000"/>
-              </a:solidFill>
-              <a:latin typeface="Courier New" pitchFamily="49" charset="0"/>
-              <a:cs typeface="Courier New" pitchFamily="49" charset="0"/>
-            </a:endParaRPr>
-          </a:p>
-          <a:p>
-            <a:pPr>
-              <a:defRPr/>
-            </a:pPr>
-            <a:r>
-              <a:rPr lang="de-DE" sz="1400" dirty="0" smtClean="0">
-                <a:solidFill>
-                  <a:schemeClr val="tx1"/>
-                </a:solidFill>
-                <a:latin typeface="Courier New" pitchFamily="49" charset="0"/>
-                <a:cs typeface="Courier New" pitchFamily="49" charset="0"/>
-              </a:rPr>
-              <a:t>  	  </a:t>
-            </a:r>
-            <a:r>
-              <a:rPr lang="de-DE" sz="1400" dirty="0" err="1" smtClean="0">
-                <a:solidFill>
-                  <a:schemeClr val="tx1"/>
-                </a:solidFill>
-                <a:latin typeface="Courier New" pitchFamily="49" charset="0"/>
-                <a:cs typeface="Courier New" pitchFamily="49" charset="0"/>
-              </a:rPr>
-              <a:t>data_compute</a:t>
-            </a:r>
-            <a:r>
-              <a:rPr lang="de-DE" sz="1400" dirty="0" smtClean="0">
-                <a:solidFill>
-                  <a:schemeClr val="tx1"/>
-                </a:solidFill>
-                <a:latin typeface="Courier New" pitchFamily="49" charset="0"/>
-                <a:cs typeface="Courier New" pitchFamily="49" charset="0"/>
-              </a:rPr>
-              <a:t> (NTHREADS, </a:t>
-            </a:r>
-            <a:r>
-              <a:rPr lang="de-DE" sz="1400" dirty="0" err="1" smtClean="0">
-                <a:solidFill>
-                  <a:schemeClr val="tx1"/>
-                </a:solidFill>
-                <a:latin typeface="Courier New" pitchFamily="49" charset="0"/>
-                <a:cs typeface="Courier New" pitchFamily="49" charset="0"/>
-              </a:rPr>
-              <a:t>array</a:t>
-            </a:r>
-            <a:r>
-              <a:rPr lang="de-DE" sz="1400" dirty="0" smtClean="0">
-                <a:solidFill>
-                  <a:schemeClr val="tx1"/>
-                </a:solidFill>
-                <a:latin typeface="Courier New" pitchFamily="49" charset="0"/>
-                <a:cs typeface="Courier New" pitchFamily="49" charset="0"/>
-              </a:rPr>
-              <a:t>, 1 - </a:t>
-            </a:r>
-            <a:r>
-              <a:rPr lang="de-DE" sz="1400" dirty="0" err="1" smtClean="0">
-                <a:solidFill>
-                  <a:schemeClr val="tx1"/>
-                </a:solidFill>
-                <a:latin typeface="Courier New" pitchFamily="49" charset="0"/>
-                <a:cs typeface="Courier New" pitchFamily="49" charset="0"/>
-              </a:rPr>
-              <a:t>buffer_id</a:t>
-            </a:r>
-            <a:r>
-              <a:rPr lang="de-DE" sz="1400" dirty="0" smtClean="0">
-                <a:solidFill>
-                  <a:schemeClr val="tx1"/>
-                </a:solidFill>
-                <a:latin typeface="Courier New" pitchFamily="49" charset="0"/>
-                <a:cs typeface="Courier New" pitchFamily="49" charset="0"/>
-              </a:rPr>
-              <a:t>, </a:t>
-            </a:r>
-            <a:r>
-              <a:rPr lang="de-DE" sz="1400" dirty="0" err="1" smtClean="0">
-                <a:solidFill>
-                  <a:schemeClr val="tx1"/>
-                </a:solidFill>
-                <a:latin typeface="Courier New" pitchFamily="49" charset="0"/>
-                <a:cs typeface="Courier New" pitchFamily="49" charset="0"/>
-              </a:rPr>
-              <a:t>buffer_id</a:t>
-            </a:r>
-            <a:r>
-              <a:rPr lang="de-DE" sz="1400" dirty="0" smtClean="0">
-                <a:solidFill>
-                  <a:schemeClr val="tx1"/>
-                </a:solidFill>
-                <a:latin typeface="Courier New" pitchFamily="49" charset="0"/>
-                <a:cs typeface="Courier New" pitchFamily="49" charset="0"/>
-              </a:rPr>
-              <a:t>, </a:t>
-            </a:r>
-            <a:r>
-              <a:rPr lang="de-DE" sz="1400" dirty="0" err="1" smtClean="0">
-                <a:solidFill>
-                  <a:schemeClr val="tx1"/>
-                </a:solidFill>
-                <a:latin typeface="Courier New" pitchFamily="49" charset="0"/>
-                <a:cs typeface="Courier New" pitchFamily="49" charset="0"/>
-              </a:rPr>
-              <a:t>slice_id</a:t>
-            </a:r>
-            <a:r>
-              <a:rPr lang="de-DE" sz="1400" dirty="0" smtClean="0">
-                <a:solidFill>
-                  <a:schemeClr val="tx1"/>
-                </a:solidFill>
-                <a:latin typeface="Courier New" pitchFamily="49" charset="0"/>
-                <a:cs typeface="Courier New" pitchFamily="49" charset="0"/>
-              </a:rPr>
-              <a:t>);</a:t>
-            </a:r>
-          </a:p>
-          <a:p>
-            <a:pPr>
-              <a:defRPr/>
-            </a:pPr>
-            <a:r>
-              <a:rPr lang="de-DE" sz="1400" dirty="0" smtClean="0">
-                <a:solidFill>
-                  <a:schemeClr val="tx1"/>
-                </a:solidFill>
-                <a:latin typeface="Courier New" pitchFamily="49" charset="0"/>
-                <a:cs typeface="Courier New" pitchFamily="49" charset="0"/>
-              </a:rPr>
-              <a:t>	  </a:t>
-            </a:r>
-            <a:r>
-              <a:rPr lang="de-DE" sz="1400" dirty="0" err="1" smtClean="0">
-                <a:solidFill>
-                  <a:schemeClr val="tx1"/>
-                </a:solidFill>
-                <a:latin typeface="Courier New" pitchFamily="49" charset="0"/>
-                <a:cs typeface="Courier New" pitchFamily="49" charset="0"/>
-              </a:rPr>
-              <a:t>buffer_id</a:t>
-            </a:r>
-            <a:r>
-              <a:rPr lang="de-DE" sz="1400" dirty="0" smtClean="0">
-                <a:solidFill>
-                  <a:schemeClr val="tx1"/>
-                </a:solidFill>
-                <a:latin typeface="Courier New" pitchFamily="49" charset="0"/>
-                <a:cs typeface="Courier New" pitchFamily="49" charset="0"/>
-              </a:rPr>
-              <a:t> = 1 - </a:t>
-            </a:r>
-            <a:r>
-              <a:rPr lang="de-DE" sz="1400" dirty="0" err="1" smtClean="0">
-                <a:solidFill>
-                  <a:schemeClr val="tx1"/>
-                </a:solidFill>
-                <a:latin typeface="Courier New" pitchFamily="49" charset="0"/>
-                <a:cs typeface="Courier New" pitchFamily="49" charset="0"/>
-              </a:rPr>
-              <a:t>buffer_id</a:t>
-            </a:r>
-            <a:r>
-              <a:rPr lang="de-DE" sz="1400" dirty="0" smtClean="0">
-                <a:solidFill>
-                  <a:schemeClr val="tx1"/>
-                </a:solidFill>
-                <a:latin typeface="Courier New" pitchFamily="49" charset="0"/>
-                <a:cs typeface="Courier New" pitchFamily="49" charset="0"/>
-              </a:rPr>
-              <a:t>;</a:t>
-            </a:r>
-          </a:p>
-          <a:p>
-            <a:pPr>
-              <a:defRPr/>
-            </a:pPr>
-            <a:r>
-              <a:rPr lang="de-DE" sz="1400" dirty="0" smtClean="0">
-                <a:solidFill>
-                  <a:schemeClr val="tx1"/>
-                </a:solidFill>
-                <a:latin typeface="Courier New" pitchFamily="49" charset="0"/>
-                <a:cs typeface="Courier New" pitchFamily="49" charset="0"/>
-              </a:rPr>
-              <a:t>  }</a:t>
+              <a:t>; }</a:t>
             </a:r>
             <a:endParaRPr lang="de-DE" sz="1400" dirty="0">
               <a:solidFill>
@@ -30436,7 +31420,7 @@
                 <a:latin typeface="Courier New" pitchFamily="49" charset="0"/>
                 <a:cs typeface="Courier New" pitchFamily="49" charset="0"/>
               </a:rPr>
-              <a:t>MPI_Issend</a:t>
+              <a:t>MPI_Isend</a:t>
             </a:r>
             <a:r>
               <a:rPr lang="de-DE" sz="1400" b="1" dirty="0" smtClean="0">
@@ -30623,14 +31607,7 @@
                 <a:latin typeface="Courier New" pitchFamily="49" charset="0"/>
                 <a:cs typeface="Courier New" pitchFamily="49" charset="0"/>
               </a:rPr>
-              <a:t>	</a:t>
-            </a:r>
-            <a:r>
-              <a:rPr lang="de-DE" sz="1400" b="1" dirty="0" smtClean="0">
-                <a:latin typeface="Courier New" pitchFamily="49" charset="0"/>
-                <a:cs typeface="Courier New" pitchFamily="49" charset="0"/>
-              </a:rPr>
-              <a:t>  </a:t>
+              <a:t>	  </a:t>
             </a:r>
             <a:r>
               <a:rPr lang="de-DE" sz="1400" b="1" dirty="0" err="1" smtClean="0">
@@ -31267,17 +32244,27 @@
                 <a:latin typeface="Courier New" pitchFamily="49" charset="0"/>
                 <a:cs typeface="Courier New" pitchFamily="49" charset="0"/>
               </a:rPr>
-              <a:t>MPI_Issend</a:t>
-            </a:r>
-            <a:r>
-              <a:rPr lang="de-DE" sz="1400" dirty="0" smtClean="0">
-                <a:solidFill>
-                  <a:schemeClr val="tx1"/>
-                </a:solidFill>
-                <a:latin typeface="Courier New" pitchFamily="49" charset="0"/>
-                <a:cs typeface="Courier New" pitchFamily="49" charset="0"/>
-              </a:rPr>
-              <a:t> ( &amp;</a:t>
+              <a:t>MPI_Isend</a:t>
+            </a:r>
+            <a:r>
+              <a:rPr lang="de-DE" sz="1400" dirty="0" smtClean="0">
+                <a:solidFill>
+                  <a:schemeClr val="tx1"/>
+                </a:solidFill>
+                <a:latin typeface="Courier New" pitchFamily="49" charset="0"/>
+                <a:cs typeface="Courier New" pitchFamily="49" charset="0"/>
+              </a:rPr>
+              <a:t> </a:t>
+            </a:r>
+            <a:r>
+              <a:rPr lang="de-DE" sz="1400" dirty="0" smtClean="0">
+                <a:solidFill>
+                  <a:schemeClr val="tx1"/>
+                </a:solidFill>
+                <a:latin typeface="Courier New" pitchFamily="49" charset="0"/>
+                <a:cs typeface="Courier New" pitchFamily="49" charset="0"/>
+              </a:rPr>
+              <a:t>( &amp;</a:t>
             </a:r>
             <a:r>
               <a:rPr lang="de-DE" sz="1400" dirty="0" err="1" smtClean="0">
@@ -31338,6 +32325,16 @@
                 <a:cs typeface="Courier New" pitchFamily="49" charset="0"/>
               </a:rPr>
               <a:t>, 0), VLEN, 				</a:t>
+            </a:r>
+            <a:r>
+              <a:rPr lang="de-DE" sz="1400" dirty="0" smtClean="0">
+                <a:solidFill>
+                  <a:schemeClr val="tx1"/>
+                </a:solidFill>
+                <a:latin typeface="Courier New" pitchFamily="49" charset="0"/>
+                <a:cs typeface="Courier New" pitchFamily="49" charset="0"/>
+              </a:rPr>
+              <a:t>    </a:t>
             </a:r>
             <a:r>
               <a:rPr lang="de-DE" sz="1400" b="1" dirty="0" smtClean="0">
@@ -36885,6 +37882,78 @@
               <a:defRPr/>
             </a:pPr>
             <a:r>
+              <a:rPr lang="de-DE" sz="1400" b="1" dirty="0" smtClean="0">
+                <a:solidFill>
+                  <a:srgbClr val="FF0000"/>
+                </a:solidFill>
+                <a:latin typeface="Courier New" pitchFamily="49" charset="0"/>
+                <a:cs typeface="Courier New" pitchFamily="49" charset="0"/>
+              </a:rPr>
+              <a:t>#</a:t>
+            </a:r>
+            <a:r>
+              <a:rPr lang="de-DE" sz="1400" b="1" dirty="0" err="1" smtClean="0">
+                <a:solidFill>
+                  <a:srgbClr val="FF0000"/>
+                </a:solidFill>
+                <a:latin typeface="Courier New" pitchFamily="49" charset="0"/>
+                <a:cs typeface="Courier New" pitchFamily="49" charset="0"/>
+              </a:rPr>
+              <a:t>pragma</a:t>
+            </a:r>
+            <a:r>
+              <a:rPr lang="de-DE" sz="1400" b="1" dirty="0" smtClean="0">
+                <a:solidFill>
+                  <a:srgbClr val="FF0000"/>
+                </a:solidFill>
+                <a:latin typeface="Courier New" pitchFamily="49" charset="0"/>
+                <a:cs typeface="Courier New" pitchFamily="49" charset="0"/>
+              </a:rPr>
+              <a:t> </a:t>
+            </a:r>
+            <a:r>
+              <a:rPr lang="de-DE" sz="1400" b="1" dirty="0" err="1" smtClean="0">
+                <a:solidFill>
+                  <a:srgbClr val="FF0000"/>
+                </a:solidFill>
+                <a:latin typeface="Courier New" pitchFamily="49" charset="0"/>
+                <a:cs typeface="Courier New" pitchFamily="49" charset="0"/>
+              </a:rPr>
+              <a:t>omp</a:t>
+            </a:r>
+            <a:r>
+              <a:rPr lang="de-DE" sz="1400" b="1" dirty="0" smtClean="0">
+                <a:solidFill>
+                  <a:srgbClr val="FF0000"/>
+                </a:solidFill>
+                <a:latin typeface="Courier New" pitchFamily="49" charset="0"/>
+                <a:cs typeface="Courier New" pitchFamily="49" charset="0"/>
+              </a:rPr>
+              <a:t> </a:t>
+            </a:r>
+            <a:r>
+              <a:rPr lang="de-DE" sz="1400" b="1" dirty="0" err="1" smtClean="0">
+                <a:solidFill>
+                  <a:srgbClr val="FF0000"/>
+                </a:solidFill>
+                <a:latin typeface="Courier New" pitchFamily="49" charset="0"/>
+                <a:cs typeface="Courier New" pitchFamily="49" charset="0"/>
+              </a:rPr>
+              <a:t>barrier</a:t>
+            </a:r>
+            <a:endParaRPr lang="de-DE" sz="1400" dirty="0" smtClean="0">
+              <a:solidFill>
+                <a:schemeClr val="tx1"/>
+              </a:solidFill>
+              <a:latin typeface="Courier New" pitchFamily="49" charset="0"/>
+              <a:cs typeface="Courier New" pitchFamily="49" charset="0"/>
+            </a:endParaRPr>
+          </a:p>
+          <a:p>
+            <a:pPr>
+              <a:defRPr/>
+            </a:pPr>
+            <a:r>
               <a:rPr lang="de-DE" sz="1400" dirty="0" err="1" smtClean="0">
                 <a:solidFill>
                   <a:schemeClr val="tx1"/>

</xml_diff>

<commit_message>
Update to tutorial slides.
</commit_message>
<xml_diff>
--- a/tutorial/slides/gaspi_tutorial.pptx
+++ b/tutorial/slides/gaspi_tutorial.pptx
@@ -64,13 +64,13 @@
     <p:sldId id="375" r:id="rId58"/>
     <p:sldId id="376" r:id="rId59"/>
     <p:sldId id="390" r:id="rId60"/>
-    <p:sldId id="377" r:id="rId61"/>
-    <p:sldId id="378" r:id="rId62"/>
-    <p:sldId id="379" r:id="rId63"/>
-    <p:sldId id="380" r:id="rId64"/>
-    <p:sldId id="381" r:id="rId65"/>
-    <p:sldId id="382" r:id="rId66"/>
-    <p:sldId id="383" r:id="rId67"/>
+    <p:sldId id="383" r:id="rId61"/>
+    <p:sldId id="377" r:id="rId62"/>
+    <p:sldId id="378" r:id="rId63"/>
+    <p:sldId id="379" r:id="rId64"/>
+    <p:sldId id="380" r:id="rId65"/>
+    <p:sldId id="381" r:id="rId66"/>
+    <p:sldId id="382" r:id="rId67"/>
     <p:sldId id="384" r:id="rId68"/>
     <p:sldId id="385" r:id="rId69"/>
     <p:sldId id="386" r:id="rId70"/>
@@ -86,9 +86,10 @@
     <p:sldId id="368" r:id="rId80"/>
     <p:sldId id="369" r:id="rId81"/>
     <p:sldId id="370" r:id="rId82"/>
-    <p:sldId id="265" r:id="rId83"/>
-    <p:sldId id="292" r:id="rId84"/>
-    <p:sldId id="312" r:id="rId85"/>
+    <p:sldId id="391" r:id="rId83"/>
+    <p:sldId id="265" r:id="rId84"/>
+    <p:sldId id="292" r:id="rId85"/>
+    <p:sldId id="312" r:id="rId86"/>
   </p:sldIdLst>
   <p:sldSz cx="9144000" cy="6858000" type="screen4x3"/>
   <p:notesSz cx="7099300" cy="10234613"/>
@@ -419,7 +420,7 @@
               <a:pPr>
                 <a:defRPr/>
               </a:pPr>
-              <a:t>10.03.2014</a:t>
+              <a:t>22.09.2014</a:t>
             </a:fld>
             <a:endParaRPr lang="de-DE"/>
           </a:p>
@@ -611,7 +612,7 @@
               <a:pPr>
                 <a:defRPr/>
               </a:pPr>
-              <a:t>10.03.2014</a:t>
+              <a:t>22.09.2014</a:t>
             </a:fld>
             <a:endParaRPr lang="de-DE"/>
           </a:p>
@@ -813,7 +814,7 @@
               <a:pPr>
                 <a:defRPr/>
               </a:pPr>
-              <a:t>10.03.2014</a:t>
+              <a:t>22.09.2014</a:t>
             </a:fld>
             <a:endParaRPr lang="de-DE"/>
           </a:p>
@@ -1055,7 +1056,7 @@
               <a:pPr>
                 <a:defRPr/>
               </a:pPr>
-              <a:t>10.03.2014</a:t>
+              <a:t>22.09.2014</a:t>
             </a:fld>
             <a:endParaRPr lang="de-DE"/>
           </a:p>
@@ -1325,7 +1326,7 @@
               <a:pPr>
                 <a:defRPr/>
               </a:pPr>
-              <a:t>10.03.2014</a:t>
+              <a:t>22.09.2014</a:t>
             </a:fld>
             <a:endParaRPr lang="de-DE"/>
           </a:p>
@@ -1683,7 +1684,7 @@
               <a:pPr>
                 <a:defRPr/>
               </a:pPr>
-              <a:t>10.03.2014</a:t>
+              <a:t>22.09.2014</a:t>
             </a:fld>
             <a:endParaRPr lang="de-DE"/>
           </a:p>
@@ -2179,7 +2180,7 @@
               <a:pPr>
                 <a:defRPr/>
               </a:pPr>
-              <a:t>10.03.2014</a:t>
+              <a:t>22.09.2014</a:t>
             </a:fld>
             <a:endParaRPr lang="de-DE"/>
           </a:p>
@@ -2327,7 +2328,7 @@
               <a:pPr>
                 <a:defRPr/>
               </a:pPr>
-              <a:t>10.03.2014</a:t>
+              <a:t>22.09.2014</a:t>
             </a:fld>
             <a:endParaRPr lang="de-DE"/>
           </a:p>
@@ -2444,7 +2445,7 @@
               <a:pPr>
                 <a:defRPr/>
               </a:pPr>
-              <a:t>10.03.2014</a:t>
+              <a:t>22.09.2014</a:t>
             </a:fld>
             <a:endParaRPr lang="de-DE"/>
           </a:p>
@@ -2743,7 +2744,7 @@
               <a:pPr>
                 <a:defRPr/>
               </a:pPr>
-              <a:t>10.03.2014</a:t>
+              <a:t>22.09.2014</a:t>
             </a:fld>
             <a:endParaRPr lang="de-DE"/>
           </a:p>
@@ -3021,7 +3022,7 @@
               <a:pPr>
                 <a:defRPr/>
               </a:pPr>
-              <a:t>10.03.2014</a:t>
+              <a:t>22.09.2014</a:t>
             </a:fld>
             <a:endParaRPr lang="de-DE"/>
           </a:p>
@@ -3343,7 +3344,7 @@
               <a:pPr>
                 <a:defRPr/>
               </a:pPr>
-              <a:t>10.03.2014</a:t>
+              <a:t>22.09.2014</a:t>
             </a:fld>
             <a:endParaRPr lang="de-DE"/>
           </a:p>
@@ -18998,14 +18999,7 @@
                 <a:latin typeface="Courier New" pitchFamily="49" charset="0"/>
                 <a:cs typeface="Courier New" pitchFamily="49" charset="0"/>
               </a:rPr>
-              <a:t>, 0), VLEN, 				</a:t>
-            </a:r>
-            <a:r>
-              <a:rPr lang="de-DE" sz="1400" dirty="0" smtClean="0">
-                <a:latin typeface="Courier New" pitchFamily="49" charset="0"/>
-                <a:cs typeface="Courier New" pitchFamily="49" charset="0"/>
-              </a:rPr>
-              <a:t>    </a:t>
+              <a:t>, 0), VLEN, 				    </a:t>
             </a:r>
             <a:r>
               <a:rPr lang="de-DE" sz="1400" b="1" dirty="0" smtClean="0">
@@ -23927,14 +23921,7 @@
                 <a:latin typeface="Courier New" pitchFamily="49" charset="0"/>
                 <a:cs typeface="Courier New" pitchFamily="49" charset="0"/>
               </a:rPr>
-              <a:t>	</a:t>
-            </a:r>
-            <a:r>
-              <a:rPr lang="de-DE" sz="1400" b="1" dirty="0" smtClean="0">
-                <a:latin typeface="Courier New" pitchFamily="49" charset="0"/>
-                <a:cs typeface="Courier New" pitchFamily="49" charset="0"/>
-              </a:rPr>
-              <a:t>    MPI_DOUBLE</a:t>
+              <a:t>	    MPI_DOUBLE</a:t>
             </a:r>
             <a:r>
               <a:rPr lang="de-DE" sz="1400" dirty="0" smtClean="0">
@@ -25150,14 +25137,7 @@
                 <a:latin typeface="Courier New" pitchFamily="49" charset="0"/>
                 <a:cs typeface="Courier New" pitchFamily="49" charset="0"/>
               </a:rPr>
-              <a:t>	</a:t>
-            </a:r>
-            <a:r>
-              <a:rPr lang="de-DE" sz="1400" b="1" dirty="0" smtClean="0">
-                <a:latin typeface="Courier New" pitchFamily="49" charset="0"/>
-                <a:cs typeface="Courier New" pitchFamily="49" charset="0"/>
-              </a:rPr>
-              <a:t>    MPI_DOUBLE</a:t>
+              <a:t>	    MPI_DOUBLE</a:t>
             </a:r>
             <a:r>
               <a:rPr lang="de-DE" sz="1400" dirty="0" smtClean="0">
@@ -25667,6 +25647,1273 @@
 </file>
 
 <file path=ppt/slides/slide60.xml><?xml version="1.0" encoding="utf-8"?>
+<p:sld xmlns:a="http://schemas.openxmlformats.org/drawingml/2006/main" xmlns:r="http://schemas.openxmlformats.org/officeDocument/2006/relationships" xmlns:p="http://schemas.openxmlformats.org/presentationml/2006/main">
+  <p:cSld>
+    <p:spTree>
+      <p:nvGrpSpPr>
+        <p:cNvPr id="1" name=""/>
+        <p:cNvGrpSpPr/>
+        <p:nvPr/>
+      </p:nvGrpSpPr>
+      <p:grpSpPr>
+        <a:xfrm>
+          <a:off x="0" y="0"/>
+          <a:ext cx="0" cy="0"/>
+          <a:chOff x="0" y="0"/>
+          <a:chExt cx="0" cy="0"/>
+        </a:xfrm>
+      </p:grpSpPr>
+      <p:sp>
+        <p:nvSpPr>
+          <p:cNvPr id="94210" name="Titel 1"/>
+          <p:cNvSpPr>
+            <a:spLocks noGrp="1"/>
+          </p:cNvSpPr>
+          <p:nvPr>
+            <p:ph type="title" idx="4294967295"/>
+          </p:nvPr>
+        </p:nvSpPr>
+        <p:spPr/>
+        <p:txBody>
+          <a:bodyPr/>
+          <a:lstStyle/>
+          <a:p>
+            <a:r>
+              <a:rPr lang="de-DE" dirty="0" smtClean="0"/>
+              <a:t>The </a:t>
+            </a:r>
+            <a:r>
+              <a:rPr lang="de-DE" dirty="0" smtClean="0"/>
+              <a:t>M</a:t>
+            </a:r>
+            <a:r>
+              <a:rPr lang="de-DE" dirty="0" smtClean="0"/>
+              <a:t>PI </a:t>
+            </a:r>
+            <a:r>
+              <a:rPr lang="de-DE" dirty="0" smtClean="0"/>
+              <a:t>Ring Exchange </a:t>
+            </a:r>
+          </a:p>
+        </p:txBody>
+      </p:sp>
+      <p:sp>
+        <p:nvSpPr>
+          <p:cNvPr id="94288" name="Inhaltsplatzhalter 95"/>
+          <p:cNvSpPr>
+            <a:spLocks noGrp="1"/>
+          </p:cNvSpPr>
+          <p:nvPr>
+            <p:ph idx="4294967295"/>
+          </p:nvPr>
+        </p:nvSpPr>
+        <p:spPr/>
+        <p:txBody>
+          <a:bodyPr/>
+          <a:lstStyle/>
+          <a:p>
+            <a:r>
+              <a:rPr lang="de-DE" dirty="0" smtClean="0"/>
+              <a:t>Bi-</a:t>
+            </a:r>
+            <a:r>
+              <a:rPr lang="de-DE" dirty="0" err="1" smtClean="0"/>
+              <a:t>directional</a:t>
+            </a:r>
+            <a:r>
+              <a:rPr lang="de-DE" dirty="0" smtClean="0"/>
+              <a:t> </a:t>
+            </a:r>
+            <a:r>
+              <a:rPr lang="de-DE" dirty="0" err="1" smtClean="0"/>
+              <a:t>halo</a:t>
+            </a:r>
+            <a:r>
+              <a:rPr lang="de-DE" dirty="0" smtClean="0"/>
+              <a:t> </a:t>
+            </a:r>
+            <a:r>
+              <a:rPr lang="de-DE" dirty="0" err="1" smtClean="0"/>
+              <a:t>exchange</a:t>
+            </a:r>
+            <a:r>
+              <a:rPr lang="de-DE" dirty="0" smtClean="0"/>
+              <a:t> – </a:t>
+            </a:r>
+            <a:br>
+              <a:rPr lang="de-DE" dirty="0" smtClean="0"/>
+            </a:br>
+            <a:r>
+              <a:rPr lang="de-DE" dirty="0" smtClean="0">
+                <a:solidFill>
+                  <a:srgbClr val="FF0000"/>
+                </a:solidFill>
+              </a:rPr>
+              <a:t>				</a:t>
+            </a:r>
+            <a:r>
+              <a:rPr lang="de-DE" dirty="0" err="1" smtClean="0">
+                <a:solidFill>
+                  <a:srgbClr val="FF0000"/>
+                </a:solidFill>
+              </a:rPr>
+              <a:t>implicit</a:t>
+            </a:r>
+            <a:r>
+              <a:rPr lang="de-DE" dirty="0" smtClean="0">
+                <a:solidFill>
+                  <a:srgbClr val="FF0000"/>
+                </a:solidFill>
+              </a:rPr>
+              <a:t> </a:t>
+            </a:r>
+            <a:r>
+              <a:rPr lang="de-DE" dirty="0" err="1" smtClean="0">
+                <a:solidFill>
+                  <a:srgbClr val="FF0000"/>
+                </a:solidFill>
+              </a:rPr>
+              <a:t>synchronization</a:t>
+            </a:r>
+            <a:endParaRPr lang="de-DE" dirty="0" smtClean="0">
+              <a:solidFill>
+                <a:srgbClr val="FF0000"/>
+              </a:solidFill>
+            </a:endParaRPr>
+          </a:p>
+        </p:txBody>
+      </p:sp>
+      <p:sp>
+        <p:nvSpPr>
+          <p:cNvPr id="5" name="Rechteck 4"/>
+          <p:cNvSpPr/>
+          <p:nvPr/>
+        </p:nvSpPr>
+        <p:spPr>
+          <a:xfrm>
+            <a:off x="5084822" y="4233890"/>
+            <a:ext cx="389355" cy="225549"/>
+          </a:xfrm>
+          <a:prstGeom prst="rect">
+            <a:avLst/>
+          </a:prstGeom>
+          <a:ln>
+            <a:solidFill>
+              <a:schemeClr val="dk1">
+                <a:shade val="50000"/>
+              </a:schemeClr>
+            </a:solidFill>
+            <a:prstDash val="dash"/>
+          </a:ln>
+        </p:spPr>
+        <p:style>
+          <a:lnRef idx="2">
+            <a:schemeClr val="dk1">
+              <a:shade val="50000"/>
+            </a:schemeClr>
+          </a:lnRef>
+          <a:fillRef idx="1">
+            <a:schemeClr val="dk1"/>
+          </a:fillRef>
+          <a:effectRef idx="0">
+            <a:schemeClr val="dk1"/>
+          </a:effectRef>
+          <a:fontRef idx="minor">
+            <a:schemeClr val="lt1"/>
+          </a:fontRef>
+        </p:style>
+        <p:txBody>
+          <a:bodyPr rtlCol="0" anchor="ctr"/>
+          <a:lstStyle/>
+          <a:p>
+            <a:pPr algn="ctr"/>
+            <a:endParaRPr lang="de-DE"/>
+          </a:p>
+        </p:txBody>
+      </p:sp>
+      <p:sp>
+        <p:nvSpPr>
+          <p:cNvPr id="6" name="Rechteck 5"/>
+          <p:cNvSpPr/>
+          <p:nvPr/>
+        </p:nvSpPr>
+        <p:spPr>
+          <a:xfrm>
+            <a:off x="5084822" y="4442443"/>
+            <a:ext cx="389355" cy="1257511"/>
+          </a:xfrm>
+          <a:prstGeom prst="rect">
+            <a:avLst/>
+          </a:prstGeom>
+        </p:spPr>
+        <p:style>
+          <a:lnRef idx="2">
+            <a:schemeClr val="accent1"/>
+          </a:lnRef>
+          <a:fillRef idx="1">
+            <a:schemeClr val="lt1"/>
+          </a:fillRef>
+          <a:effectRef idx="0">
+            <a:schemeClr val="accent1"/>
+          </a:effectRef>
+          <a:fontRef idx="minor">
+            <a:schemeClr val="dk1"/>
+          </a:fontRef>
+        </p:style>
+        <p:txBody>
+          <a:bodyPr rtlCol="0" anchor="ctr"/>
+          <a:lstStyle/>
+          <a:p>
+            <a:pPr algn="ctr"/>
+            <a:endParaRPr lang="de-DE"/>
+          </a:p>
+        </p:txBody>
+      </p:sp>
+      <p:sp>
+        <p:nvSpPr>
+          <p:cNvPr id="7" name="Rechteck 6"/>
+          <p:cNvSpPr/>
+          <p:nvPr/>
+        </p:nvSpPr>
+        <p:spPr>
+          <a:xfrm>
+            <a:off x="2281467" y="5248857"/>
+            <a:ext cx="365884" cy="1184128"/>
+          </a:xfrm>
+          <a:prstGeom prst="rect">
+            <a:avLst/>
+          </a:prstGeom>
+        </p:spPr>
+        <p:style>
+          <a:lnRef idx="2">
+            <a:schemeClr val="dk1">
+              <a:shade val="50000"/>
+            </a:schemeClr>
+          </a:lnRef>
+          <a:fillRef idx="1">
+            <a:schemeClr val="dk1"/>
+          </a:fillRef>
+          <a:effectRef idx="0">
+            <a:schemeClr val="dk1"/>
+          </a:effectRef>
+          <a:fontRef idx="minor">
+            <a:schemeClr val="lt1"/>
+          </a:fontRef>
+        </p:style>
+        <p:txBody>
+          <a:bodyPr rtlCol="0" anchor="ctr"/>
+          <a:lstStyle/>
+          <a:p>
+            <a:pPr algn="ctr"/>
+            <a:endParaRPr lang="de-DE"/>
+          </a:p>
+        </p:txBody>
+      </p:sp>
+      <p:sp>
+        <p:nvSpPr>
+          <p:cNvPr id="10" name="Rechteck 9"/>
+          <p:cNvSpPr/>
+          <p:nvPr/>
+        </p:nvSpPr>
+        <p:spPr>
+          <a:xfrm>
+            <a:off x="2281467" y="3839181"/>
+            <a:ext cx="365884" cy="1409676"/>
+          </a:xfrm>
+          <a:prstGeom prst="rect">
+            <a:avLst/>
+          </a:prstGeom>
+        </p:spPr>
+        <p:style>
+          <a:lnRef idx="2">
+            <a:schemeClr val="accent6">
+              <a:shade val="50000"/>
+            </a:schemeClr>
+          </a:lnRef>
+          <a:fillRef idx="1">
+            <a:schemeClr val="accent6"/>
+          </a:fillRef>
+          <a:effectRef idx="0">
+            <a:schemeClr val="accent6"/>
+          </a:effectRef>
+          <a:fontRef idx="minor">
+            <a:schemeClr val="lt1"/>
+          </a:fontRef>
+        </p:style>
+        <p:txBody>
+          <a:bodyPr rtlCol="0" anchor="ctr"/>
+          <a:lstStyle/>
+          <a:p>
+            <a:pPr algn="ctr"/>
+            <a:endParaRPr lang="de-DE"/>
+          </a:p>
+        </p:txBody>
+      </p:sp>
+      <p:sp>
+        <p:nvSpPr>
+          <p:cNvPr id="11" name="Rechteck 10"/>
+          <p:cNvSpPr/>
+          <p:nvPr/>
+        </p:nvSpPr>
+        <p:spPr>
+          <a:xfrm>
+            <a:off x="5084822" y="4064729"/>
+            <a:ext cx="389355" cy="169161"/>
+          </a:xfrm>
+          <a:prstGeom prst="rect">
+            <a:avLst/>
+          </a:prstGeom>
+          <a:ln>
+            <a:solidFill>
+              <a:schemeClr val="tx1"/>
+            </a:solidFill>
+          </a:ln>
+        </p:spPr>
+        <p:style>
+          <a:lnRef idx="2">
+            <a:schemeClr val="accent6">
+              <a:shade val="50000"/>
+            </a:schemeClr>
+          </a:lnRef>
+          <a:fillRef idx="1">
+            <a:schemeClr val="accent6"/>
+          </a:fillRef>
+          <a:effectRef idx="0">
+            <a:schemeClr val="accent6"/>
+          </a:effectRef>
+          <a:fontRef idx="minor">
+            <a:schemeClr val="lt1"/>
+          </a:fontRef>
+        </p:style>
+        <p:txBody>
+          <a:bodyPr rtlCol="0" anchor="ctr"/>
+          <a:lstStyle/>
+          <a:p>
+            <a:pPr algn="ctr"/>
+            <a:endParaRPr lang="de-DE"/>
+          </a:p>
+        </p:txBody>
+      </p:sp>
+      <p:sp>
+        <p:nvSpPr>
+          <p:cNvPr id="14" name="Textfeld 13"/>
+          <p:cNvSpPr txBox="1"/>
+          <p:nvPr/>
+        </p:nvSpPr>
+        <p:spPr>
+          <a:xfrm>
+            <a:off x="501213" y="3839181"/>
+            <a:ext cx="1557420" cy="369332"/>
+          </a:xfrm>
+          <a:prstGeom prst="rect">
+            <a:avLst/>
+          </a:prstGeom>
+          <a:noFill/>
+        </p:spPr>
+        <p:txBody>
+          <a:bodyPr wrap="square" rtlCol="0">
+            <a:spAutoFit/>
+          </a:bodyPr>
+          <a:lstStyle/>
+          <a:p>
+            <a:r>
+              <a:rPr lang="de-DE" b="1" dirty="0" err="1" smtClean="0">
+                <a:solidFill>
+                  <a:srgbClr val="3B57A0"/>
+                </a:solidFill>
+              </a:rPr>
+              <a:t>buffer_id</a:t>
+            </a:r>
+            <a:r>
+              <a:rPr lang="de-DE" b="1" dirty="0" smtClean="0">
+                <a:solidFill>
+                  <a:srgbClr val="3B57A0"/>
+                </a:solidFill>
+              </a:rPr>
+              <a:t> = 0</a:t>
+            </a:r>
+            <a:endParaRPr lang="de-DE" b="1" dirty="0">
+              <a:solidFill>
+                <a:srgbClr val="3B57A0"/>
+              </a:solidFill>
+            </a:endParaRPr>
+          </a:p>
+        </p:txBody>
+      </p:sp>
+      <p:sp>
+        <p:nvSpPr>
+          <p:cNvPr id="15" name="Textfeld 14"/>
+          <p:cNvSpPr txBox="1"/>
+          <p:nvPr/>
+        </p:nvSpPr>
+        <p:spPr>
+          <a:xfrm>
+            <a:off x="490062" y="5361631"/>
+            <a:ext cx="1557420" cy="369332"/>
+          </a:xfrm>
+          <a:prstGeom prst="rect">
+            <a:avLst/>
+          </a:prstGeom>
+          <a:noFill/>
+        </p:spPr>
+        <p:txBody>
+          <a:bodyPr wrap="square" rtlCol="0">
+            <a:spAutoFit/>
+          </a:bodyPr>
+          <a:lstStyle/>
+          <a:p>
+            <a:r>
+              <a:rPr lang="de-DE" b="1" dirty="0" err="1" smtClean="0">
+                <a:solidFill>
+                  <a:srgbClr val="3B57A0"/>
+                </a:solidFill>
+              </a:rPr>
+              <a:t>buffer_id</a:t>
+            </a:r>
+            <a:r>
+              <a:rPr lang="de-DE" b="1" dirty="0" smtClean="0">
+                <a:solidFill>
+                  <a:srgbClr val="3B57A0"/>
+                </a:solidFill>
+              </a:rPr>
+              <a:t> = 1</a:t>
+            </a:r>
+            <a:endParaRPr lang="de-DE" b="1" dirty="0">
+              <a:solidFill>
+                <a:srgbClr val="3B57A0"/>
+              </a:solidFill>
+            </a:endParaRPr>
+          </a:p>
+        </p:txBody>
+      </p:sp>
+      <p:sp>
+        <p:nvSpPr>
+          <p:cNvPr id="17" name="Rechteck 16"/>
+          <p:cNvSpPr/>
+          <p:nvPr/>
+        </p:nvSpPr>
+        <p:spPr>
+          <a:xfrm>
+            <a:off x="5084822" y="5699953"/>
+            <a:ext cx="389355" cy="180312"/>
+          </a:xfrm>
+          <a:prstGeom prst="rect">
+            <a:avLst/>
+          </a:prstGeom>
+          <a:solidFill>
+            <a:schemeClr val="tx1"/>
+          </a:solidFill>
+          <a:ln>
+            <a:solidFill>
+              <a:schemeClr val="tx1"/>
+            </a:solidFill>
+          </a:ln>
+        </p:spPr>
+        <p:style>
+          <a:lnRef idx="2">
+            <a:schemeClr val="accent6">
+              <a:shade val="50000"/>
+            </a:schemeClr>
+          </a:lnRef>
+          <a:fillRef idx="1">
+            <a:schemeClr val="accent6"/>
+          </a:fillRef>
+          <a:effectRef idx="0">
+            <a:schemeClr val="accent6"/>
+          </a:effectRef>
+          <a:fontRef idx="minor">
+            <a:schemeClr val="lt1"/>
+          </a:fontRef>
+        </p:style>
+        <p:txBody>
+          <a:bodyPr rtlCol="0" anchor="ctr"/>
+          <a:lstStyle/>
+          <a:p>
+            <a:pPr algn="ctr"/>
+            <a:endParaRPr lang="de-DE"/>
+          </a:p>
+        </p:txBody>
+      </p:sp>
+      <p:sp>
+        <p:nvSpPr>
+          <p:cNvPr id="18" name="Textfeld 17"/>
+          <p:cNvSpPr txBox="1"/>
+          <p:nvPr/>
+        </p:nvSpPr>
+        <p:spPr>
+          <a:xfrm>
+            <a:off x="5685674" y="3940804"/>
+            <a:ext cx="1557420" cy="369332"/>
+          </a:xfrm>
+          <a:prstGeom prst="rect">
+            <a:avLst/>
+          </a:prstGeom>
+          <a:noFill/>
+        </p:spPr>
+        <p:txBody>
+          <a:bodyPr wrap="square" rtlCol="0">
+            <a:spAutoFit/>
+          </a:bodyPr>
+          <a:lstStyle/>
+          <a:p>
+            <a:r>
+              <a:rPr lang="de-DE" b="1" dirty="0" err="1" smtClean="0">
+                <a:solidFill>
+                  <a:srgbClr val="3B57A0"/>
+                </a:solidFill>
+              </a:rPr>
+              <a:t>buffer_id</a:t>
+            </a:r>
+            <a:r>
+              <a:rPr lang="de-DE" b="1" dirty="0" smtClean="0">
+                <a:solidFill>
+                  <a:srgbClr val="3B57A0"/>
+                </a:solidFill>
+              </a:rPr>
+              <a:t> = 0</a:t>
+            </a:r>
+            <a:endParaRPr lang="de-DE" b="1" dirty="0">
+              <a:solidFill>
+                <a:srgbClr val="3B57A0"/>
+              </a:solidFill>
+            </a:endParaRPr>
+          </a:p>
+        </p:txBody>
+      </p:sp>
+      <p:sp>
+        <p:nvSpPr>
+          <p:cNvPr id="19" name="Textfeld 18"/>
+          <p:cNvSpPr txBox="1"/>
+          <p:nvPr/>
+        </p:nvSpPr>
+        <p:spPr>
+          <a:xfrm>
+            <a:off x="5685674" y="4199805"/>
+            <a:ext cx="1557420" cy="369332"/>
+          </a:xfrm>
+          <a:prstGeom prst="rect">
+            <a:avLst/>
+          </a:prstGeom>
+          <a:noFill/>
+        </p:spPr>
+        <p:txBody>
+          <a:bodyPr wrap="square" rtlCol="0">
+            <a:spAutoFit/>
+          </a:bodyPr>
+          <a:lstStyle/>
+          <a:p>
+            <a:r>
+              <a:rPr lang="de-DE" b="1" dirty="0" err="1" smtClean="0">
+                <a:solidFill>
+                  <a:srgbClr val="3B57A0"/>
+                </a:solidFill>
+              </a:rPr>
+              <a:t>buffer_id</a:t>
+            </a:r>
+            <a:r>
+              <a:rPr lang="de-DE" b="1" dirty="0" smtClean="0">
+                <a:solidFill>
+                  <a:srgbClr val="3B57A0"/>
+                </a:solidFill>
+              </a:rPr>
+              <a:t> = 1</a:t>
+            </a:r>
+            <a:endParaRPr lang="de-DE" b="1" dirty="0">
+              <a:solidFill>
+                <a:srgbClr val="3B57A0"/>
+              </a:solidFill>
+            </a:endParaRPr>
+          </a:p>
+        </p:txBody>
+      </p:sp>
+      <p:sp>
+        <p:nvSpPr>
+          <p:cNvPr id="20" name="Textfeld 19"/>
+          <p:cNvSpPr txBox="1"/>
+          <p:nvPr/>
+        </p:nvSpPr>
+        <p:spPr>
+          <a:xfrm>
+            <a:off x="5629919" y="5643566"/>
+            <a:ext cx="1557420" cy="369332"/>
+          </a:xfrm>
+          <a:prstGeom prst="rect">
+            <a:avLst/>
+          </a:prstGeom>
+          <a:noFill/>
+        </p:spPr>
+        <p:txBody>
+          <a:bodyPr wrap="square" rtlCol="0">
+            <a:spAutoFit/>
+          </a:bodyPr>
+          <a:lstStyle/>
+          <a:p>
+            <a:r>
+              <a:rPr lang="de-DE" b="1" dirty="0" err="1" smtClean="0">
+                <a:solidFill>
+                  <a:srgbClr val="3B57A0"/>
+                </a:solidFill>
+              </a:rPr>
+              <a:t>buffer_id</a:t>
+            </a:r>
+            <a:r>
+              <a:rPr lang="de-DE" b="1" dirty="0" smtClean="0">
+                <a:solidFill>
+                  <a:srgbClr val="3B57A0"/>
+                </a:solidFill>
+              </a:rPr>
+              <a:t> = 0</a:t>
+            </a:r>
+            <a:endParaRPr lang="de-DE" b="1" dirty="0">
+              <a:solidFill>
+                <a:srgbClr val="3B57A0"/>
+              </a:solidFill>
+            </a:endParaRPr>
+          </a:p>
+        </p:txBody>
+      </p:sp>
+      <p:sp>
+        <p:nvSpPr>
+          <p:cNvPr id="21" name="Rechteck 20"/>
+          <p:cNvSpPr/>
+          <p:nvPr/>
+        </p:nvSpPr>
+        <p:spPr>
+          <a:xfrm>
+            <a:off x="2668859" y="3830846"/>
+            <a:ext cx="141249" cy="1409676"/>
+          </a:xfrm>
+          <a:prstGeom prst="rect">
+            <a:avLst/>
+          </a:prstGeom>
+          <a:ln/>
+        </p:spPr>
+        <p:style>
+          <a:lnRef idx="2">
+            <a:schemeClr val="dk1">
+              <a:shade val="50000"/>
+            </a:schemeClr>
+          </a:lnRef>
+          <a:fillRef idx="1">
+            <a:schemeClr val="dk1"/>
+          </a:fillRef>
+          <a:effectRef idx="0">
+            <a:schemeClr val="dk1"/>
+          </a:effectRef>
+          <a:fontRef idx="minor">
+            <a:schemeClr val="lt1"/>
+          </a:fontRef>
+        </p:style>
+        <p:txBody>
+          <a:bodyPr rtlCol="0" anchor="ctr"/>
+          <a:lstStyle/>
+          <a:p>
+            <a:pPr algn="ctr"/>
+            <a:endParaRPr lang="de-DE"/>
+          </a:p>
+        </p:txBody>
+      </p:sp>
+      <p:sp>
+        <p:nvSpPr>
+          <p:cNvPr id="25" name="Rechteck 24"/>
+          <p:cNvSpPr/>
+          <p:nvPr/>
+        </p:nvSpPr>
+        <p:spPr>
+          <a:xfrm flipH="1">
+            <a:off x="2668859" y="5251673"/>
+            <a:ext cx="152400" cy="1184128"/>
+          </a:xfrm>
+          <a:prstGeom prst="rect">
+            <a:avLst/>
+          </a:prstGeom>
+          <a:ln>
+            <a:solidFill>
+              <a:schemeClr val="tx1"/>
+            </a:solidFill>
+          </a:ln>
+        </p:spPr>
+        <p:style>
+          <a:lnRef idx="2">
+            <a:schemeClr val="accent6">
+              <a:shade val="50000"/>
+            </a:schemeClr>
+          </a:lnRef>
+          <a:fillRef idx="1">
+            <a:schemeClr val="accent6"/>
+          </a:fillRef>
+          <a:effectRef idx="0">
+            <a:schemeClr val="accent6"/>
+          </a:effectRef>
+          <a:fontRef idx="minor">
+            <a:schemeClr val="lt1"/>
+          </a:fontRef>
+        </p:style>
+        <p:txBody>
+          <a:bodyPr rtlCol="0" anchor="ctr"/>
+          <a:lstStyle/>
+          <a:p>
+            <a:pPr algn="ctr"/>
+            <a:endParaRPr lang="de-DE"/>
+          </a:p>
+        </p:txBody>
+      </p:sp>
+      <p:sp>
+        <p:nvSpPr>
+          <p:cNvPr id="26" name="Rechteck 25"/>
+          <p:cNvSpPr/>
+          <p:nvPr/>
+        </p:nvSpPr>
+        <p:spPr>
+          <a:xfrm flipH="1">
+            <a:off x="4899335" y="4064729"/>
+            <a:ext cx="185487" cy="177496"/>
+          </a:xfrm>
+          <a:prstGeom prst="rect">
+            <a:avLst/>
+          </a:prstGeom>
+          <a:ln/>
+        </p:spPr>
+        <p:style>
+          <a:lnRef idx="2">
+            <a:schemeClr val="dk1">
+              <a:shade val="50000"/>
+            </a:schemeClr>
+          </a:lnRef>
+          <a:fillRef idx="1">
+            <a:schemeClr val="dk1"/>
+          </a:fillRef>
+          <a:effectRef idx="0">
+            <a:schemeClr val="dk1"/>
+          </a:effectRef>
+          <a:fontRef idx="minor">
+            <a:schemeClr val="lt1"/>
+          </a:fontRef>
+        </p:style>
+        <p:txBody>
+          <a:bodyPr rtlCol="0" anchor="ctr"/>
+          <a:lstStyle/>
+          <a:p>
+            <a:pPr algn="ctr"/>
+            <a:endParaRPr lang="de-DE"/>
+          </a:p>
+        </p:txBody>
+      </p:sp>
+      <p:sp>
+        <p:nvSpPr>
+          <p:cNvPr id="29" name="Rechteck 28"/>
+          <p:cNvSpPr/>
+          <p:nvPr/>
+        </p:nvSpPr>
+        <p:spPr>
+          <a:xfrm>
+            <a:off x="4899337" y="4233890"/>
+            <a:ext cx="185486" cy="200218"/>
+          </a:xfrm>
+          <a:prstGeom prst="rect">
+            <a:avLst/>
+          </a:prstGeom>
+          <a:ln>
+            <a:solidFill>
+              <a:schemeClr val="tx1"/>
+            </a:solidFill>
+          </a:ln>
+        </p:spPr>
+        <p:style>
+          <a:lnRef idx="2">
+            <a:schemeClr val="accent6">
+              <a:shade val="50000"/>
+            </a:schemeClr>
+          </a:lnRef>
+          <a:fillRef idx="1">
+            <a:schemeClr val="accent6"/>
+          </a:fillRef>
+          <a:effectRef idx="0">
+            <a:schemeClr val="accent6"/>
+          </a:effectRef>
+          <a:fontRef idx="minor">
+            <a:schemeClr val="lt1"/>
+          </a:fontRef>
+        </p:style>
+        <p:txBody>
+          <a:bodyPr rtlCol="0" anchor="ctr"/>
+          <a:lstStyle/>
+          <a:p>
+            <a:pPr algn="ctr"/>
+            <a:endParaRPr lang="de-DE"/>
+          </a:p>
+        </p:txBody>
+      </p:sp>
+      <p:sp>
+        <p:nvSpPr>
+          <p:cNvPr id="31" name="Rechteck 30"/>
+          <p:cNvSpPr/>
+          <p:nvPr/>
+        </p:nvSpPr>
+        <p:spPr>
+          <a:xfrm flipH="1">
+            <a:off x="4899337" y="5702769"/>
+            <a:ext cx="185487" cy="177496"/>
+          </a:xfrm>
+          <a:prstGeom prst="rect">
+            <a:avLst/>
+          </a:prstGeom>
+          <a:solidFill>
+            <a:schemeClr val="accent6"/>
+          </a:solidFill>
+          <a:ln/>
+        </p:spPr>
+        <p:style>
+          <a:lnRef idx="2">
+            <a:schemeClr val="dk1">
+              <a:shade val="50000"/>
+            </a:schemeClr>
+          </a:lnRef>
+          <a:fillRef idx="1">
+            <a:schemeClr val="dk1"/>
+          </a:fillRef>
+          <a:effectRef idx="0">
+            <a:schemeClr val="dk1"/>
+          </a:effectRef>
+          <a:fontRef idx="minor">
+            <a:schemeClr val="lt1"/>
+          </a:fontRef>
+        </p:style>
+        <p:txBody>
+          <a:bodyPr rtlCol="0" anchor="ctr"/>
+          <a:lstStyle/>
+          <a:p>
+            <a:pPr algn="ctr"/>
+            <a:endParaRPr lang="de-DE"/>
+          </a:p>
+        </p:txBody>
+      </p:sp>
+      <p:cxnSp>
+        <p:nvCxnSpPr>
+          <p:cNvPr id="13" name="Gerade Verbindung mit Pfeil 12"/>
+          <p:cNvCxnSpPr>
+            <a:stCxn id="11" idx="2"/>
+          </p:cNvCxnSpPr>
+          <p:nvPr/>
+        </p:nvCxnSpPr>
+        <p:spPr>
+          <a:xfrm flipH="1">
+            <a:off x="2821259" y="4233890"/>
+            <a:ext cx="2458241" cy="563870"/>
+          </a:xfrm>
+          <a:prstGeom prst="straightConnector1">
+            <a:avLst/>
+          </a:prstGeom>
+          <a:ln>
+            <a:solidFill>
+              <a:schemeClr val="accent6"/>
+            </a:solidFill>
+            <a:tailEnd type="arrow"/>
+          </a:ln>
+        </p:spPr>
+        <p:style>
+          <a:lnRef idx="2">
+            <a:schemeClr val="accent1"/>
+          </a:lnRef>
+          <a:fillRef idx="0">
+            <a:schemeClr val="accent1"/>
+          </a:fillRef>
+          <a:effectRef idx="1">
+            <a:schemeClr val="accent1"/>
+          </a:effectRef>
+          <a:fontRef idx="minor">
+            <a:schemeClr val="tx1"/>
+          </a:fontRef>
+        </p:style>
+      </p:cxnSp>
+      <p:cxnSp>
+        <p:nvCxnSpPr>
+          <p:cNvPr id="9" name="Gerade Verbindung mit Pfeil 8"/>
+          <p:cNvCxnSpPr>
+            <a:stCxn id="11" idx="0"/>
+          </p:cNvCxnSpPr>
+          <p:nvPr/>
+        </p:nvCxnSpPr>
+        <p:spPr>
+          <a:xfrm flipH="1">
+            <a:off x="2821259" y="4064729"/>
+            <a:ext cx="2458241" cy="546875"/>
+          </a:xfrm>
+          <a:prstGeom prst="straightConnector1">
+            <a:avLst/>
+          </a:prstGeom>
+          <a:ln>
+            <a:solidFill>
+              <a:schemeClr val="tx1"/>
+            </a:solidFill>
+            <a:tailEnd type="arrow"/>
+          </a:ln>
+        </p:spPr>
+        <p:style>
+          <a:lnRef idx="2">
+            <a:schemeClr val="accent2"/>
+          </a:lnRef>
+          <a:fillRef idx="0">
+            <a:schemeClr val="accent2"/>
+          </a:fillRef>
+          <a:effectRef idx="1">
+            <a:schemeClr val="accent2"/>
+          </a:effectRef>
+          <a:fontRef idx="minor">
+            <a:schemeClr val="tx1"/>
+          </a:fontRef>
+        </p:style>
+      </p:cxnSp>
+      <p:cxnSp>
+        <p:nvCxnSpPr>
+          <p:cNvPr id="8" name="Gerade Verbindung mit Pfeil 7"/>
+          <p:cNvCxnSpPr>
+            <a:stCxn id="10" idx="0"/>
+          </p:cNvCxnSpPr>
+          <p:nvPr/>
+        </p:nvCxnSpPr>
+        <p:spPr>
+          <a:xfrm>
+            <a:off x="2464409" y="3839181"/>
+            <a:ext cx="2434926" cy="225548"/>
+          </a:xfrm>
+          <a:prstGeom prst="straightConnector1">
+            <a:avLst/>
+          </a:prstGeom>
+          <a:ln>
+            <a:solidFill>
+              <a:schemeClr val="tx1"/>
+            </a:solidFill>
+            <a:tailEnd type="arrow"/>
+          </a:ln>
+        </p:spPr>
+        <p:style>
+          <a:lnRef idx="2">
+            <a:schemeClr val="accent2"/>
+          </a:lnRef>
+          <a:fillRef idx="0">
+            <a:schemeClr val="accent2"/>
+          </a:fillRef>
+          <a:effectRef idx="1">
+            <a:schemeClr val="accent2"/>
+          </a:effectRef>
+          <a:fontRef idx="minor">
+            <a:schemeClr val="tx1"/>
+          </a:fontRef>
+        </p:style>
+      </p:cxnSp>
+      <p:cxnSp>
+        <p:nvCxnSpPr>
+          <p:cNvPr id="12" name="Gerade Verbindung mit Pfeil 11"/>
+          <p:cNvCxnSpPr/>
+          <p:nvPr/>
+        </p:nvCxnSpPr>
+        <p:spPr>
+          <a:xfrm flipH="1">
+            <a:off x="2821259" y="5699953"/>
+            <a:ext cx="2458241" cy="580866"/>
+          </a:xfrm>
+          <a:prstGeom prst="straightConnector1">
+            <a:avLst/>
+          </a:prstGeom>
+          <a:ln>
+            <a:solidFill>
+              <a:schemeClr val="tx1"/>
+            </a:solidFill>
+            <a:tailEnd type="arrow"/>
+          </a:ln>
+        </p:spPr>
+        <p:style>
+          <a:lnRef idx="2">
+            <a:schemeClr val="accent2"/>
+          </a:lnRef>
+          <a:fillRef idx="0">
+            <a:schemeClr val="accent2"/>
+          </a:fillRef>
+          <a:effectRef idx="1">
+            <a:schemeClr val="accent2"/>
+          </a:effectRef>
+          <a:fontRef idx="minor">
+            <a:schemeClr val="tx1"/>
+          </a:fontRef>
+        </p:style>
+      </p:cxnSp>
+      <p:cxnSp>
+        <p:nvCxnSpPr>
+          <p:cNvPr id="22" name="Gerade Verbindung mit Pfeil 21"/>
+          <p:cNvCxnSpPr/>
+          <p:nvPr/>
+        </p:nvCxnSpPr>
+        <p:spPr>
+          <a:xfrm flipH="1">
+            <a:off x="2821259" y="4459439"/>
+            <a:ext cx="2458241" cy="546875"/>
+          </a:xfrm>
+          <a:prstGeom prst="straightConnector1">
+            <a:avLst/>
+          </a:prstGeom>
+          <a:ln>
+            <a:solidFill>
+              <a:schemeClr val="tx1"/>
+            </a:solidFill>
+            <a:prstDash val="dash"/>
+            <a:tailEnd type="arrow"/>
+          </a:ln>
+        </p:spPr>
+        <p:style>
+          <a:lnRef idx="2">
+            <a:schemeClr val="accent2"/>
+          </a:lnRef>
+          <a:fillRef idx="0">
+            <a:schemeClr val="accent2"/>
+          </a:fillRef>
+          <a:effectRef idx="1">
+            <a:schemeClr val="accent2"/>
+          </a:effectRef>
+          <a:fontRef idx="minor">
+            <a:schemeClr val="tx1"/>
+          </a:fontRef>
+        </p:style>
+      </p:cxnSp>
+      <p:cxnSp>
+        <p:nvCxnSpPr>
+          <p:cNvPr id="16" name="Gerade Verbindung mit Pfeil 15"/>
+          <p:cNvCxnSpPr>
+            <a:stCxn id="10" idx="2"/>
+          </p:cNvCxnSpPr>
+          <p:nvPr/>
+        </p:nvCxnSpPr>
+        <p:spPr>
+          <a:xfrm>
+            <a:off x="2464409" y="5248857"/>
+            <a:ext cx="2434926" cy="451096"/>
+          </a:xfrm>
+          <a:prstGeom prst="straightConnector1">
+            <a:avLst/>
+          </a:prstGeom>
+          <a:ln>
+            <a:solidFill>
+              <a:schemeClr val="accent6"/>
+            </a:solidFill>
+            <a:tailEnd type="arrow"/>
+          </a:ln>
+        </p:spPr>
+        <p:style>
+          <a:lnRef idx="2">
+            <a:schemeClr val="accent1"/>
+          </a:lnRef>
+          <a:fillRef idx="0">
+            <a:schemeClr val="accent1"/>
+          </a:fillRef>
+          <a:effectRef idx="1">
+            <a:schemeClr val="accent1"/>
+          </a:effectRef>
+          <a:fontRef idx="minor">
+            <a:schemeClr val="tx1"/>
+          </a:fontRef>
+        </p:style>
+      </p:cxnSp>
+    </p:spTree>
+  </p:cSld>
+  <p:clrMapOvr>
+    <a:masterClrMapping/>
+  </p:clrMapOvr>
+  <p:timing>
+    <p:tnLst>
+      <p:par>
+        <p:cTn id="1" dur="indefinite" restart="never" nodeType="tmRoot">
+          <p:childTnLst>
+            <p:seq concurrent="1" nextAc="seek">
+              <p:cTn id="2" dur="indefinite" nodeType="mainSeq">
+                <p:childTnLst>
+                  <p:par>
+                    <p:cTn id="3" fill="hold">
+                      <p:stCondLst>
+                        <p:cond delay="indefinite"/>
+                      </p:stCondLst>
+                      <p:childTnLst>
+                        <p:par>
+                          <p:cTn id="4" fill="hold">
+                            <p:stCondLst>
+                              <p:cond delay="0"/>
+                            </p:stCondLst>
+                            <p:childTnLst>
+                              <p:par>
+                                <p:cTn id="5" presetID="1" presetClass="entr" presetSubtype="0" fill="hold" nodeType="clickEffect">
+                                  <p:stCondLst>
+                                    <p:cond delay="0"/>
+                                  </p:stCondLst>
+                                  <p:childTnLst>
+                                    <p:set>
+                                      <p:cBhvr>
+                                        <p:cTn id="6" dur="1" fill="hold">
+                                          <p:stCondLst>
+                                            <p:cond delay="0"/>
+                                          </p:stCondLst>
+                                        </p:cTn>
+                                        <p:tgtEl>
+                                          <p:spTgt spid="22"/>
+                                        </p:tgtEl>
+                                        <p:attrNameLst>
+                                          <p:attrName>style.visibility</p:attrName>
+                                        </p:attrNameLst>
+                                      </p:cBhvr>
+                                      <p:to>
+                                        <p:strVal val="visible"/>
+                                      </p:to>
+                                    </p:set>
+                                  </p:childTnLst>
+                                </p:cTn>
+                              </p:par>
+                            </p:childTnLst>
+                          </p:cTn>
+                        </p:par>
+                      </p:childTnLst>
+                    </p:cTn>
+                  </p:par>
+                  <p:par>
+                    <p:cTn id="7" fill="hold">
+                      <p:stCondLst>
+                        <p:cond delay="indefinite"/>
+                      </p:stCondLst>
+                      <p:childTnLst>
+                        <p:par>
+                          <p:cTn id="8" fill="hold">
+                            <p:stCondLst>
+                              <p:cond delay="0"/>
+                            </p:stCondLst>
+                            <p:childTnLst>
+                              <p:par>
+                                <p:cTn id="9" presetID="1" presetClass="entr" presetSubtype="0" fill="hold" nodeType="clickEffect">
+                                  <p:stCondLst>
+                                    <p:cond delay="0"/>
+                                  </p:stCondLst>
+                                  <p:childTnLst>
+                                    <p:set>
+                                      <p:cBhvr>
+                                        <p:cTn id="10" dur="1" fill="hold">
+                                          <p:stCondLst>
+                                            <p:cond delay="0"/>
+                                          </p:stCondLst>
+                                        </p:cTn>
+                                        <p:tgtEl>
+                                          <p:spTgt spid="16"/>
+                                        </p:tgtEl>
+                                        <p:attrNameLst>
+                                          <p:attrName>style.visibility</p:attrName>
+                                        </p:attrNameLst>
+                                      </p:cBhvr>
+                                      <p:to>
+                                        <p:strVal val="visible"/>
+                                      </p:to>
+                                    </p:set>
+                                  </p:childTnLst>
+                                </p:cTn>
+                              </p:par>
+                              <p:par>
+                                <p:cTn id="11" presetID="1" presetClass="exit" presetSubtype="0" fill="hold" nodeType="withEffect">
+                                  <p:stCondLst>
+                                    <p:cond delay="0"/>
+                                  </p:stCondLst>
+                                  <p:childTnLst>
+                                    <p:set>
+                                      <p:cBhvr>
+                                        <p:cTn id="12" dur="1" fill="hold">
+                                          <p:stCondLst>
+                                            <p:cond delay="0"/>
+                                          </p:stCondLst>
+                                        </p:cTn>
+                                        <p:tgtEl>
+                                          <p:spTgt spid="22"/>
+                                        </p:tgtEl>
+                                        <p:attrNameLst>
+                                          <p:attrName>style.visibility</p:attrName>
+                                        </p:attrNameLst>
+                                      </p:cBhvr>
+                                      <p:to>
+                                        <p:strVal val="hidden"/>
+                                      </p:to>
+                                    </p:set>
+                                  </p:childTnLst>
+                                </p:cTn>
+                              </p:par>
+                            </p:childTnLst>
+                          </p:cTn>
+                        </p:par>
+                      </p:childTnLst>
+                    </p:cTn>
+                  </p:par>
+                  <p:par>
+                    <p:cTn id="13" fill="hold">
+                      <p:stCondLst>
+                        <p:cond delay="indefinite"/>
+                      </p:stCondLst>
+                      <p:childTnLst>
+                        <p:par>
+                          <p:cTn id="14" fill="hold">
+                            <p:stCondLst>
+                              <p:cond delay="0"/>
+                            </p:stCondLst>
+                            <p:childTnLst>
+                              <p:par>
+                                <p:cTn id="15" presetID="1" presetClass="entr" presetSubtype="0" fill="hold" nodeType="clickEffect">
+                                  <p:stCondLst>
+                                    <p:cond delay="0"/>
+                                  </p:stCondLst>
+                                  <p:childTnLst>
+                                    <p:set>
+                                      <p:cBhvr>
+                                        <p:cTn id="16" dur="1" fill="hold">
+                                          <p:stCondLst>
+                                            <p:cond delay="0"/>
+                                          </p:stCondLst>
+                                        </p:cTn>
+                                        <p:tgtEl>
+                                          <p:spTgt spid="12"/>
+                                        </p:tgtEl>
+                                        <p:attrNameLst>
+                                          <p:attrName>style.visibility</p:attrName>
+                                        </p:attrNameLst>
+                                      </p:cBhvr>
+                                      <p:to>
+                                        <p:strVal val="visible"/>
+                                      </p:to>
+                                    </p:set>
+                                  </p:childTnLst>
+                                </p:cTn>
+                              </p:par>
+                            </p:childTnLst>
+                          </p:cTn>
+                        </p:par>
+                      </p:childTnLst>
+                    </p:cTn>
+                  </p:par>
+                </p:childTnLst>
+              </p:cTn>
+              <p:prevCondLst>
+                <p:cond evt="onPrev" delay="0">
+                  <p:tgtEl>
+                    <p:sldTgt/>
+                  </p:tgtEl>
+                </p:cond>
+              </p:prevCondLst>
+              <p:nextCondLst>
+                <p:cond evt="onNext" delay="0">
+                  <p:tgtEl>
+                    <p:sldTgt/>
+                  </p:tgtEl>
+                </p:cond>
+              </p:nextCondLst>
+            </p:seq>
+          </p:childTnLst>
+        </p:cTn>
+      </p:par>
+    </p:tnLst>
+  </p:timing>
+</p:sld>
+</file>
+
+<file path=ppt/slides/slide61.xml><?xml version="1.0" encoding="utf-8"?>
 <p:sld xmlns:a="http://schemas.openxmlformats.org/drawingml/2006/main" xmlns:r="http://schemas.openxmlformats.org/officeDocument/2006/relationships" xmlns:p="http://schemas.openxmlformats.org/presentationml/2006/main">
   <p:cSld>
     <p:spTree>
@@ -29400,7 +30647,7 @@
 </p:sld>
 </file>
 
-<file path=ppt/slides/slide61.xml><?xml version="1.0" encoding="utf-8"?>
+<file path=ppt/slides/slide62.xml><?xml version="1.0" encoding="utf-8"?>
 <p:sld xmlns:a="http://schemas.openxmlformats.org/drawingml/2006/main" xmlns:r="http://schemas.openxmlformats.org/officeDocument/2006/relationships" xmlns:p="http://schemas.openxmlformats.org/presentationml/2006/main">
   <p:cSld>
     <p:spTree>
@@ -30225,17 +31472,7 @@
                 <a:latin typeface="Courier New" pitchFamily="49" charset="0"/>
                 <a:cs typeface="Courier New" pitchFamily="49" charset="0"/>
               </a:rPr>
-              <a:t> </a:t>
-            </a:r>
-            <a:r>
-              <a:rPr lang="de-DE" sz="1400" dirty="0" smtClean="0">
-                <a:solidFill>
-                  <a:schemeClr val="tx1"/>
-                </a:solidFill>
-                <a:latin typeface="Courier New" pitchFamily="49" charset="0"/>
-                <a:cs typeface="Courier New" pitchFamily="49" charset="0"/>
-              </a:rPr>
-              <a:t>( &amp;</a:t>
+              <a:t> ( &amp;</a:t>
             </a:r>
             <a:r>
               <a:rPr lang="de-DE" sz="1400" dirty="0" err="1" smtClean="0">
@@ -30410,17 +31647,7 @@
                 <a:latin typeface="Courier New" pitchFamily="49" charset="0"/>
                 <a:cs typeface="Courier New" pitchFamily="49" charset="0"/>
               </a:rPr>
-              <a:t> </a:t>
-            </a:r>
-            <a:r>
-              <a:rPr lang="de-DE" sz="1400" dirty="0" smtClean="0">
-                <a:solidFill>
-                  <a:schemeClr val="tx1"/>
-                </a:solidFill>
-                <a:latin typeface="Courier New" pitchFamily="49" charset="0"/>
-                <a:cs typeface="Courier New" pitchFamily="49" charset="0"/>
-              </a:rPr>
-              <a:t>( &amp;</a:t>
+              <a:t> ( &amp;</a:t>
             </a:r>
             <a:r>
               <a:rPr lang="de-DE" sz="1400" dirty="0" err="1" smtClean="0">
@@ -31038,7 +32265,7 @@
 </p:sld>
 </file>
 
-<file path=ppt/slides/slide62.xml><?xml version="1.0" encoding="utf-8"?>
+<file path=ppt/slides/slide63.xml><?xml version="1.0" encoding="utf-8"?>
 <p:sld xmlns:a="http://schemas.openxmlformats.org/drawingml/2006/main" xmlns:r="http://schemas.openxmlformats.org/officeDocument/2006/relationships" xmlns:p="http://schemas.openxmlformats.org/presentationml/2006/main">
   <p:cSld>
     <p:spTree>
@@ -31164,7 +32391,7 @@
 </p:sld>
 </file>
 
-<file path=ppt/slides/slide63.xml><?xml version="1.0" encoding="utf-8"?>
+<file path=ppt/slides/slide64.xml><?xml version="1.0" encoding="utf-8"?>
 <p:sld xmlns:a="http://schemas.openxmlformats.org/drawingml/2006/main" xmlns:r="http://schemas.openxmlformats.org/officeDocument/2006/relationships" xmlns:p="http://schemas.openxmlformats.org/presentationml/2006/main">
   <p:cSld>
     <p:spTree>
@@ -32254,17 +33481,27 @@
                 <a:latin typeface="Courier New" pitchFamily="49" charset="0"/>
                 <a:cs typeface="Courier New" pitchFamily="49" charset="0"/>
               </a:rPr>
-              <a:t> </a:t>
-            </a:r>
-            <a:r>
-              <a:rPr lang="de-DE" sz="1400" dirty="0" smtClean="0">
+              <a:t> ( &amp;</a:t>
+            </a:r>
+            <a:r>
+              <a:rPr lang="de-DE" sz="1400" dirty="0" err="1" smtClean="0">
                 <a:solidFill>
                   <a:schemeClr val="tx1"/>
                 </a:solidFill>
                 <a:latin typeface="Courier New" pitchFamily="49" charset="0"/>
                 <a:cs typeface="Courier New" pitchFamily="49" charset="0"/>
               </a:rPr>
-              <a:t>( &amp;</a:t>
+              <a:t>array_ELEM_right</a:t>
+            </a:r>
+            <a:r>
+              <a:rPr lang="de-DE" sz="1400" dirty="0" smtClean="0">
+                <a:solidFill>
+                  <a:schemeClr val="tx1"/>
+                </a:solidFill>
+                <a:latin typeface="Courier New" pitchFamily="49" charset="0"/>
+                <a:cs typeface="Courier New" pitchFamily="49" charset="0"/>
+              </a:rPr>
+              <a:t> (</a:t>
             </a:r>
             <a:r>
               <a:rPr lang="de-DE" sz="1400" dirty="0" err="1" smtClean="0">
@@ -32274,7 +33511,7 @@
                 <a:latin typeface="Courier New" pitchFamily="49" charset="0"/>
                 <a:cs typeface="Courier New" pitchFamily="49" charset="0"/>
               </a:rPr>
-              <a:t>array_ELEM_right</a:t>
+              <a:t>buffer_id</a:t>
             </a:r>
             <a:r>
               <a:rPr lang="de-DE" sz="1400" dirty="0" smtClean="0">
@@ -32284,7 +33521,7 @@
                 <a:latin typeface="Courier New" pitchFamily="49" charset="0"/>
                 <a:cs typeface="Courier New" pitchFamily="49" charset="0"/>
               </a:rPr>
-              <a:t> (</a:t>
+              <a:t>, </a:t>
             </a:r>
             <a:r>
               <a:rPr lang="de-DE" sz="1400" dirty="0" err="1" smtClean="0">
@@ -32294,7 +33531,7 @@
                 <a:latin typeface="Courier New" pitchFamily="49" charset="0"/>
                 <a:cs typeface="Courier New" pitchFamily="49" charset="0"/>
               </a:rPr>
-              <a:t>buffer_id</a:t>
+              <a:t>slice_id</a:t>
             </a:r>
             <a:r>
               <a:rPr lang="de-DE" sz="1400" dirty="0" smtClean="0">
@@ -32304,37 +33541,7 @@
                 <a:latin typeface="Courier New" pitchFamily="49" charset="0"/>
                 <a:cs typeface="Courier New" pitchFamily="49" charset="0"/>
               </a:rPr>
-              <a:t>, </a:t>
-            </a:r>
-            <a:r>
-              <a:rPr lang="de-DE" sz="1400" dirty="0" err="1" smtClean="0">
-                <a:solidFill>
-                  <a:schemeClr val="tx1"/>
-                </a:solidFill>
-                <a:latin typeface="Courier New" pitchFamily="49" charset="0"/>
-                <a:cs typeface="Courier New" pitchFamily="49" charset="0"/>
-              </a:rPr>
-              <a:t>slice_id</a:t>
-            </a:r>
-            <a:r>
-              <a:rPr lang="de-DE" sz="1400" dirty="0" smtClean="0">
-                <a:solidFill>
-                  <a:schemeClr val="tx1"/>
-                </a:solidFill>
-                <a:latin typeface="Courier New" pitchFamily="49" charset="0"/>
-                <a:cs typeface="Courier New" pitchFamily="49" charset="0"/>
-              </a:rPr>
-              <a:t>, 0), VLEN, 				</a:t>
-            </a:r>
-            <a:r>
-              <a:rPr lang="de-DE" sz="1400" dirty="0" smtClean="0">
-                <a:solidFill>
-                  <a:schemeClr val="tx1"/>
-                </a:solidFill>
-                <a:latin typeface="Courier New" pitchFamily="49" charset="0"/>
-                <a:cs typeface="Courier New" pitchFamily="49" charset="0"/>
-              </a:rPr>
-              <a:t>    </a:t>
+              <a:t>, 0), VLEN, 				    </a:t>
             </a:r>
             <a:r>
               <a:rPr lang="de-DE" sz="1400" b="1" dirty="0" smtClean="0">
@@ -32913,7 +34120,7 @@
 </p:sld>
 </file>
 
-<file path=ppt/slides/slide64.xml><?xml version="1.0" encoding="utf-8"?>
+<file path=ppt/slides/slide65.xml><?xml version="1.0" encoding="utf-8"?>
 <p:sld xmlns:a="http://schemas.openxmlformats.org/drawingml/2006/main" xmlns:r="http://schemas.openxmlformats.org/officeDocument/2006/relationships" xmlns:p="http://schemas.openxmlformats.org/presentationml/2006/main">
   <p:cSld>
     <p:spTree>
@@ -36647,7 +37854,7 @@
 </p:sld>
 </file>
 
-<file path=ppt/slides/slide65.xml><?xml version="1.0" encoding="utf-8"?>
+<file path=ppt/slides/slide66.xml><?xml version="1.0" encoding="utf-8"?>
 <p:sld xmlns:a="http://schemas.openxmlformats.org/drawingml/2006/main" xmlns:r="http://schemas.openxmlformats.org/officeDocument/2006/relationships" xmlns:p="http://schemas.openxmlformats.org/presentationml/2006/main">
   <p:cSld>
     <p:spTree>
@@ -38005,1038 +39212,6 @@
     <p:tnLst>
       <p:par>
         <p:cTn id="1" dur="indefinite" restart="never" nodeType="tmRoot"/>
-      </p:par>
-    </p:tnLst>
-  </p:timing>
-</p:sld>
-</file>
-
-<file path=ppt/slides/slide66.xml><?xml version="1.0" encoding="utf-8"?>
-<p:sld xmlns:a="http://schemas.openxmlformats.org/drawingml/2006/main" xmlns:r="http://schemas.openxmlformats.org/officeDocument/2006/relationships" xmlns:p="http://schemas.openxmlformats.org/presentationml/2006/main">
-  <p:cSld>
-    <p:spTree>
-      <p:nvGrpSpPr>
-        <p:cNvPr id="1" name=""/>
-        <p:cNvGrpSpPr/>
-        <p:nvPr/>
-      </p:nvGrpSpPr>
-      <p:grpSpPr>
-        <a:xfrm>
-          <a:off x="0" y="0"/>
-          <a:ext cx="0" cy="0"/>
-          <a:chOff x="0" y="0"/>
-          <a:chExt cx="0" cy="0"/>
-        </a:xfrm>
-      </p:grpSpPr>
-      <p:sp>
-        <p:nvSpPr>
-          <p:cNvPr id="94210" name="Titel 1"/>
-          <p:cNvSpPr>
-            <a:spLocks noGrp="1"/>
-          </p:cNvSpPr>
-          <p:nvPr>
-            <p:ph type="title" idx="4294967295"/>
-          </p:nvPr>
-        </p:nvSpPr>
-        <p:spPr/>
-        <p:txBody>
-          <a:bodyPr/>
-          <a:lstStyle/>
-          <a:p>
-            <a:r>
-              <a:rPr lang="de-DE" dirty="0" smtClean="0"/>
-              <a:t>The GASPI Ring Exchange </a:t>
-            </a:r>
-          </a:p>
-        </p:txBody>
-      </p:sp>
-      <p:sp>
-        <p:nvSpPr>
-          <p:cNvPr id="94288" name="Inhaltsplatzhalter 95"/>
-          <p:cNvSpPr>
-            <a:spLocks noGrp="1"/>
-          </p:cNvSpPr>
-          <p:nvPr>
-            <p:ph idx="4294967295"/>
-          </p:nvPr>
-        </p:nvSpPr>
-        <p:spPr/>
-        <p:txBody>
-          <a:bodyPr/>
-          <a:lstStyle/>
-          <a:p>
-            <a:pPr>
-              <a:buNone/>
-            </a:pPr>
-            <a:r>
-              <a:rPr lang="de-DE" dirty="0" smtClean="0"/>
-              <a:t>GASPI – </a:t>
-            </a:r>
-            <a:r>
-              <a:rPr lang="de-DE" dirty="0" err="1" smtClean="0"/>
-              <a:t>left_right_double_buffer_funneled.c</a:t>
-            </a:r>
-            <a:endParaRPr lang="de-DE" dirty="0" smtClean="0"/>
-          </a:p>
-          <a:p>
-            <a:r>
-              <a:rPr lang="de-DE" dirty="0" smtClean="0"/>
-              <a:t>Bi-</a:t>
-            </a:r>
-            <a:r>
-              <a:rPr lang="de-DE" dirty="0" err="1" smtClean="0"/>
-              <a:t>directional</a:t>
-            </a:r>
-            <a:r>
-              <a:rPr lang="de-DE" dirty="0" smtClean="0"/>
-              <a:t> </a:t>
-            </a:r>
-            <a:r>
-              <a:rPr lang="de-DE" dirty="0" err="1" smtClean="0"/>
-              <a:t>halo</a:t>
-            </a:r>
-            <a:r>
-              <a:rPr lang="de-DE" dirty="0" smtClean="0"/>
-              <a:t> </a:t>
-            </a:r>
-            <a:r>
-              <a:rPr lang="de-DE" dirty="0" err="1" smtClean="0"/>
-              <a:t>exchange</a:t>
-            </a:r>
-            <a:r>
-              <a:rPr lang="de-DE" dirty="0" smtClean="0"/>
-              <a:t> – </a:t>
-            </a:r>
-            <a:br>
-              <a:rPr lang="de-DE" dirty="0" smtClean="0"/>
-            </a:br>
-            <a:r>
-              <a:rPr lang="de-DE" dirty="0" smtClean="0">
-                <a:solidFill>
-                  <a:srgbClr val="FF0000"/>
-                </a:solidFill>
-              </a:rPr>
-              <a:t>				</a:t>
-            </a:r>
-            <a:r>
-              <a:rPr lang="de-DE" dirty="0" err="1" smtClean="0">
-                <a:solidFill>
-                  <a:srgbClr val="FF0000"/>
-                </a:solidFill>
-              </a:rPr>
-              <a:t>implicit</a:t>
-            </a:r>
-            <a:r>
-              <a:rPr lang="de-DE" dirty="0" smtClean="0">
-                <a:solidFill>
-                  <a:srgbClr val="FF0000"/>
-                </a:solidFill>
-              </a:rPr>
-              <a:t> </a:t>
-            </a:r>
-            <a:r>
-              <a:rPr lang="de-DE" dirty="0" err="1" smtClean="0">
-                <a:solidFill>
-                  <a:srgbClr val="FF0000"/>
-                </a:solidFill>
-              </a:rPr>
-              <a:t>synchronization</a:t>
-            </a:r>
-            <a:endParaRPr lang="de-DE" dirty="0" smtClean="0">
-              <a:solidFill>
-                <a:srgbClr val="FF0000"/>
-              </a:solidFill>
-            </a:endParaRPr>
-          </a:p>
-        </p:txBody>
-      </p:sp>
-      <p:sp>
-        <p:nvSpPr>
-          <p:cNvPr id="5" name="Rechteck 4"/>
-          <p:cNvSpPr/>
-          <p:nvPr/>
-        </p:nvSpPr>
-        <p:spPr>
-          <a:xfrm>
-            <a:off x="5084822" y="4233890"/>
-            <a:ext cx="389355" cy="225549"/>
-          </a:xfrm>
-          <a:prstGeom prst="rect">
-            <a:avLst/>
-          </a:prstGeom>
-        </p:spPr>
-        <p:style>
-          <a:lnRef idx="2">
-            <a:schemeClr val="dk1">
-              <a:shade val="50000"/>
-            </a:schemeClr>
-          </a:lnRef>
-          <a:fillRef idx="1">
-            <a:schemeClr val="dk1"/>
-          </a:fillRef>
-          <a:effectRef idx="0">
-            <a:schemeClr val="dk1"/>
-          </a:effectRef>
-          <a:fontRef idx="minor">
-            <a:schemeClr val="lt1"/>
-          </a:fontRef>
-        </p:style>
-        <p:txBody>
-          <a:bodyPr rtlCol="0" anchor="ctr"/>
-          <a:lstStyle/>
-          <a:p>
-            <a:pPr algn="ctr"/>
-            <a:endParaRPr lang="de-DE"/>
-          </a:p>
-        </p:txBody>
-      </p:sp>
-      <p:sp>
-        <p:nvSpPr>
-          <p:cNvPr id="6" name="Rechteck 5"/>
-          <p:cNvSpPr/>
-          <p:nvPr/>
-        </p:nvSpPr>
-        <p:spPr>
-          <a:xfrm>
-            <a:off x="5084822" y="4442443"/>
-            <a:ext cx="389355" cy="1257511"/>
-          </a:xfrm>
-          <a:prstGeom prst="rect">
-            <a:avLst/>
-          </a:prstGeom>
-        </p:spPr>
-        <p:style>
-          <a:lnRef idx="2">
-            <a:schemeClr val="accent1"/>
-          </a:lnRef>
-          <a:fillRef idx="1">
-            <a:schemeClr val="lt1"/>
-          </a:fillRef>
-          <a:effectRef idx="0">
-            <a:schemeClr val="accent1"/>
-          </a:effectRef>
-          <a:fontRef idx="minor">
-            <a:schemeClr val="dk1"/>
-          </a:fontRef>
-        </p:style>
-        <p:txBody>
-          <a:bodyPr rtlCol="0" anchor="ctr"/>
-          <a:lstStyle/>
-          <a:p>
-            <a:pPr algn="ctr"/>
-            <a:endParaRPr lang="de-DE"/>
-          </a:p>
-        </p:txBody>
-      </p:sp>
-      <p:sp>
-        <p:nvSpPr>
-          <p:cNvPr id="7" name="Rechteck 6"/>
-          <p:cNvSpPr/>
-          <p:nvPr/>
-        </p:nvSpPr>
-        <p:spPr>
-          <a:xfrm>
-            <a:off x="2281467" y="5248857"/>
-            <a:ext cx="365884" cy="1184128"/>
-          </a:xfrm>
-          <a:prstGeom prst="rect">
-            <a:avLst/>
-          </a:prstGeom>
-        </p:spPr>
-        <p:style>
-          <a:lnRef idx="2">
-            <a:schemeClr val="dk1">
-              <a:shade val="50000"/>
-            </a:schemeClr>
-          </a:lnRef>
-          <a:fillRef idx="1">
-            <a:schemeClr val="dk1"/>
-          </a:fillRef>
-          <a:effectRef idx="0">
-            <a:schemeClr val="dk1"/>
-          </a:effectRef>
-          <a:fontRef idx="minor">
-            <a:schemeClr val="lt1"/>
-          </a:fontRef>
-        </p:style>
-        <p:txBody>
-          <a:bodyPr rtlCol="0" anchor="ctr"/>
-          <a:lstStyle/>
-          <a:p>
-            <a:pPr algn="ctr"/>
-            <a:endParaRPr lang="de-DE"/>
-          </a:p>
-        </p:txBody>
-      </p:sp>
-      <p:cxnSp>
-        <p:nvCxnSpPr>
-          <p:cNvPr id="8" name="Gerade Verbindung mit Pfeil 7"/>
-          <p:cNvCxnSpPr>
-            <a:stCxn id="10" idx="0"/>
-          </p:cNvCxnSpPr>
-          <p:nvPr/>
-        </p:nvCxnSpPr>
-        <p:spPr>
-          <a:xfrm>
-            <a:off x="2464409" y="3839181"/>
-            <a:ext cx="2620414" cy="338322"/>
-          </a:xfrm>
-          <a:prstGeom prst="straightConnector1">
-            <a:avLst/>
-          </a:prstGeom>
-          <a:ln>
-            <a:solidFill>
-              <a:schemeClr val="accent6"/>
-            </a:solidFill>
-            <a:tailEnd type="arrow"/>
-          </a:ln>
-        </p:spPr>
-        <p:style>
-          <a:lnRef idx="2">
-            <a:schemeClr val="accent2"/>
-          </a:lnRef>
-          <a:fillRef idx="0">
-            <a:schemeClr val="accent2"/>
-          </a:fillRef>
-          <a:effectRef idx="1">
-            <a:schemeClr val="accent2"/>
-          </a:effectRef>
-          <a:fontRef idx="minor">
-            <a:schemeClr val="tx1"/>
-          </a:fontRef>
-        </p:style>
-      </p:cxnSp>
-      <p:cxnSp>
-        <p:nvCxnSpPr>
-          <p:cNvPr id="9" name="Gerade Verbindung mit Pfeil 8"/>
-          <p:cNvCxnSpPr>
-            <a:stCxn id="11" idx="0"/>
-          </p:cNvCxnSpPr>
-          <p:nvPr/>
-        </p:nvCxnSpPr>
-        <p:spPr>
-          <a:xfrm flipH="1">
-            <a:off x="2670822" y="4064729"/>
-            <a:ext cx="2608678" cy="546875"/>
-          </a:xfrm>
-          <a:prstGeom prst="straightConnector1">
-            <a:avLst/>
-          </a:prstGeom>
-          <a:ln>
-            <a:solidFill>
-              <a:schemeClr val="accent6"/>
-            </a:solidFill>
-            <a:tailEnd type="arrow"/>
-          </a:ln>
-        </p:spPr>
-        <p:style>
-          <a:lnRef idx="2">
-            <a:schemeClr val="accent2"/>
-          </a:lnRef>
-          <a:fillRef idx="0">
-            <a:schemeClr val="accent2"/>
-          </a:fillRef>
-          <a:effectRef idx="1">
-            <a:schemeClr val="accent2"/>
-          </a:effectRef>
-          <a:fontRef idx="minor">
-            <a:schemeClr val="tx1"/>
-          </a:fontRef>
-        </p:style>
-      </p:cxnSp>
-      <p:sp>
-        <p:nvSpPr>
-          <p:cNvPr id="10" name="Rechteck 9"/>
-          <p:cNvSpPr/>
-          <p:nvPr/>
-        </p:nvSpPr>
-        <p:spPr>
-          <a:xfrm>
-            <a:off x="2281467" y="3839181"/>
-            <a:ext cx="365884" cy="1409676"/>
-          </a:xfrm>
-          <a:prstGeom prst="rect">
-            <a:avLst/>
-          </a:prstGeom>
-        </p:spPr>
-        <p:style>
-          <a:lnRef idx="2">
-            <a:schemeClr val="accent6">
-              <a:shade val="50000"/>
-            </a:schemeClr>
-          </a:lnRef>
-          <a:fillRef idx="1">
-            <a:schemeClr val="accent6"/>
-          </a:fillRef>
-          <a:effectRef idx="0">
-            <a:schemeClr val="accent6"/>
-          </a:effectRef>
-          <a:fontRef idx="minor">
-            <a:schemeClr val="lt1"/>
-          </a:fontRef>
-        </p:style>
-        <p:txBody>
-          <a:bodyPr rtlCol="0" anchor="ctr"/>
-          <a:lstStyle/>
-          <a:p>
-            <a:pPr algn="ctr"/>
-            <a:endParaRPr lang="de-DE"/>
-          </a:p>
-        </p:txBody>
-      </p:sp>
-      <p:sp>
-        <p:nvSpPr>
-          <p:cNvPr id="11" name="Rechteck 10"/>
-          <p:cNvSpPr/>
-          <p:nvPr/>
-        </p:nvSpPr>
-        <p:spPr>
-          <a:xfrm>
-            <a:off x="5084822" y="4064729"/>
-            <a:ext cx="389355" cy="169161"/>
-          </a:xfrm>
-          <a:prstGeom prst="rect">
-            <a:avLst/>
-          </a:prstGeom>
-        </p:spPr>
-        <p:style>
-          <a:lnRef idx="2">
-            <a:schemeClr val="accent6">
-              <a:shade val="50000"/>
-            </a:schemeClr>
-          </a:lnRef>
-          <a:fillRef idx="1">
-            <a:schemeClr val="accent6"/>
-          </a:fillRef>
-          <a:effectRef idx="0">
-            <a:schemeClr val="accent6"/>
-          </a:effectRef>
-          <a:fontRef idx="minor">
-            <a:schemeClr val="lt1"/>
-          </a:fontRef>
-        </p:style>
-        <p:txBody>
-          <a:bodyPr rtlCol="0" anchor="ctr"/>
-          <a:lstStyle/>
-          <a:p>
-            <a:pPr algn="ctr"/>
-            <a:endParaRPr lang="de-DE"/>
-          </a:p>
-        </p:txBody>
-      </p:sp>
-      <p:cxnSp>
-        <p:nvCxnSpPr>
-          <p:cNvPr id="12" name="Gerade Verbindung mit Pfeil 11"/>
-          <p:cNvCxnSpPr/>
-          <p:nvPr/>
-        </p:nvCxnSpPr>
-        <p:spPr>
-          <a:xfrm flipH="1">
-            <a:off x="2670822" y="5699953"/>
-            <a:ext cx="2608678" cy="580866"/>
-          </a:xfrm>
-          <a:prstGeom prst="straightConnector1">
-            <a:avLst/>
-          </a:prstGeom>
-          <a:ln>
-            <a:solidFill>
-              <a:schemeClr val="accent6"/>
-            </a:solidFill>
-            <a:tailEnd type="arrow"/>
-          </a:ln>
-        </p:spPr>
-        <p:style>
-          <a:lnRef idx="2">
-            <a:schemeClr val="accent2"/>
-          </a:lnRef>
-          <a:fillRef idx="0">
-            <a:schemeClr val="accent2"/>
-          </a:fillRef>
-          <a:effectRef idx="1">
-            <a:schemeClr val="accent2"/>
-          </a:effectRef>
-          <a:fontRef idx="minor">
-            <a:schemeClr val="tx1"/>
-          </a:fontRef>
-        </p:style>
-      </p:cxnSp>
-      <p:cxnSp>
-        <p:nvCxnSpPr>
-          <p:cNvPr id="13" name="Gerade Verbindung mit Pfeil 12"/>
-          <p:cNvCxnSpPr>
-            <a:stCxn id="11" idx="2"/>
-          </p:cNvCxnSpPr>
-          <p:nvPr/>
-        </p:nvCxnSpPr>
-        <p:spPr>
-          <a:xfrm flipH="1">
-            <a:off x="2670822" y="4233890"/>
-            <a:ext cx="2608678" cy="563870"/>
-          </a:xfrm>
-          <a:prstGeom prst="straightConnector1">
-            <a:avLst/>
-          </a:prstGeom>
-          <a:ln>
-            <a:solidFill>
-              <a:schemeClr val="tx1"/>
-            </a:solidFill>
-            <a:tailEnd type="arrow"/>
-          </a:ln>
-        </p:spPr>
-        <p:style>
-          <a:lnRef idx="2">
-            <a:schemeClr val="accent1"/>
-          </a:lnRef>
-          <a:fillRef idx="0">
-            <a:schemeClr val="accent1"/>
-          </a:fillRef>
-          <a:effectRef idx="1">
-            <a:schemeClr val="accent1"/>
-          </a:effectRef>
-          <a:fontRef idx="minor">
-            <a:schemeClr val="tx1"/>
-          </a:fontRef>
-        </p:style>
-      </p:cxnSp>
-      <p:sp>
-        <p:nvSpPr>
-          <p:cNvPr id="14" name="Textfeld 13"/>
-          <p:cNvSpPr txBox="1"/>
-          <p:nvPr/>
-        </p:nvSpPr>
-        <p:spPr>
-          <a:xfrm>
-            <a:off x="646176" y="3839181"/>
-            <a:ext cx="1557420" cy="369332"/>
-          </a:xfrm>
-          <a:prstGeom prst="rect">
-            <a:avLst/>
-          </a:prstGeom>
-          <a:noFill/>
-        </p:spPr>
-        <p:txBody>
-          <a:bodyPr wrap="square" rtlCol="0">
-            <a:spAutoFit/>
-          </a:bodyPr>
-          <a:lstStyle/>
-          <a:p>
-            <a:r>
-              <a:rPr lang="de-DE" b="1" dirty="0" err="1" smtClean="0">
-                <a:solidFill>
-                  <a:srgbClr val="3B57A0"/>
-                </a:solidFill>
-              </a:rPr>
-              <a:t>buffer_id</a:t>
-            </a:r>
-            <a:r>
-              <a:rPr lang="de-DE" b="1" dirty="0" smtClean="0">
-                <a:solidFill>
-                  <a:srgbClr val="3B57A0"/>
-                </a:solidFill>
-              </a:rPr>
-              <a:t> = 0</a:t>
-            </a:r>
-            <a:endParaRPr lang="de-DE" b="1" dirty="0">
-              <a:solidFill>
-                <a:srgbClr val="3B57A0"/>
-              </a:solidFill>
-            </a:endParaRPr>
-          </a:p>
-        </p:txBody>
-      </p:sp>
-      <p:sp>
-        <p:nvSpPr>
-          <p:cNvPr id="15" name="Textfeld 14"/>
-          <p:cNvSpPr txBox="1"/>
-          <p:nvPr/>
-        </p:nvSpPr>
-        <p:spPr>
-          <a:xfrm>
-            <a:off x="646176" y="5361631"/>
-            <a:ext cx="1557420" cy="369332"/>
-          </a:xfrm>
-          <a:prstGeom prst="rect">
-            <a:avLst/>
-          </a:prstGeom>
-          <a:noFill/>
-        </p:spPr>
-        <p:txBody>
-          <a:bodyPr wrap="square" rtlCol="0">
-            <a:spAutoFit/>
-          </a:bodyPr>
-          <a:lstStyle/>
-          <a:p>
-            <a:r>
-              <a:rPr lang="de-DE" b="1" dirty="0" err="1" smtClean="0">
-                <a:solidFill>
-                  <a:srgbClr val="3B57A0"/>
-                </a:solidFill>
-              </a:rPr>
-              <a:t>buffer_id</a:t>
-            </a:r>
-            <a:r>
-              <a:rPr lang="de-DE" b="1" dirty="0" smtClean="0">
-                <a:solidFill>
-                  <a:srgbClr val="3B57A0"/>
-                </a:solidFill>
-              </a:rPr>
-              <a:t> = 1</a:t>
-            </a:r>
-            <a:endParaRPr lang="de-DE" b="1" dirty="0">
-              <a:solidFill>
-                <a:srgbClr val="3B57A0"/>
-              </a:solidFill>
-            </a:endParaRPr>
-          </a:p>
-        </p:txBody>
-      </p:sp>
-      <p:cxnSp>
-        <p:nvCxnSpPr>
-          <p:cNvPr id="16" name="Gerade Verbindung mit Pfeil 15"/>
-          <p:cNvCxnSpPr>
-            <a:stCxn id="10" idx="2"/>
-          </p:cNvCxnSpPr>
-          <p:nvPr/>
-        </p:nvCxnSpPr>
-        <p:spPr>
-          <a:xfrm>
-            <a:off x="2464409" y="5248857"/>
-            <a:ext cx="2620414" cy="394709"/>
-          </a:xfrm>
-          <a:prstGeom prst="straightConnector1">
-            <a:avLst/>
-          </a:prstGeom>
-          <a:ln>
-            <a:solidFill>
-              <a:schemeClr val="tx1"/>
-            </a:solidFill>
-            <a:tailEnd type="arrow"/>
-          </a:ln>
-        </p:spPr>
-        <p:style>
-          <a:lnRef idx="2">
-            <a:schemeClr val="accent1"/>
-          </a:lnRef>
-          <a:fillRef idx="0">
-            <a:schemeClr val="accent1"/>
-          </a:fillRef>
-          <a:effectRef idx="1">
-            <a:schemeClr val="accent1"/>
-          </a:effectRef>
-          <a:fontRef idx="minor">
-            <a:schemeClr val="tx1"/>
-          </a:fontRef>
-        </p:style>
-      </p:cxnSp>
-      <p:sp>
-        <p:nvSpPr>
-          <p:cNvPr id="17" name="Rechteck 16"/>
-          <p:cNvSpPr/>
-          <p:nvPr/>
-        </p:nvSpPr>
-        <p:spPr>
-          <a:xfrm>
-            <a:off x="5084822" y="5699953"/>
-            <a:ext cx="389355" cy="169161"/>
-          </a:xfrm>
-          <a:prstGeom prst="rect">
-            <a:avLst/>
-          </a:prstGeom>
-        </p:spPr>
-        <p:style>
-          <a:lnRef idx="2">
-            <a:schemeClr val="accent6">
-              <a:shade val="50000"/>
-            </a:schemeClr>
-          </a:lnRef>
-          <a:fillRef idx="1">
-            <a:schemeClr val="accent6"/>
-          </a:fillRef>
-          <a:effectRef idx="0">
-            <a:schemeClr val="accent6"/>
-          </a:effectRef>
-          <a:fontRef idx="minor">
-            <a:schemeClr val="lt1"/>
-          </a:fontRef>
-        </p:style>
-        <p:txBody>
-          <a:bodyPr rtlCol="0" anchor="ctr"/>
-          <a:lstStyle/>
-          <a:p>
-            <a:pPr algn="ctr"/>
-            <a:endParaRPr lang="de-DE"/>
-          </a:p>
-        </p:txBody>
-      </p:sp>
-      <p:sp>
-        <p:nvSpPr>
-          <p:cNvPr id="18" name="Textfeld 17"/>
-          <p:cNvSpPr txBox="1"/>
-          <p:nvPr/>
-        </p:nvSpPr>
-        <p:spPr>
-          <a:xfrm>
-            <a:off x="5629919" y="3951955"/>
-            <a:ext cx="1557420" cy="369332"/>
-          </a:xfrm>
-          <a:prstGeom prst="rect">
-            <a:avLst/>
-          </a:prstGeom>
-          <a:noFill/>
-        </p:spPr>
-        <p:txBody>
-          <a:bodyPr wrap="square" rtlCol="0">
-            <a:spAutoFit/>
-          </a:bodyPr>
-          <a:lstStyle/>
-          <a:p>
-            <a:r>
-              <a:rPr lang="de-DE" b="1" dirty="0" err="1" smtClean="0">
-                <a:solidFill>
-                  <a:srgbClr val="3B57A0"/>
-                </a:solidFill>
-              </a:rPr>
-              <a:t>buffer_id</a:t>
-            </a:r>
-            <a:r>
-              <a:rPr lang="de-DE" b="1" dirty="0" smtClean="0">
-                <a:solidFill>
-                  <a:srgbClr val="3B57A0"/>
-                </a:solidFill>
-              </a:rPr>
-              <a:t> = 0</a:t>
-            </a:r>
-            <a:endParaRPr lang="de-DE" b="1" dirty="0">
-              <a:solidFill>
-                <a:srgbClr val="3B57A0"/>
-              </a:solidFill>
-            </a:endParaRPr>
-          </a:p>
-        </p:txBody>
-      </p:sp>
-      <p:sp>
-        <p:nvSpPr>
-          <p:cNvPr id="19" name="Textfeld 18"/>
-          <p:cNvSpPr txBox="1"/>
-          <p:nvPr/>
-        </p:nvSpPr>
-        <p:spPr>
-          <a:xfrm>
-            <a:off x="5629919" y="4177503"/>
-            <a:ext cx="1557420" cy="369332"/>
-          </a:xfrm>
-          <a:prstGeom prst="rect">
-            <a:avLst/>
-          </a:prstGeom>
-          <a:noFill/>
-        </p:spPr>
-        <p:txBody>
-          <a:bodyPr wrap="square" rtlCol="0">
-            <a:spAutoFit/>
-          </a:bodyPr>
-          <a:lstStyle/>
-          <a:p>
-            <a:r>
-              <a:rPr lang="de-DE" b="1" dirty="0" err="1" smtClean="0">
-                <a:solidFill>
-                  <a:srgbClr val="3B57A0"/>
-                </a:solidFill>
-              </a:rPr>
-              <a:t>buffer_id</a:t>
-            </a:r>
-            <a:r>
-              <a:rPr lang="de-DE" b="1" dirty="0" smtClean="0">
-                <a:solidFill>
-                  <a:srgbClr val="3B57A0"/>
-                </a:solidFill>
-              </a:rPr>
-              <a:t> = 1</a:t>
-            </a:r>
-            <a:endParaRPr lang="de-DE" b="1" dirty="0">
-              <a:solidFill>
-                <a:srgbClr val="3B57A0"/>
-              </a:solidFill>
-            </a:endParaRPr>
-          </a:p>
-        </p:txBody>
-      </p:sp>
-      <p:sp>
-        <p:nvSpPr>
-          <p:cNvPr id="20" name="Textfeld 19"/>
-          <p:cNvSpPr txBox="1"/>
-          <p:nvPr/>
-        </p:nvSpPr>
-        <p:spPr>
-          <a:xfrm>
-            <a:off x="5629919" y="5643566"/>
-            <a:ext cx="1557420" cy="369332"/>
-          </a:xfrm>
-          <a:prstGeom prst="rect">
-            <a:avLst/>
-          </a:prstGeom>
-          <a:noFill/>
-        </p:spPr>
-        <p:txBody>
-          <a:bodyPr wrap="square" rtlCol="0">
-            <a:spAutoFit/>
-          </a:bodyPr>
-          <a:lstStyle/>
-          <a:p>
-            <a:r>
-              <a:rPr lang="de-DE" b="1" dirty="0" err="1" smtClean="0">
-                <a:solidFill>
-                  <a:srgbClr val="3B57A0"/>
-                </a:solidFill>
-              </a:rPr>
-              <a:t>buffer_id</a:t>
-            </a:r>
-            <a:r>
-              <a:rPr lang="de-DE" b="1" dirty="0" smtClean="0">
-                <a:solidFill>
-                  <a:srgbClr val="3B57A0"/>
-                </a:solidFill>
-              </a:rPr>
-              <a:t> = 0</a:t>
-            </a:r>
-            <a:endParaRPr lang="de-DE" b="1" dirty="0">
-              <a:solidFill>
-                <a:srgbClr val="3B57A0"/>
-              </a:solidFill>
-            </a:endParaRPr>
-          </a:p>
-        </p:txBody>
-      </p:sp>
-      <p:cxnSp>
-        <p:nvCxnSpPr>
-          <p:cNvPr id="22" name="Gerade Verbindung mit Pfeil 21"/>
-          <p:cNvCxnSpPr/>
-          <p:nvPr/>
-        </p:nvCxnSpPr>
-        <p:spPr>
-          <a:xfrm flipH="1">
-            <a:off x="2670822" y="4459439"/>
-            <a:ext cx="2608678" cy="546875"/>
-          </a:xfrm>
-          <a:prstGeom prst="straightConnector1">
-            <a:avLst/>
-          </a:prstGeom>
-          <a:ln>
-            <a:solidFill>
-              <a:schemeClr val="accent6"/>
-            </a:solidFill>
-            <a:prstDash val="dash"/>
-            <a:tailEnd type="arrow"/>
-          </a:ln>
-        </p:spPr>
-        <p:style>
-          <a:lnRef idx="2">
-            <a:schemeClr val="accent2"/>
-          </a:lnRef>
-          <a:fillRef idx="0">
-            <a:schemeClr val="accent2"/>
-          </a:fillRef>
-          <a:effectRef idx="1">
-            <a:schemeClr val="accent2"/>
-          </a:effectRef>
-          <a:fontRef idx="minor">
-            <a:schemeClr val="tx1"/>
-          </a:fontRef>
-        </p:style>
-      </p:cxnSp>
-    </p:spTree>
-  </p:cSld>
-  <p:clrMapOvr>
-    <a:masterClrMapping/>
-  </p:clrMapOvr>
-  <p:timing>
-    <p:tnLst>
-      <p:par>
-        <p:cTn id="1" dur="indefinite" restart="never" nodeType="tmRoot">
-          <p:childTnLst>
-            <p:seq concurrent="1" nextAc="seek">
-              <p:cTn id="2" dur="indefinite" nodeType="mainSeq">
-                <p:childTnLst>
-                  <p:par>
-                    <p:cTn id="3" fill="hold">
-                      <p:stCondLst>
-                        <p:cond delay="indefinite"/>
-                      </p:stCondLst>
-                      <p:childTnLst>
-                        <p:par>
-                          <p:cTn id="4" fill="hold">
-                            <p:stCondLst>
-                              <p:cond delay="0"/>
-                            </p:stCondLst>
-                            <p:childTnLst>
-                              <p:par>
-                                <p:cTn id="5" presetID="1" presetClass="entr" presetSubtype="0" fill="hold" nodeType="clickEffect">
-                                  <p:stCondLst>
-                                    <p:cond delay="0"/>
-                                  </p:stCondLst>
-                                  <p:childTnLst>
-                                    <p:set>
-                                      <p:cBhvr>
-                                        <p:cTn id="6" dur="1" fill="hold">
-                                          <p:stCondLst>
-                                            <p:cond delay="0"/>
-                                          </p:stCondLst>
-                                        </p:cTn>
-                                        <p:tgtEl>
-                                          <p:spTgt spid="22"/>
-                                        </p:tgtEl>
-                                        <p:attrNameLst>
-                                          <p:attrName>style.visibility</p:attrName>
-                                        </p:attrNameLst>
-                                      </p:cBhvr>
-                                      <p:to>
-                                        <p:strVal val="visible"/>
-                                      </p:to>
-                                    </p:set>
-                                  </p:childTnLst>
-                                </p:cTn>
-                              </p:par>
-                            </p:childTnLst>
-                          </p:cTn>
-                        </p:par>
-                      </p:childTnLst>
-                    </p:cTn>
-                  </p:par>
-                  <p:par>
-                    <p:cTn id="7" fill="hold">
-                      <p:stCondLst>
-                        <p:cond delay="indefinite"/>
-                      </p:stCondLst>
-                      <p:childTnLst>
-                        <p:par>
-                          <p:cTn id="8" fill="hold">
-                            <p:stCondLst>
-                              <p:cond delay="0"/>
-                            </p:stCondLst>
-                            <p:childTnLst>
-                              <p:par>
-                                <p:cTn id="9" presetID="1" presetClass="entr" presetSubtype="0" fill="hold" nodeType="clickEffect">
-                                  <p:stCondLst>
-                                    <p:cond delay="0"/>
-                                  </p:stCondLst>
-                                  <p:childTnLst>
-                                    <p:set>
-                                      <p:cBhvr>
-                                        <p:cTn id="10" dur="1" fill="hold">
-                                          <p:stCondLst>
-                                            <p:cond delay="0"/>
-                                          </p:stCondLst>
-                                        </p:cTn>
-                                        <p:tgtEl>
-                                          <p:spTgt spid="16"/>
-                                        </p:tgtEl>
-                                        <p:attrNameLst>
-                                          <p:attrName>style.visibility</p:attrName>
-                                        </p:attrNameLst>
-                                      </p:cBhvr>
-                                      <p:to>
-                                        <p:strVal val="visible"/>
-                                      </p:to>
-                                    </p:set>
-                                  </p:childTnLst>
-                                </p:cTn>
-                              </p:par>
-                              <p:par>
-                                <p:cTn id="11" presetID="1" presetClass="exit" presetSubtype="0" fill="hold" nodeType="withEffect">
-                                  <p:stCondLst>
-                                    <p:cond delay="0"/>
-                                  </p:stCondLst>
-                                  <p:childTnLst>
-                                    <p:set>
-                                      <p:cBhvr>
-                                        <p:cTn id="12" dur="1" fill="hold">
-                                          <p:stCondLst>
-                                            <p:cond delay="0"/>
-                                          </p:stCondLst>
-                                        </p:cTn>
-                                        <p:tgtEl>
-                                          <p:spTgt spid="22"/>
-                                        </p:tgtEl>
-                                        <p:attrNameLst>
-                                          <p:attrName>style.visibility</p:attrName>
-                                        </p:attrNameLst>
-                                      </p:cBhvr>
-                                      <p:to>
-                                        <p:strVal val="hidden"/>
-                                      </p:to>
-                                    </p:set>
-                                  </p:childTnLst>
-                                </p:cTn>
-                              </p:par>
-                            </p:childTnLst>
-                          </p:cTn>
-                        </p:par>
-                      </p:childTnLst>
-                    </p:cTn>
-                  </p:par>
-                  <p:par>
-                    <p:cTn id="13" fill="hold">
-                      <p:stCondLst>
-                        <p:cond delay="indefinite"/>
-                      </p:stCondLst>
-                      <p:childTnLst>
-                        <p:par>
-                          <p:cTn id="14" fill="hold">
-                            <p:stCondLst>
-                              <p:cond delay="0"/>
-                            </p:stCondLst>
-                            <p:childTnLst>
-                              <p:par>
-                                <p:cTn id="15" presetID="1" presetClass="entr" presetSubtype="0" fill="hold" nodeType="clickEffect">
-                                  <p:stCondLst>
-                                    <p:cond delay="0"/>
-                                  </p:stCondLst>
-                                  <p:childTnLst>
-                                    <p:set>
-                                      <p:cBhvr>
-                                        <p:cTn id="16" dur="1" fill="hold">
-                                          <p:stCondLst>
-                                            <p:cond delay="0"/>
-                                          </p:stCondLst>
-                                        </p:cTn>
-                                        <p:tgtEl>
-                                          <p:spTgt spid="12"/>
-                                        </p:tgtEl>
-                                        <p:attrNameLst>
-                                          <p:attrName>style.visibility</p:attrName>
-                                        </p:attrNameLst>
-                                      </p:cBhvr>
-                                      <p:to>
-                                        <p:strVal val="visible"/>
-                                      </p:to>
-                                    </p:set>
-                                  </p:childTnLst>
-                                </p:cTn>
-                              </p:par>
-                            </p:childTnLst>
-                          </p:cTn>
-                        </p:par>
-                      </p:childTnLst>
-                    </p:cTn>
-                  </p:par>
-                </p:childTnLst>
-              </p:cTn>
-              <p:prevCondLst>
-                <p:cond evt="onPrev" delay="0">
-                  <p:tgtEl>
-                    <p:sldTgt/>
-                  </p:tgtEl>
-                </p:cond>
-              </p:prevCondLst>
-              <p:nextCondLst>
-                <p:cond evt="onNext" delay="0">
-                  <p:tgtEl>
-                    <p:sldTgt/>
-                  </p:tgtEl>
-                </p:cond>
-              </p:nextCondLst>
-            </p:seq>
-          </p:childTnLst>
-        </p:cTn>
       </p:par>
     </p:tnLst>
   </p:timing>
@@ -48759,33 +48934,164 @@
               <a:buFont typeface="Arial" charset="0"/>
               <a:buNone/>
             </a:pPr>
-            <a:endParaRPr lang="de-DE" smtClean="0"/>
-          </a:p>
-          <a:p>
-            <a:r>
-              <a:rPr lang="de-DE" smtClean="0"/>
-              <a:t>Higher latency than one-sided comm.</a:t>
+            <a:endParaRPr lang="de-DE" dirty="0" smtClean="0"/>
+          </a:p>
+          <a:p>
+            <a:r>
+              <a:rPr lang="de-DE" dirty="0" smtClean="0"/>
+              <a:t>Higher </a:t>
+            </a:r>
+            <a:r>
+              <a:rPr lang="de-DE" dirty="0" err="1" smtClean="0"/>
+              <a:t>latency</a:t>
+            </a:r>
+            <a:r>
+              <a:rPr lang="de-DE" dirty="0" smtClean="0"/>
+              <a:t> </a:t>
+            </a:r>
+            <a:r>
+              <a:rPr lang="de-DE" dirty="0" err="1" smtClean="0"/>
+              <a:t>than</a:t>
+            </a:r>
+            <a:r>
+              <a:rPr lang="de-DE" dirty="0" smtClean="0"/>
+              <a:t> </a:t>
+            </a:r>
+            <a:r>
+              <a:rPr lang="de-DE" dirty="0" err="1" smtClean="0"/>
+              <a:t>one-sided</a:t>
+            </a:r>
+            <a:r>
+              <a:rPr lang="de-DE" dirty="0" smtClean="0"/>
+              <a:t> </a:t>
+            </a:r>
+            <a:r>
+              <a:rPr lang="de-DE" dirty="0" err="1" smtClean="0"/>
+              <a:t>comm</a:t>
+            </a:r>
+            <a:r>
+              <a:rPr lang="de-DE" dirty="0" smtClean="0"/>
+              <a:t>.</a:t>
             </a:r>
           </a:p>
           <a:p>
             <a:pPr lvl="1"/>
             <a:r>
-              <a:rPr lang="de-DE" smtClean="0"/>
-              <a:t>Use cases:</a:t>
+              <a:rPr lang="de-DE" dirty="0" err="1" smtClean="0"/>
+              <a:t>Use</a:t>
+            </a:r>
+            <a:r>
+              <a:rPr lang="de-DE" dirty="0" smtClean="0"/>
+              <a:t> </a:t>
+            </a:r>
+            <a:r>
+              <a:rPr lang="de-DE" dirty="0" err="1" smtClean="0"/>
+              <a:t>cases</a:t>
+            </a:r>
+            <a:r>
+              <a:rPr lang="de-DE" dirty="0" smtClean="0"/>
+              <a:t>:</a:t>
             </a:r>
           </a:p>
           <a:p>
             <a:pPr lvl="2"/>
             <a:r>
-              <a:rPr lang="de-DE" smtClean="0"/>
-              <a:t>Parameter exchange</a:t>
-            </a:r>
+              <a:rPr lang="de-DE" dirty="0" smtClean="0"/>
+              <a:t>Parameter </a:t>
+            </a:r>
+            <a:r>
+              <a:rPr lang="de-DE" dirty="0" err="1" smtClean="0"/>
+              <a:t>exchange</a:t>
+            </a:r>
+            <a:endParaRPr lang="de-DE" dirty="0" smtClean="0"/>
           </a:p>
           <a:p>
             <a:pPr lvl="2"/>
             <a:r>
-              <a:rPr lang="de-DE" smtClean="0"/>
-              <a:t>management tasks </a:t>
+              <a:rPr lang="de-DE" dirty="0" err="1" smtClean="0"/>
+              <a:t>management</a:t>
+            </a:r>
+            <a:r>
+              <a:rPr lang="de-DE" dirty="0" smtClean="0"/>
+              <a:t> </a:t>
+            </a:r>
+            <a:r>
+              <a:rPr lang="de-DE" dirty="0" err="1" smtClean="0"/>
+              <a:t>tasks</a:t>
+            </a:r>
+            <a:r>
+              <a:rPr lang="de-DE" dirty="0" smtClean="0"/>
+              <a:t> </a:t>
+            </a:r>
+          </a:p>
+          <a:p>
+            <a:pPr lvl="2"/>
+            <a:r>
+              <a:rPr lang="de-DE" dirty="0" smtClean="0"/>
+              <a:t>„Passive“ </a:t>
+            </a:r>
+            <a:r>
+              <a:rPr lang="de-DE" dirty="0" err="1" smtClean="0"/>
+              <a:t>Active</a:t>
+            </a:r>
+            <a:r>
+              <a:rPr lang="de-DE" dirty="0" smtClean="0"/>
+              <a:t> Messages (</a:t>
+            </a:r>
+            <a:r>
+              <a:rPr lang="de-DE" dirty="0" err="1" smtClean="0"/>
+              <a:t>see</a:t>
+            </a:r>
+            <a:r>
+              <a:rPr lang="de-DE" dirty="0" smtClean="0"/>
+              <a:t> </a:t>
+            </a:r>
+            <a:r>
+              <a:rPr lang="de-DE" dirty="0" err="1" smtClean="0"/>
+              <a:t>advanced</a:t>
+            </a:r>
+            <a:r>
+              <a:rPr lang="de-DE" dirty="0" smtClean="0"/>
+              <a:t> </a:t>
+            </a:r>
+            <a:r>
+              <a:rPr lang="de-DE" dirty="0" err="1" smtClean="0"/>
+              <a:t>tutorial</a:t>
+            </a:r>
+            <a:r>
+              <a:rPr lang="de-DE" dirty="0" smtClean="0"/>
+              <a:t> </a:t>
+            </a:r>
+            <a:r>
+              <a:rPr lang="de-DE" dirty="0" err="1" smtClean="0"/>
+              <a:t>code</a:t>
+            </a:r>
+            <a:r>
+              <a:rPr lang="de-DE" dirty="0" smtClean="0"/>
+              <a:t>)</a:t>
+            </a:r>
+          </a:p>
+          <a:p>
+            <a:pPr lvl="3"/>
+            <a:r>
+              <a:rPr lang="de-DE" sz="2400" dirty="0" smtClean="0"/>
+              <a:t>GASPI Swiss </a:t>
+            </a:r>
+            <a:r>
+              <a:rPr lang="de-DE" sz="2400" dirty="0" err="1" smtClean="0"/>
+              <a:t>Army</a:t>
+            </a:r>
+            <a:r>
+              <a:rPr lang="de-DE" sz="2400" dirty="0" smtClean="0"/>
+              <a:t> </a:t>
+            </a:r>
+            <a:r>
+              <a:rPr lang="de-DE" sz="2400" dirty="0" err="1" smtClean="0"/>
+              <a:t>Knife</a:t>
+            </a:r>
+            <a:r>
+              <a:rPr lang="de-DE" sz="2400" dirty="0" smtClean="0"/>
+              <a:t>.</a:t>
             </a:r>
           </a:p>
           <a:p>
@@ -48793,7 +49099,7 @@
               <a:buFont typeface="Arial" charset="0"/>
               <a:buNone/>
             </a:pPr>
-            <a:endParaRPr lang="de-DE" smtClean="0"/>
+            <a:endParaRPr lang="de-DE" dirty="0" smtClean="0"/>
           </a:p>
         </p:txBody>
       </p:sp>
@@ -48806,6 +49112,725 @@
 </file>
 
 <file path=ppt/slides/slide82.xml><?xml version="1.0" encoding="utf-8"?>
+<p:sld xmlns:a="http://schemas.openxmlformats.org/drawingml/2006/main" xmlns:r="http://schemas.openxmlformats.org/officeDocument/2006/relationships" xmlns:p="http://schemas.openxmlformats.org/presentationml/2006/main">
+  <p:cSld>
+    <p:spTree>
+      <p:nvGrpSpPr>
+        <p:cNvPr id="1" name=""/>
+        <p:cNvGrpSpPr/>
+        <p:nvPr/>
+      </p:nvGrpSpPr>
+      <p:grpSpPr>
+        <a:xfrm>
+          <a:off x="0" y="0"/>
+          <a:ext cx="0" cy="0"/>
+          <a:chOff x="0" y="0"/>
+          <a:chExt cx="0" cy="0"/>
+        </a:xfrm>
+      </p:grpSpPr>
+      <p:sp>
+        <p:nvSpPr>
+          <p:cNvPr id="112642" name="Rectangle 2"/>
+          <p:cNvSpPr>
+            <a:spLocks noGrp="1"/>
+          </p:cNvSpPr>
+          <p:nvPr>
+            <p:ph type="title" idx="4294967295"/>
+          </p:nvPr>
+        </p:nvSpPr>
+        <p:spPr/>
+        <p:txBody>
+          <a:bodyPr/>
+          <a:lstStyle/>
+          <a:p>
+            <a:r>
+              <a:rPr lang="de-DE" sz="4000" smtClean="0"/>
+              <a:t>Passive Communication Functions (III)</a:t>
+            </a:r>
+          </a:p>
+        </p:txBody>
+      </p:sp>
+      <p:sp>
+        <p:nvSpPr>
+          <p:cNvPr id="4" name="Inhaltsplatzhalter 2"/>
+          <p:cNvSpPr txBox="1">
+            <a:spLocks/>
+          </p:cNvSpPr>
+          <p:nvPr/>
+        </p:nvSpPr>
+        <p:spPr bwMode="auto">
+          <a:xfrm>
+            <a:off x="457200" y="2409522"/>
+            <a:ext cx="8566150" cy="4389486"/>
+          </a:xfrm>
+          <a:prstGeom prst="rect">
+            <a:avLst/>
+          </a:prstGeom>
+          <a:ln w="25400" cap="flat" cmpd="sng" algn="ctr">
+            <a:solidFill>
+              <a:schemeClr val="dk1"/>
+            </a:solidFill>
+            <a:prstDash val="solid"/>
+            <a:miter lim="800000"/>
+            <a:headEnd/>
+            <a:tailEnd/>
+          </a:ln>
+        </p:spPr>
+        <p:style>
+          <a:lnRef idx="2">
+            <a:schemeClr val="dk1"/>
+          </a:lnRef>
+          <a:fillRef idx="1">
+            <a:schemeClr val="lt1"/>
+          </a:fillRef>
+          <a:effectRef idx="0">
+            <a:schemeClr val="dk1"/>
+          </a:effectRef>
+          <a:fontRef idx="minor">
+            <a:schemeClr val="dk1"/>
+          </a:fontRef>
+        </p:style>
+        <p:txBody>
+          <a:bodyPr/>
+          <a:lstStyle/>
+          <a:p>
+            <a:r>
+              <a:rPr lang="de-DE" sz="1400" dirty="0" err="1" smtClean="0">
+                <a:latin typeface="Courier New" pitchFamily="49" charset="0"/>
+                <a:cs typeface="Courier New" pitchFamily="49" charset="0"/>
+              </a:rPr>
+              <a:t>void</a:t>
+            </a:r>
+            <a:r>
+              <a:rPr lang="de-DE" sz="1400" dirty="0" smtClean="0">
+                <a:latin typeface="Courier New" pitchFamily="49" charset="0"/>
+                <a:cs typeface="Courier New" pitchFamily="49" charset="0"/>
+              </a:rPr>
+              <a:t> *</a:t>
+            </a:r>
+            <a:r>
+              <a:rPr lang="de-DE" sz="1400" dirty="0" err="1" smtClean="0">
+                <a:latin typeface="Courier New" pitchFamily="49" charset="0"/>
+                <a:cs typeface="Courier New" pitchFamily="49" charset="0"/>
+              </a:rPr>
+              <a:t>handle_passive</a:t>
+            </a:r>
+            <a:r>
+              <a:rPr lang="de-DE" sz="1400" dirty="0" smtClean="0">
+                <a:latin typeface="Courier New" pitchFamily="49" charset="0"/>
+                <a:cs typeface="Courier New" pitchFamily="49" charset="0"/>
+              </a:rPr>
+              <a:t>(</a:t>
+            </a:r>
+            <a:r>
+              <a:rPr lang="de-DE" sz="1400" dirty="0" err="1" smtClean="0">
+                <a:latin typeface="Courier New" pitchFamily="49" charset="0"/>
+                <a:cs typeface="Courier New" pitchFamily="49" charset="0"/>
+              </a:rPr>
+              <a:t>void</a:t>
+            </a:r>
+            <a:r>
+              <a:rPr lang="de-DE" sz="1400" dirty="0" smtClean="0">
+                <a:latin typeface="Courier New" pitchFamily="49" charset="0"/>
+                <a:cs typeface="Courier New" pitchFamily="49" charset="0"/>
+              </a:rPr>
+              <a:t> *arg)</a:t>
+            </a:r>
+          </a:p>
+          <a:p>
+            <a:r>
+              <a:rPr lang="de-DE" sz="1400" dirty="0" smtClean="0">
+                <a:latin typeface="Courier New" pitchFamily="49" charset="0"/>
+                <a:cs typeface="Courier New" pitchFamily="49" charset="0"/>
+              </a:rPr>
+              <a:t>{</a:t>
+            </a:r>
+            <a:br>
+              <a:rPr lang="de-DE" sz="1400" dirty="0" smtClean="0">
+                <a:latin typeface="Courier New" pitchFamily="49" charset="0"/>
+                <a:cs typeface="Courier New" pitchFamily="49" charset="0"/>
+              </a:rPr>
+            </a:br>
+            <a:r>
+              <a:rPr lang="de-DE" sz="1400" dirty="0" smtClean="0">
+                <a:latin typeface="Courier New" pitchFamily="49" charset="0"/>
+                <a:cs typeface="Courier New" pitchFamily="49" charset="0"/>
+              </a:rPr>
+              <a:t>  </a:t>
+            </a:r>
+            <a:r>
+              <a:rPr lang="de-DE" sz="1400" dirty="0" err="1" smtClean="0">
+                <a:latin typeface="Courier New" pitchFamily="49" charset="0"/>
+                <a:cs typeface="Courier New" pitchFamily="49" charset="0"/>
+              </a:rPr>
+              <a:t>gaspi_pointer_t</a:t>
+            </a:r>
+            <a:r>
+              <a:rPr lang="de-DE" sz="1400" dirty="0" smtClean="0">
+                <a:latin typeface="Courier New" pitchFamily="49" charset="0"/>
+                <a:cs typeface="Courier New" pitchFamily="49" charset="0"/>
+              </a:rPr>
+              <a:t> _</a:t>
+            </a:r>
+            <a:r>
+              <a:rPr lang="de-DE" sz="1400" dirty="0" err="1" smtClean="0">
+                <a:latin typeface="Courier New" pitchFamily="49" charset="0"/>
+                <a:cs typeface="Courier New" pitchFamily="49" charset="0"/>
+              </a:rPr>
+              <a:t>vptr</a:t>
+            </a:r>
+            <a:r>
+              <a:rPr lang="de-DE" sz="1400" dirty="0" smtClean="0">
+                <a:latin typeface="Courier New" pitchFamily="49" charset="0"/>
+                <a:cs typeface="Courier New" pitchFamily="49" charset="0"/>
+              </a:rPr>
+              <a:t>;</a:t>
+            </a:r>
+          </a:p>
+          <a:p>
+            <a:r>
+              <a:rPr lang="de-DE" sz="1400" dirty="0" smtClean="0">
+                <a:latin typeface="Courier New" pitchFamily="49" charset="0"/>
+                <a:cs typeface="Courier New" pitchFamily="49" charset="0"/>
+              </a:rPr>
+              <a:t>  SUCCESS_OR_DIE(</a:t>
+            </a:r>
+            <a:r>
+              <a:rPr lang="de-DE" sz="1400" dirty="0" err="1" smtClean="0">
+                <a:latin typeface="Courier New" pitchFamily="49" charset="0"/>
+                <a:cs typeface="Courier New" pitchFamily="49" charset="0"/>
+              </a:rPr>
+              <a:t>gaspi_segment_ptr</a:t>
+            </a:r>
+            <a:r>
+              <a:rPr lang="de-DE" sz="1400" dirty="0" smtClean="0">
+                <a:latin typeface="Courier New" pitchFamily="49" charset="0"/>
+                <a:cs typeface="Courier New" pitchFamily="49" charset="0"/>
+              </a:rPr>
+              <a:t>(</a:t>
+            </a:r>
+            <a:r>
+              <a:rPr lang="de-DE" sz="1400" dirty="0" err="1" smtClean="0">
+                <a:latin typeface="Courier New" pitchFamily="49" charset="0"/>
+                <a:cs typeface="Courier New" pitchFamily="49" charset="0"/>
+              </a:rPr>
+              <a:t>passive_segment</a:t>
+            </a:r>
+            <a:r>
+              <a:rPr lang="de-DE" sz="1400" dirty="0" smtClean="0">
+                <a:latin typeface="Courier New" pitchFamily="49" charset="0"/>
+                <a:cs typeface="Courier New" pitchFamily="49" charset="0"/>
+              </a:rPr>
+              <a:t>, &amp;_</a:t>
+            </a:r>
+            <a:r>
+              <a:rPr lang="de-DE" sz="1400" dirty="0" err="1" smtClean="0">
+                <a:latin typeface="Courier New" pitchFamily="49" charset="0"/>
+                <a:cs typeface="Courier New" pitchFamily="49" charset="0"/>
+              </a:rPr>
+              <a:t>vptr</a:t>
+            </a:r>
+            <a:r>
+              <a:rPr lang="de-DE" sz="1400" dirty="0" smtClean="0">
+                <a:latin typeface="Courier New" pitchFamily="49" charset="0"/>
+                <a:cs typeface="Courier New" pitchFamily="49" charset="0"/>
+              </a:rPr>
+              <a:t>)); </a:t>
+            </a:r>
+          </a:p>
+          <a:p>
+            <a:r>
+              <a:rPr lang="de-DE" sz="1400" dirty="0" smtClean="0">
+                <a:latin typeface="Courier New" pitchFamily="49" charset="0"/>
+                <a:cs typeface="Courier New" pitchFamily="49" charset="0"/>
+              </a:rPr>
+              <a:t>  </a:t>
+            </a:r>
+            <a:r>
+              <a:rPr lang="de-DE" sz="1400" dirty="0" err="1" smtClean="0">
+                <a:latin typeface="Courier New" pitchFamily="49" charset="0"/>
+                <a:cs typeface="Courier New" pitchFamily="49" charset="0"/>
+              </a:rPr>
+              <a:t>const</a:t>
+            </a:r>
+            <a:r>
+              <a:rPr lang="de-DE" sz="1400" dirty="0" smtClean="0">
+                <a:latin typeface="Courier New" pitchFamily="49" charset="0"/>
+                <a:cs typeface="Courier New" pitchFamily="49" charset="0"/>
+              </a:rPr>
+              <a:t> </a:t>
+            </a:r>
+            <a:r>
+              <a:rPr lang="de-DE" sz="1400" dirty="0" err="1" smtClean="0">
+                <a:latin typeface="Courier New" pitchFamily="49" charset="0"/>
+                <a:cs typeface="Courier New" pitchFamily="49" charset="0"/>
+              </a:rPr>
+              <a:t>gaspi_offset_t</a:t>
+            </a:r>
+            <a:r>
+              <a:rPr lang="de-DE" sz="1400" dirty="0" smtClean="0">
+                <a:latin typeface="Courier New" pitchFamily="49" charset="0"/>
+                <a:cs typeface="Courier New" pitchFamily="49" charset="0"/>
+              </a:rPr>
+              <a:t> </a:t>
+            </a:r>
+            <a:r>
+              <a:rPr lang="de-DE" sz="1400" dirty="0" err="1" smtClean="0">
+                <a:latin typeface="Courier New" pitchFamily="49" charset="0"/>
+                <a:cs typeface="Courier New" pitchFamily="49" charset="0"/>
+              </a:rPr>
+              <a:t>passive_offset</a:t>
+            </a:r>
+            <a:r>
+              <a:rPr lang="de-DE" sz="1400" dirty="0" smtClean="0">
+                <a:latin typeface="Courier New" pitchFamily="49" charset="0"/>
+                <a:cs typeface="Courier New" pitchFamily="49" charset="0"/>
+              </a:rPr>
+              <a:t> = </a:t>
+            </a:r>
+            <a:r>
+              <a:rPr lang="de-DE" sz="1400" dirty="0" err="1" smtClean="0">
+                <a:latin typeface="Courier New" pitchFamily="49" charset="0"/>
+                <a:cs typeface="Courier New" pitchFamily="49" charset="0"/>
+              </a:rPr>
+              <a:t>sizeof</a:t>
+            </a:r>
+            <a:r>
+              <a:rPr lang="de-DE" sz="1400" dirty="0" smtClean="0">
+                <a:latin typeface="Courier New" pitchFamily="49" charset="0"/>
+                <a:cs typeface="Courier New" pitchFamily="49" charset="0"/>
+              </a:rPr>
+              <a:t>(packet);  </a:t>
+            </a:r>
+          </a:p>
+          <a:p>
+            <a:r>
+              <a:rPr lang="de-DE" sz="1400" dirty="0" smtClean="0">
+                <a:latin typeface="Courier New" pitchFamily="49" charset="0"/>
+                <a:cs typeface="Courier New" pitchFamily="49" charset="0"/>
+              </a:rPr>
+              <a:t>  </a:t>
+            </a:r>
+            <a:r>
+              <a:rPr lang="de-DE" sz="1400" dirty="0" err="1" smtClean="0">
+                <a:latin typeface="Courier New" pitchFamily="49" charset="0"/>
+                <a:cs typeface="Courier New" pitchFamily="49" charset="0"/>
+              </a:rPr>
+              <a:t>while</a:t>
+            </a:r>
+            <a:r>
+              <a:rPr lang="de-DE" sz="1400" dirty="0" smtClean="0">
+                <a:latin typeface="Courier New" pitchFamily="49" charset="0"/>
+                <a:cs typeface="Courier New" pitchFamily="49" charset="0"/>
+              </a:rPr>
+              <a:t>(1)</a:t>
+            </a:r>
+          </a:p>
+          <a:p>
+            <a:r>
+              <a:rPr lang="de-DE" sz="1400" dirty="0" smtClean="0">
+                <a:latin typeface="Courier New" pitchFamily="49" charset="0"/>
+                <a:cs typeface="Courier New" pitchFamily="49" charset="0"/>
+              </a:rPr>
+              <a:t>    {</a:t>
+            </a:r>
+          </a:p>
+          <a:p>
+            <a:r>
+              <a:rPr lang="de-DE" sz="1400" dirty="0" smtClean="0">
+                <a:latin typeface="Courier New" pitchFamily="49" charset="0"/>
+                <a:cs typeface="Courier New" pitchFamily="49" charset="0"/>
+              </a:rPr>
+              <a:t>      </a:t>
+            </a:r>
+            <a:r>
+              <a:rPr lang="de-DE" sz="1400" dirty="0" err="1" smtClean="0">
+                <a:latin typeface="Courier New" pitchFamily="49" charset="0"/>
+                <a:cs typeface="Courier New" pitchFamily="49" charset="0"/>
+              </a:rPr>
+              <a:t>gaspi_rank_t</a:t>
+            </a:r>
+            <a:r>
+              <a:rPr lang="de-DE" sz="1400" dirty="0" smtClean="0">
+                <a:latin typeface="Courier New" pitchFamily="49" charset="0"/>
+                <a:cs typeface="Courier New" pitchFamily="49" charset="0"/>
+              </a:rPr>
+              <a:t> </a:t>
+            </a:r>
+            <a:r>
+              <a:rPr lang="de-DE" sz="1400" dirty="0" err="1" smtClean="0">
+                <a:latin typeface="Courier New" pitchFamily="49" charset="0"/>
+                <a:cs typeface="Courier New" pitchFamily="49" charset="0"/>
+              </a:rPr>
+              <a:t>sender</a:t>
+            </a:r>
+            <a:r>
+              <a:rPr lang="de-DE" sz="1400" dirty="0" smtClean="0">
+                <a:latin typeface="Courier New" pitchFamily="49" charset="0"/>
+                <a:cs typeface="Courier New" pitchFamily="49" charset="0"/>
+              </a:rPr>
+              <a:t>;</a:t>
+            </a:r>
+          </a:p>
+          <a:p>
+            <a:r>
+              <a:rPr lang="de-DE" sz="1400" dirty="0" smtClean="0">
+                <a:latin typeface="Courier New" pitchFamily="49" charset="0"/>
+                <a:cs typeface="Courier New" pitchFamily="49" charset="0"/>
+              </a:rPr>
+              <a:t>      SUCCESS_OR_DIE(</a:t>
+            </a:r>
+            <a:r>
+              <a:rPr lang="de-DE" sz="1400" dirty="0" err="1" smtClean="0">
+                <a:latin typeface="Courier New" pitchFamily="49" charset="0"/>
+                <a:cs typeface="Courier New" pitchFamily="49" charset="0"/>
+              </a:rPr>
+              <a:t>gaspi_passive_receive</a:t>
+            </a:r>
+            <a:r>
+              <a:rPr lang="de-DE" sz="1400" dirty="0" smtClean="0">
+                <a:latin typeface="Courier New" pitchFamily="49" charset="0"/>
+                <a:cs typeface="Courier New" pitchFamily="49" charset="0"/>
+              </a:rPr>
+              <a:t>(</a:t>
+            </a:r>
+            <a:r>
+              <a:rPr lang="de-DE" sz="1400" dirty="0" err="1" smtClean="0">
+                <a:latin typeface="Courier New" pitchFamily="49" charset="0"/>
+                <a:cs typeface="Courier New" pitchFamily="49" charset="0"/>
+              </a:rPr>
+              <a:t>passive_segment</a:t>
+            </a:r>
+            <a:endParaRPr lang="de-DE" sz="1400" dirty="0" smtClean="0">
+              <a:latin typeface="Courier New" pitchFamily="49" charset="0"/>
+              <a:cs typeface="Courier New" pitchFamily="49" charset="0"/>
+            </a:endParaRPr>
+          </a:p>
+          <a:p>
+            <a:r>
+              <a:rPr lang="de-DE" sz="1400" dirty="0" smtClean="0">
+                <a:latin typeface="Courier New" pitchFamily="49" charset="0"/>
+                <a:cs typeface="Courier New" pitchFamily="49" charset="0"/>
+              </a:rPr>
+              <a:t>                                           , </a:t>
+            </a:r>
+            <a:r>
+              <a:rPr lang="de-DE" sz="1400" dirty="0" err="1" smtClean="0">
+                <a:latin typeface="Courier New" pitchFamily="49" charset="0"/>
+                <a:cs typeface="Courier New" pitchFamily="49" charset="0"/>
+              </a:rPr>
+              <a:t>passive_offset</a:t>
+            </a:r>
+            <a:endParaRPr lang="de-DE" sz="1400" dirty="0" smtClean="0">
+              <a:latin typeface="Courier New" pitchFamily="49" charset="0"/>
+              <a:cs typeface="Courier New" pitchFamily="49" charset="0"/>
+            </a:endParaRPr>
+          </a:p>
+          <a:p>
+            <a:r>
+              <a:rPr lang="de-DE" sz="1400" dirty="0" smtClean="0">
+                <a:latin typeface="Courier New" pitchFamily="49" charset="0"/>
+                <a:cs typeface="Courier New" pitchFamily="49" charset="0"/>
+              </a:rPr>
+              <a:t>                                           , &amp;</a:t>
+            </a:r>
+            <a:r>
+              <a:rPr lang="de-DE" sz="1400" dirty="0" err="1" smtClean="0">
+                <a:latin typeface="Courier New" pitchFamily="49" charset="0"/>
+                <a:cs typeface="Courier New" pitchFamily="49" charset="0"/>
+              </a:rPr>
+              <a:t>sender</a:t>
+            </a:r>
+            <a:endParaRPr lang="de-DE" sz="1400" dirty="0" smtClean="0">
+              <a:latin typeface="Courier New" pitchFamily="49" charset="0"/>
+              <a:cs typeface="Courier New" pitchFamily="49" charset="0"/>
+            </a:endParaRPr>
+          </a:p>
+          <a:p>
+            <a:r>
+              <a:rPr lang="de-DE" sz="1400" dirty="0" smtClean="0">
+                <a:latin typeface="Courier New" pitchFamily="49" charset="0"/>
+                <a:cs typeface="Courier New" pitchFamily="49" charset="0"/>
+              </a:rPr>
+              <a:t>                                           , </a:t>
+            </a:r>
+            <a:r>
+              <a:rPr lang="de-DE" sz="1400" dirty="0" err="1" smtClean="0">
+                <a:latin typeface="Courier New" pitchFamily="49" charset="0"/>
+                <a:cs typeface="Courier New" pitchFamily="49" charset="0"/>
+              </a:rPr>
+              <a:t>sizeof</a:t>
+            </a:r>
+            <a:r>
+              <a:rPr lang="de-DE" sz="1400" dirty="0" smtClean="0">
+                <a:latin typeface="Courier New" pitchFamily="49" charset="0"/>
+                <a:cs typeface="Courier New" pitchFamily="49" charset="0"/>
+              </a:rPr>
+              <a:t>(packet)</a:t>
+            </a:r>
+          </a:p>
+          <a:p>
+            <a:r>
+              <a:rPr lang="de-DE" sz="1400" dirty="0" smtClean="0">
+                <a:latin typeface="Courier New" pitchFamily="49" charset="0"/>
+                <a:cs typeface="Courier New" pitchFamily="49" charset="0"/>
+              </a:rPr>
+              <a:t>                                           , GASPI_BLOCK</a:t>
+            </a:r>
+          </a:p>
+          <a:p>
+            <a:r>
+              <a:rPr lang="de-DE" sz="1400" dirty="0" smtClean="0">
+                <a:latin typeface="Courier New" pitchFamily="49" charset="0"/>
+                <a:cs typeface="Courier New" pitchFamily="49" charset="0"/>
+              </a:rPr>
+              <a:t>                                           ));</a:t>
+            </a:r>
+          </a:p>
+          <a:p>
+            <a:r>
+              <a:rPr lang="de-DE" sz="1400" dirty="0" smtClean="0">
+                <a:latin typeface="Courier New" pitchFamily="49" charset="0"/>
+                <a:cs typeface="Courier New" pitchFamily="49" charset="0"/>
+              </a:rPr>
+              <a:t>      packet *t = (packet *) (_</a:t>
+            </a:r>
+            <a:r>
+              <a:rPr lang="de-DE" sz="1400" dirty="0" err="1" smtClean="0">
+                <a:latin typeface="Courier New" pitchFamily="49" charset="0"/>
+                <a:cs typeface="Courier New" pitchFamily="49" charset="0"/>
+              </a:rPr>
+              <a:t>vptr</a:t>
+            </a:r>
+            <a:r>
+              <a:rPr lang="de-DE" sz="1400" dirty="0" smtClean="0">
+                <a:latin typeface="Courier New" pitchFamily="49" charset="0"/>
+                <a:cs typeface="Courier New" pitchFamily="49" charset="0"/>
+              </a:rPr>
+              <a:t> + </a:t>
+            </a:r>
+            <a:r>
+              <a:rPr lang="de-DE" sz="1400" dirty="0" err="1" smtClean="0">
+                <a:latin typeface="Courier New" pitchFamily="49" charset="0"/>
+                <a:cs typeface="Courier New" pitchFamily="49" charset="0"/>
+              </a:rPr>
+              <a:t>passive_offset</a:t>
+            </a:r>
+            <a:r>
+              <a:rPr lang="de-DE" sz="1400" dirty="0" smtClean="0">
+                <a:latin typeface="Courier New" pitchFamily="49" charset="0"/>
+                <a:cs typeface="Courier New" pitchFamily="49" charset="0"/>
+              </a:rPr>
+              <a:t>);</a:t>
+            </a:r>
+          </a:p>
+          <a:p>
+            <a:r>
+              <a:rPr lang="de-DE" sz="1400" dirty="0" smtClean="0">
+                <a:latin typeface="Courier New" pitchFamily="49" charset="0"/>
+                <a:cs typeface="Courier New" pitchFamily="49" charset="0"/>
+              </a:rPr>
+              <a:t>      </a:t>
+            </a:r>
+            <a:r>
+              <a:rPr lang="de-DE" sz="1400" dirty="0" err="1" smtClean="0">
+                <a:latin typeface="Courier New" pitchFamily="49" charset="0"/>
+                <a:cs typeface="Courier New" pitchFamily="49" charset="0"/>
+              </a:rPr>
+              <a:t>passive_handler</a:t>
+            </a:r>
+            <a:r>
+              <a:rPr lang="de-DE" sz="1400" dirty="0" smtClean="0">
+                <a:latin typeface="Courier New" pitchFamily="49" charset="0"/>
+                <a:cs typeface="Courier New" pitchFamily="49" charset="0"/>
+              </a:rPr>
+              <a:t> </a:t>
+            </a:r>
+            <a:r>
+              <a:rPr lang="de-DE" sz="1400" dirty="0" err="1" smtClean="0">
+                <a:latin typeface="Courier New" pitchFamily="49" charset="0"/>
+                <a:cs typeface="Courier New" pitchFamily="49" charset="0"/>
+              </a:rPr>
+              <a:t>handler</a:t>
+            </a:r>
+            <a:r>
+              <a:rPr lang="de-DE" sz="1400" dirty="0" smtClean="0">
+                <a:latin typeface="Courier New" pitchFamily="49" charset="0"/>
+                <a:cs typeface="Courier New" pitchFamily="49" charset="0"/>
+              </a:rPr>
+              <a:t> = t-&gt;</a:t>
+            </a:r>
+            <a:r>
+              <a:rPr lang="de-DE" sz="1400" dirty="0" err="1" smtClean="0">
+                <a:latin typeface="Courier New" pitchFamily="49" charset="0"/>
+                <a:cs typeface="Courier New" pitchFamily="49" charset="0"/>
+              </a:rPr>
+              <a:t>handler</a:t>
+            </a:r>
+            <a:r>
+              <a:rPr lang="de-DE" sz="1400" dirty="0" smtClean="0">
+                <a:latin typeface="Courier New" pitchFamily="49" charset="0"/>
+                <a:cs typeface="Courier New" pitchFamily="49" charset="0"/>
+              </a:rPr>
+              <a:t>;      </a:t>
+            </a:r>
+          </a:p>
+          <a:p>
+            <a:r>
+              <a:rPr lang="de-DE" sz="1400" dirty="0" smtClean="0">
+                <a:latin typeface="Courier New" pitchFamily="49" charset="0"/>
+                <a:cs typeface="Courier New" pitchFamily="49" charset="0"/>
+              </a:rPr>
+              <a:t>      // </a:t>
+            </a:r>
+            <a:r>
+              <a:rPr lang="de-DE" sz="1400" dirty="0" err="1" smtClean="0">
+                <a:latin typeface="Courier New" pitchFamily="49" charset="0"/>
+                <a:cs typeface="Courier New" pitchFamily="49" charset="0"/>
+              </a:rPr>
+              <a:t>execute</a:t>
+            </a:r>
+            <a:r>
+              <a:rPr lang="de-DE" sz="1400" dirty="0" smtClean="0">
+                <a:latin typeface="Courier New" pitchFamily="49" charset="0"/>
+                <a:cs typeface="Courier New" pitchFamily="49" charset="0"/>
+              </a:rPr>
+              <a:t> </a:t>
+            </a:r>
+            <a:r>
+              <a:rPr lang="de-DE" sz="1400" dirty="0" err="1" smtClean="0">
+                <a:latin typeface="Courier New" pitchFamily="49" charset="0"/>
+                <a:cs typeface="Courier New" pitchFamily="49" charset="0"/>
+              </a:rPr>
+              <a:t>requested</a:t>
+            </a:r>
+            <a:r>
+              <a:rPr lang="de-DE" sz="1400" dirty="0" smtClean="0">
+                <a:latin typeface="Courier New" pitchFamily="49" charset="0"/>
+                <a:cs typeface="Courier New" pitchFamily="49" charset="0"/>
+              </a:rPr>
+              <a:t> remote </a:t>
+            </a:r>
+            <a:r>
+              <a:rPr lang="de-DE" sz="1400" dirty="0" err="1" smtClean="0">
+                <a:latin typeface="Courier New" pitchFamily="49" charset="0"/>
+                <a:cs typeface="Courier New" pitchFamily="49" charset="0"/>
+              </a:rPr>
+              <a:t>procedure</a:t>
+            </a:r>
+            <a:r>
+              <a:rPr lang="de-DE" sz="1400" dirty="0" smtClean="0">
+                <a:latin typeface="Courier New" pitchFamily="49" charset="0"/>
+                <a:cs typeface="Courier New" pitchFamily="49" charset="0"/>
+              </a:rPr>
+              <a:t> </a:t>
+            </a:r>
+            <a:r>
+              <a:rPr lang="de-DE" sz="1400" dirty="0" err="1" smtClean="0">
+                <a:latin typeface="Courier New" pitchFamily="49" charset="0"/>
+                <a:cs typeface="Courier New" pitchFamily="49" charset="0"/>
+              </a:rPr>
+              <a:t>handler</a:t>
+            </a:r>
+            <a:endParaRPr lang="de-DE" sz="1400" dirty="0" smtClean="0">
+              <a:latin typeface="Courier New" pitchFamily="49" charset="0"/>
+              <a:cs typeface="Courier New" pitchFamily="49" charset="0"/>
+            </a:endParaRPr>
+          </a:p>
+          <a:p>
+            <a:r>
+              <a:rPr lang="de-DE" sz="1400" dirty="0" smtClean="0">
+                <a:latin typeface="Courier New" pitchFamily="49" charset="0"/>
+                <a:cs typeface="Courier New" pitchFamily="49" charset="0"/>
+              </a:rPr>
+              <a:t>      </a:t>
+            </a:r>
+            <a:r>
+              <a:rPr lang="de-DE" sz="1400" dirty="0" err="1" smtClean="0">
+                <a:latin typeface="Courier New" pitchFamily="49" charset="0"/>
+                <a:cs typeface="Courier New" pitchFamily="49" charset="0"/>
+              </a:rPr>
+              <a:t>handler</a:t>
+            </a:r>
+            <a:r>
+              <a:rPr lang="de-DE" sz="1400" dirty="0" smtClean="0">
+                <a:latin typeface="Courier New" pitchFamily="49" charset="0"/>
+                <a:cs typeface="Courier New" pitchFamily="49" charset="0"/>
+              </a:rPr>
+              <a:t>(t-&gt;rank, t-&gt;</a:t>
+            </a:r>
+            <a:r>
+              <a:rPr lang="de-DE" sz="1400" dirty="0" err="1" smtClean="0">
+                <a:latin typeface="Courier New" pitchFamily="49" charset="0"/>
+                <a:cs typeface="Courier New" pitchFamily="49" charset="0"/>
+              </a:rPr>
+              <a:t>len</a:t>
+            </a:r>
+            <a:r>
+              <a:rPr lang="de-DE" sz="1400" dirty="0" smtClean="0">
+                <a:latin typeface="Courier New" pitchFamily="49" charset="0"/>
+                <a:cs typeface="Courier New" pitchFamily="49" charset="0"/>
+              </a:rPr>
+              <a:t>, t-&gt;</a:t>
+            </a:r>
+            <a:r>
+              <a:rPr lang="de-DE" sz="1400" dirty="0" err="1" smtClean="0">
+                <a:latin typeface="Courier New" pitchFamily="49" charset="0"/>
+                <a:cs typeface="Courier New" pitchFamily="49" charset="0"/>
+              </a:rPr>
+              <a:t>offset</a:t>
+            </a:r>
+            <a:r>
+              <a:rPr lang="de-DE" sz="1400" dirty="0" smtClean="0">
+                <a:latin typeface="Courier New" pitchFamily="49" charset="0"/>
+                <a:cs typeface="Courier New" pitchFamily="49" charset="0"/>
+              </a:rPr>
+              <a:t>);</a:t>
+            </a:r>
+          </a:p>
+          <a:p>
+            <a:r>
+              <a:rPr lang="de-DE" sz="1400" dirty="0" smtClean="0">
+                <a:latin typeface="Courier New" pitchFamily="49" charset="0"/>
+                <a:cs typeface="Courier New" pitchFamily="49" charset="0"/>
+              </a:rPr>
+              <a:t>    }</a:t>
+            </a:r>
+          </a:p>
+          <a:p>
+            <a:r>
+              <a:rPr lang="de-DE" sz="1400" dirty="0" smtClean="0">
+                <a:latin typeface="Courier New" pitchFamily="49" charset="0"/>
+                <a:cs typeface="Courier New" pitchFamily="49" charset="0"/>
+              </a:rPr>
+              <a:t>  </a:t>
+            </a:r>
+            <a:r>
+              <a:rPr lang="de-DE" sz="1400" dirty="0" err="1" smtClean="0">
+                <a:latin typeface="Courier New" pitchFamily="49" charset="0"/>
+                <a:cs typeface="Courier New" pitchFamily="49" charset="0"/>
+              </a:rPr>
+              <a:t>return</a:t>
+            </a:r>
+            <a:r>
+              <a:rPr lang="de-DE" sz="1400" dirty="0" smtClean="0">
+                <a:latin typeface="Courier New" pitchFamily="49" charset="0"/>
+                <a:cs typeface="Courier New" pitchFamily="49" charset="0"/>
+              </a:rPr>
+              <a:t> NULL;</a:t>
+            </a:r>
+          </a:p>
+        </p:txBody>
+      </p:sp>
+    </p:spTree>
+  </p:cSld>
+  <p:clrMapOvr>
+    <a:masterClrMapping/>
+  </p:clrMapOvr>
+</p:sld>
+</file>
+
+<file path=ppt/slides/slide83.xml><?xml version="1.0" encoding="utf-8"?>
 <p:sld xmlns:a="http://schemas.openxmlformats.org/drawingml/2006/main" xmlns:r="http://schemas.openxmlformats.org/officeDocument/2006/relationships" xmlns:p="http://schemas.openxmlformats.org/presentationml/2006/main">
   <p:cSld>
     <p:spTree>
@@ -48853,7 +49878,7 @@
 </p:sld>
 </file>
 
-<file path=ppt/slides/slide83.xml><?xml version="1.0" encoding="utf-8"?>
+<file path=ppt/slides/slide84.xml><?xml version="1.0" encoding="utf-8"?>
 <p:sld xmlns:a="http://schemas.openxmlformats.org/drawingml/2006/main" xmlns:r="http://schemas.openxmlformats.org/officeDocument/2006/relationships" xmlns:p="http://schemas.openxmlformats.org/presentationml/2006/main">
   <p:cSld>
     <p:spTree>
@@ -49004,7 +50029,7 @@
 </p:sld>
 </file>
 
-<file path=ppt/slides/slide84.xml><?xml version="1.0" encoding="utf-8"?>
+<file path=ppt/slides/slide85.xml><?xml version="1.0" encoding="utf-8"?>
 <p:sld xmlns:a="http://schemas.openxmlformats.org/drawingml/2006/main" xmlns:r="http://schemas.openxmlformats.org/officeDocument/2006/relationships" xmlns:p="http://schemas.openxmlformats.org/presentationml/2006/main">
   <p:cSld>
     <p:spTree>

</xml_diff>